<commit_message>
Updated powerpoint and delete proposal in main area
</commit_message>
<xml_diff>
--- a/docs/Presentation/Power-Point.pptx
+++ b/docs/Presentation/Power-Point.pptx
@@ -152,3647 +152,6 @@
 </p:cmLst>
 </file>
 
-<file path=ppt/diagrams/colors1.xml><?xml version="1.0" encoding="utf-8"?>
-<dgm:colorsDef xmlns:dgm="http://schemas.openxmlformats.org/drawingml/2006/diagram" xmlns:a="http://schemas.openxmlformats.org/drawingml/2006/main" uniqueId="urn:microsoft.com/office/officeart/2018/5/colors/Iconchunking_neutralbg_colorful1">
-  <dgm:title val=""/>
-  <dgm:desc val=""/>
-  <dgm:catLst>
-    <dgm:cat type="colorful" pri="10100"/>
-  </dgm:catLst>
-  <dgm:styleLbl name="node0">
-    <dgm:fillClrLst meth="repeat">
-      <a:schemeClr val="accent1"/>
-    </dgm:fillClrLst>
-    <dgm:linClrLst meth="repeat">
-      <a:schemeClr val="lt1"/>
-    </dgm:linClrLst>
-    <dgm:effectClrLst/>
-    <dgm:txLinClrLst/>
-    <dgm:txFillClrLst/>
-    <dgm:txEffectClrLst/>
-  </dgm:styleLbl>
-  <dgm:styleLbl name="node1">
-    <dgm:fillClrLst meth="repeat">
-      <a:schemeClr val="accent2"/>
-      <a:schemeClr val="accent3"/>
-      <a:schemeClr val="accent4"/>
-      <a:schemeClr val="accent5"/>
-      <a:schemeClr val="accent6"/>
-    </dgm:fillClrLst>
-    <dgm:linClrLst meth="repeat">
-      <a:schemeClr val="lt1">
-        <a:alpha val="0"/>
-      </a:schemeClr>
-    </dgm:linClrLst>
-    <dgm:effectClrLst/>
-    <dgm:txLinClrLst/>
-    <dgm:txFillClrLst/>
-    <dgm:txEffectClrLst/>
-  </dgm:styleLbl>
-  <dgm:styleLbl name="alignNode1">
-    <dgm:fillClrLst meth="repeat">
-      <a:schemeClr val="accent2"/>
-      <a:schemeClr val="accent3"/>
-      <a:schemeClr val="accent4"/>
-      <a:schemeClr val="accent5"/>
-      <a:schemeClr val="accent6"/>
-    </dgm:fillClrLst>
-    <dgm:linClrLst meth="repeat">
-      <a:schemeClr val="accent2"/>
-      <a:schemeClr val="accent3"/>
-      <a:schemeClr val="accent4"/>
-      <a:schemeClr val="accent5"/>
-      <a:schemeClr val="accent6"/>
-    </dgm:linClrLst>
-    <dgm:effectClrLst/>
-    <dgm:txLinClrLst/>
-    <dgm:txFillClrLst/>
-    <dgm:txEffectClrLst/>
-  </dgm:styleLbl>
-  <dgm:styleLbl name="lnNode1">
-    <dgm:fillClrLst meth="repeat">
-      <a:schemeClr val="accent2"/>
-      <a:schemeClr val="accent3"/>
-      <a:schemeClr val="accent4"/>
-      <a:schemeClr val="accent5"/>
-      <a:schemeClr val="accent6"/>
-    </dgm:fillClrLst>
-    <dgm:linClrLst meth="repeat">
-      <a:schemeClr val="lt1"/>
-    </dgm:linClrLst>
-    <dgm:effectClrLst/>
-    <dgm:txLinClrLst/>
-    <dgm:txFillClrLst/>
-    <dgm:txEffectClrLst/>
-  </dgm:styleLbl>
-  <dgm:styleLbl name="vennNode1">
-    <dgm:fillClrLst meth="repeat">
-      <a:schemeClr val="accent2">
-        <a:alpha val="50000"/>
-      </a:schemeClr>
-      <a:schemeClr val="accent3">
-        <a:alpha val="50000"/>
-      </a:schemeClr>
-      <a:schemeClr val="accent4">
-        <a:alpha val="50000"/>
-      </a:schemeClr>
-      <a:schemeClr val="accent5">
-        <a:alpha val="50000"/>
-      </a:schemeClr>
-      <a:schemeClr val="accent6">
-        <a:alpha val="50000"/>
-      </a:schemeClr>
-    </dgm:fillClrLst>
-    <dgm:linClrLst meth="repeat">
-      <a:schemeClr val="lt1"/>
-    </dgm:linClrLst>
-    <dgm:effectClrLst/>
-    <dgm:txLinClrLst/>
-    <dgm:txFillClrLst/>
-    <dgm:txEffectClrLst/>
-  </dgm:styleLbl>
-  <dgm:styleLbl name="node2">
-    <dgm:fillClrLst>
-      <a:schemeClr val="accent2"/>
-    </dgm:fillClrLst>
-    <dgm:linClrLst meth="repeat">
-      <a:schemeClr val="lt1"/>
-    </dgm:linClrLst>
-    <dgm:effectClrLst/>
-    <dgm:txLinClrLst/>
-    <dgm:txFillClrLst/>
-    <dgm:txEffectClrLst/>
-  </dgm:styleLbl>
-  <dgm:styleLbl name="node3">
-    <dgm:fillClrLst>
-      <a:schemeClr val="accent3"/>
-    </dgm:fillClrLst>
-    <dgm:linClrLst meth="repeat">
-      <a:schemeClr val="lt1"/>
-    </dgm:linClrLst>
-    <dgm:effectClrLst/>
-    <dgm:txLinClrLst/>
-    <dgm:txFillClrLst/>
-    <dgm:txEffectClrLst/>
-  </dgm:styleLbl>
-  <dgm:styleLbl name="node4">
-    <dgm:fillClrLst>
-      <a:schemeClr val="accent4"/>
-    </dgm:fillClrLst>
-    <dgm:linClrLst meth="repeat">
-      <a:schemeClr val="lt1"/>
-    </dgm:linClrLst>
-    <dgm:effectClrLst/>
-    <dgm:txLinClrLst/>
-    <dgm:txFillClrLst/>
-    <dgm:txEffectClrLst/>
-  </dgm:styleLbl>
-  <dgm:styleLbl name="fgImgPlace1">
-    <dgm:fillClrLst meth="repeat">
-      <a:schemeClr val="accent2">
-        <a:tint val="50000"/>
-      </a:schemeClr>
-      <a:schemeClr val="accent3">
-        <a:tint val="50000"/>
-      </a:schemeClr>
-      <a:schemeClr val="accent4">
-        <a:tint val="50000"/>
-      </a:schemeClr>
-      <a:schemeClr val="accent5">
-        <a:tint val="50000"/>
-      </a:schemeClr>
-      <a:schemeClr val="accent6">
-        <a:tint val="50000"/>
-      </a:schemeClr>
-    </dgm:fillClrLst>
-    <dgm:linClrLst meth="repeat">
-      <a:schemeClr val="lt1"/>
-    </dgm:linClrLst>
-    <dgm:effectClrLst/>
-    <dgm:txLinClrLst/>
-    <dgm:txFillClrLst meth="repeat">
-      <a:schemeClr val="lt1"/>
-    </dgm:txFillClrLst>
-    <dgm:txEffectClrLst/>
-  </dgm:styleLbl>
-  <dgm:styleLbl name="alignImgPlace1">
-    <dgm:fillClrLst>
-      <a:schemeClr val="accent1">
-        <a:tint val="50000"/>
-      </a:schemeClr>
-      <a:schemeClr val="accent2">
-        <a:tint val="20000"/>
-      </a:schemeClr>
-    </dgm:fillClrLst>
-    <dgm:linClrLst meth="repeat">
-      <a:schemeClr val="lt1"/>
-    </dgm:linClrLst>
-    <dgm:effectClrLst/>
-    <dgm:txLinClrLst/>
-    <dgm:txFillClrLst meth="repeat">
-      <a:schemeClr val="lt1"/>
-    </dgm:txFillClrLst>
-    <dgm:txEffectClrLst/>
-  </dgm:styleLbl>
-  <dgm:styleLbl name="bgImgPlace1">
-    <dgm:fillClrLst>
-      <a:schemeClr val="accent1">
-        <a:tint val="50000"/>
-      </a:schemeClr>
-      <a:schemeClr val="accent2">
-        <a:tint val="20000"/>
-      </a:schemeClr>
-    </dgm:fillClrLst>
-    <dgm:linClrLst meth="repeat">
-      <a:schemeClr val="lt1"/>
-    </dgm:linClrLst>
-    <dgm:effectClrLst/>
-    <dgm:txLinClrLst/>
-    <dgm:txFillClrLst meth="repeat">
-      <a:schemeClr val="lt1"/>
-    </dgm:txFillClrLst>
-    <dgm:txEffectClrLst/>
-  </dgm:styleLbl>
-  <dgm:styleLbl name="sibTrans2D1">
-    <dgm:fillClrLst meth="repeat">
-      <a:schemeClr val="accent2"/>
-      <a:schemeClr val="accent3"/>
-      <a:schemeClr val="accent4"/>
-      <a:schemeClr val="accent5"/>
-      <a:schemeClr val="accent6"/>
-    </dgm:fillClrLst>
-    <dgm:linClrLst meth="cycle">
-      <a:schemeClr val="lt1"/>
-    </dgm:linClrLst>
-    <dgm:effectClrLst/>
-    <dgm:txLinClrLst/>
-    <dgm:txFillClrLst/>
-    <dgm:txEffectClrLst/>
-  </dgm:styleLbl>
-  <dgm:styleLbl name="fgSibTrans2D1">
-    <dgm:fillClrLst meth="repeat">
-      <a:schemeClr val="accent2"/>
-      <a:schemeClr val="accent3"/>
-      <a:schemeClr val="accent4"/>
-      <a:schemeClr val="accent5"/>
-      <a:schemeClr val="accent6"/>
-    </dgm:fillClrLst>
-    <dgm:linClrLst meth="cycle">
-      <a:schemeClr val="lt1"/>
-    </dgm:linClrLst>
-    <dgm:effectClrLst/>
-    <dgm:txLinClrLst/>
-    <dgm:txFillClrLst meth="repeat">
-      <a:schemeClr val="lt1"/>
-    </dgm:txFillClrLst>
-    <dgm:txEffectClrLst/>
-  </dgm:styleLbl>
-  <dgm:styleLbl name="bgSibTrans2D1">
-    <dgm:fillClrLst meth="repeat">
-      <a:schemeClr val="accent2"/>
-      <a:schemeClr val="accent3"/>
-      <a:schemeClr val="accent4"/>
-      <a:schemeClr val="accent5"/>
-      <a:schemeClr val="accent6"/>
-    </dgm:fillClrLst>
-    <dgm:linClrLst meth="cycle">
-      <a:schemeClr val="lt1"/>
-    </dgm:linClrLst>
-    <dgm:effectClrLst/>
-    <dgm:txLinClrLst/>
-    <dgm:txFillClrLst meth="repeat">
-      <a:schemeClr val="lt1"/>
-    </dgm:txFillClrLst>
-    <dgm:txEffectClrLst/>
-  </dgm:styleLbl>
-  <dgm:styleLbl name="sibTrans1D1">
-    <dgm:fillClrLst meth="repeat">
-      <a:schemeClr val="accent2"/>
-      <a:schemeClr val="accent3"/>
-      <a:schemeClr val="accent4"/>
-      <a:schemeClr val="accent5"/>
-      <a:schemeClr val="accent6"/>
-    </dgm:fillClrLst>
-    <dgm:linClrLst meth="repeat">
-      <a:schemeClr val="accent2"/>
-      <a:schemeClr val="accent3"/>
-      <a:schemeClr val="accent4"/>
-      <a:schemeClr val="accent5"/>
-      <a:schemeClr val="accent6"/>
-    </dgm:linClrLst>
-    <dgm:effectClrLst/>
-    <dgm:txLinClrLst/>
-    <dgm:txFillClrLst meth="repeat">
-      <a:schemeClr val="tx1"/>
-    </dgm:txFillClrLst>
-    <dgm:txEffectClrLst/>
-  </dgm:styleLbl>
-  <dgm:styleLbl name="callout">
-    <dgm:fillClrLst meth="repeat">
-      <a:schemeClr val="accent2"/>
-    </dgm:fillClrLst>
-    <dgm:linClrLst meth="repeat">
-      <a:schemeClr val="accent2">
-        <a:tint val="50000"/>
-      </a:schemeClr>
-    </dgm:linClrLst>
-    <dgm:effectClrLst/>
-    <dgm:txLinClrLst/>
-    <dgm:txFillClrLst meth="repeat">
-      <a:schemeClr val="tx1"/>
-    </dgm:txFillClrLst>
-    <dgm:txEffectClrLst/>
-  </dgm:styleLbl>
-  <dgm:styleLbl name="asst0">
-    <dgm:fillClrLst meth="repeat">
-      <a:schemeClr val="accent1"/>
-    </dgm:fillClrLst>
-    <dgm:linClrLst meth="repeat">
-      <a:schemeClr val="lt1"/>
-    </dgm:linClrLst>
-    <dgm:effectClrLst/>
-    <dgm:txLinClrLst/>
-    <dgm:txFillClrLst/>
-    <dgm:txEffectClrLst/>
-  </dgm:styleLbl>
-  <dgm:styleLbl name="asst1">
-    <dgm:fillClrLst meth="repeat">
-      <a:schemeClr val="accent2"/>
-    </dgm:fillClrLst>
-    <dgm:linClrLst meth="repeat">
-      <a:schemeClr val="lt1"/>
-    </dgm:linClrLst>
-    <dgm:effectClrLst/>
-    <dgm:txLinClrLst/>
-    <dgm:txFillClrLst/>
-    <dgm:txEffectClrLst/>
-  </dgm:styleLbl>
-  <dgm:styleLbl name="asst2">
-    <dgm:fillClrLst>
-      <a:schemeClr val="accent3"/>
-    </dgm:fillClrLst>
-    <dgm:linClrLst meth="repeat">
-      <a:schemeClr val="lt1"/>
-    </dgm:linClrLst>
-    <dgm:effectClrLst/>
-    <dgm:txLinClrLst/>
-    <dgm:txFillClrLst/>
-    <dgm:txEffectClrLst/>
-  </dgm:styleLbl>
-  <dgm:styleLbl name="asst3">
-    <dgm:fillClrLst>
-      <a:schemeClr val="accent4"/>
-    </dgm:fillClrLst>
-    <dgm:linClrLst meth="repeat">
-      <a:schemeClr val="lt1"/>
-    </dgm:linClrLst>
-    <dgm:effectClrLst/>
-    <dgm:txLinClrLst/>
-    <dgm:txFillClrLst/>
-    <dgm:txEffectClrLst/>
-  </dgm:styleLbl>
-  <dgm:styleLbl name="asst4">
-    <dgm:fillClrLst>
-      <a:schemeClr val="accent5"/>
-    </dgm:fillClrLst>
-    <dgm:linClrLst meth="repeat">
-      <a:schemeClr val="lt1"/>
-    </dgm:linClrLst>
-    <dgm:effectClrLst/>
-    <dgm:txLinClrLst/>
-    <dgm:txFillClrLst/>
-    <dgm:txEffectClrLst/>
-  </dgm:styleLbl>
-  <dgm:styleLbl name="parChTrans2D1">
-    <dgm:fillClrLst meth="repeat">
-      <a:schemeClr val="accent2"/>
-    </dgm:fillClrLst>
-    <dgm:linClrLst meth="repeat">
-      <a:schemeClr val="lt1"/>
-    </dgm:linClrLst>
-    <dgm:effectClrLst/>
-    <dgm:txLinClrLst/>
-    <dgm:txFillClrLst meth="repeat">
-      <a:schemeClr val="lt1"/>
-    </dgm:txFillClrLst>
-    <dgm:txEffectClrLst/>
-  </dgm:styleLbl>
-  <dgm:styleLbl name="parChTrans2D2">
-    <dgm:fillClrLst meth="repeat">
-      <a:schemeClr val="accent3"/>
-    </dgm:fillClrLst>
-    <dgm:linClrLst meth="repeat">
-      <a:schemeClr val="lt1"/>
-    </dgm:linClrLst>
-    <dgm:effectClrLst/>
-    <dgm:txLinClrLst/>
-    <dgm:txFillClrLst/>
-    <dgm:txEffectClrLst/>
-  </dgm:styleLbl>
-  <dgm:styleLbl name="parChTrans2D3">
-    <dgm:fillClrLst meth="repeat">
-      <a:schemeClr val="accent4"/>
-    </dgm:fillClrLst>
-    <dgm:linClrLst meth="repeat">
-      <a:schemeClr val="lt1"/>
-    </dgm:linClrLst>
-    <dgm:effectClrLst/>
-    <dgm:txLinClrLst/>
-    <dgm:txFillClrLst/>
-    <dgm:txEffectClrLst/>
-  </dgm:styleLbl>
-  <dgm:styleLbl name="parChTrans2D4">
-    <dgm:fillClrLst meth="repeat">
-      <a:schemeClr val="accent5"/>
-    </dgm:fillClrLst>
-    <dgm:linClrLst meth="repeat">
-      <a:schemeClr val="lt1"/>
-    </dgm:linClrLst>
-    <dgm:effectClrLst/>
-    <dgm:txLinClrLst/>
-    <dgm:txFillClrLst meth="repeat">
-      <a:schemeClr val="lt1"/>
-    </dgm:txFillClrLst>
-    <dgm:txEffectClrLst/>
-  </dgm:styleLbl>
-  <dgm:styleLbl name="parChTrans1D1">
-    <dgm:fillClrLst meth="repeat">
-      <a:schemeClr val="accent2"/>
-    </dgm:fillClrLst>
-    <dgm:linClrLst meth="repeat">
-      <a:schemeClr val="accent1"/>
-    </dgm:linClrLst>
-    <dgm:effectClrLst/>
-    <dgm:txLinClrLst/>
-    <dgm:txFillClrLst meth="repeat">
-      <a:schemeClr val="tx1"/>
-    </dgm:txFillClrLst>
-    <dgm:txEffectClrLst/>
-  </dgm:styleLbl>
-  <dgm:styleLbl name="parChTrans1D2">
-    <dgm:fillClrLst meth="repeat">
-      <a:schemeClr val="accent3">
-        <a:tint val="90000"/>
-      </a:schemeClr>
-    </dgm:fillClrLst>
-    <dgm:linClrLst meth="repeat">
-      <a:schemeClr val="accent2"/>
-    </dgm:linClrLst>
-    <dgm:effectClrLst/>
-    <dgm:txLinClrLst/>
-    <dgm:txFillClrLst meth="repeat">
-      <a:schemeClr val="tx1"/>
-    </dgm:txFillClrLst>
-    <dgm:txEffectClrLst/>
-  </dgm:styleLbl>
-  <dgm:styleLbl name="parChTrans1D3">
-    <dgm:fillClrLst meth="repeat">
-      <a:schemeClr val="accent4">
-        <a:tint val="70000"/>
-      </a:schemeClr>
-    </dgm:fillClrLst>
-    <dgm:linClrLst meth="repeat">
-      <a:schemeClr val="accent3"/>
-    </dgm:linClrLst>
-    <dgm:effectClrLst/>
-    <dgm:txLinClrLst/>
-    <dgm:txFillClrLst meth="repeat">
-      <a:schemeClr val="tx1"/>
-    </dgm:txFillClrLst>
-    <dgm:txEffectClrLst/>
-  </dgm:styleLbl>
-  <dgm:styleLbl name="parChTrans1D4">
-    <dgm:fillClrLst meth="repeat">
-      <a:schemeClr val="accent5">
-        <a:tint val="50000"/>
-      </a:schemeClr>
-    </dgm:fillClrLst>
-    <dgm:linClrLst meth="repeat">
-      <a:schemeClr val="accent4"/>
-    </dgm:linClrLst>
-    <dgm:effectClrLst/>
-    <dgm:txLinClrLst/>
-    <dgm:txFillClrLst meth="repeat">
-      <a:schemeClr val="tx1"/>
-    </dgm:txFillClrLst>
-    <dgm:txEffectClrLst/>
-  </dgm:styleLbl>
-  <dgm:styleLbl name="fgAcc1">
-    <dgm:fillClrLst meth="repeat">
-      <a:schemeClr val="lt1">
-        <a:alpha val="90000"/>
-      </a:schemeClr>
-    </dgm:fillClrLst>
-    <dgm:linClrLst meth="repeat">
-      <a:schemeClr val="accent2"/>
-      <a:schemeClr val="accent3"/>
-      <a:schemeClr val="accent4"/>
-      <a:schemeClr val="accent5"/>
-      <a:schemeClr val="accent6"/>
-    </dgm:linClrLst>
-    <dgm:effectClrLst/>
-    <dgm:txLinClrLst/>
-    <dgm:txFillClrLst meth="repeat">
-      <a:schemeClr val="dk1"/>
-    </dgm:txFillClrLst>
-    <dgm:txEffectClrLst/>
-  </dgm:styleLbl>
-  <dgm:styleLbl name="conFgAcc1">
-    <dgm:fillClrLst meth="repeat">
-      <a:schemeClr val="lt1">
-        <a:alpha val="90000"/>
-      </a:schemeClr>
-    </dgm:fillClrLst>
-    <dgm:linClrLst meth="repeat">
-      <a:schemeClr val="accent2"/>
-      <a:schemeClr val="accent3"/>
-      <a:schemeClr val="accent4"/>
-      <a:schemeClr val="accent5"/>
-      <a:schemeClr val="accent6"/>
-    </dgm:linClrLst>
-    <dgm:effectClrLst/>
-    <dgm:txLinClrLst/>
-    <dgm:txFillClrLst meth="repeat">
-      <a:schemeClr val="dk1"/>
-    </dgm:txFillClrLst>
-    <dgm:txEffectClrLst/>
-  </dgm:styleLbl>
-  <dgm:styleLbl name="alignAcc1">
-    <dgm:fillClrLst meth="repeat">
-      <a:schemeClr val="lt1">
-        <a:alpha val="90000"/>
-      </a:schemeClr>
-    </dgm:fillClrLst>
-    <dgm:linClrLst meth="repeat">
-      <a:schemeClr val="accent2"/>
-      <a:schemeClr val="accent3"/>
-      <a:schemeClr val="accent4"/>
-      <a:schemeClr val="accent5"/>
-      <a:schemeClr val="accent6"/>
-    </dgm:linClrLst>
-    <dgm:effectClrLst/>
-    <dgm:txLinClrLst/>
-    <dgm:txFillClrLst meth="repeat">
-      <a:schemeClr val="dk1"/>
-    </dgm:txFillClrLst>
-    <dgm:txEffectClrLst/>
-  </dgm:styleLbl>
-  <dgm:styleLbl name="trAlignAcc1">
-    <dgm:fillClrLst meth="repeat">
-      <a:schemeClr val="lt1">
-        <a:alpha val="40000"/>
-      </a:schemeClr>
-    </dgm:fillClrLst>
-    <dgm:linClrLst meth="repeat">
-      <a:schemeClr val="accent1"/>
-    </dgm:linClrLst>
-    <dgm:effectClrLst/>
-    <dgm:txLinClrLst/>
-    <dgm:txFillClrLst meth="repeat">
-      <a:schemeClr val="dk1"/>
-    </dgm:txFillClrLst>
-    <dgm:txEffectClrLst/>
-  </dgm:styleLbl>
-  <dgm:styleLbl name="bgAcc1">
-    <dgm:fillClrLst meth="repeat">
-      <a:schemeClr val="lt1">
-        <a:alpha val="90000"/>
-      </a:schemeClr>
-    </dgm:fillClrLst>
-    <dgm:linClrLst meth="repeat">
-      <a:schemeClr val="accent2"/>
-      <a:schemeClr val="accent3"/>
-      <a:schemeClr val="accent4"/>
-      <a:schemeClr val="accent5"/>
-      <a:schemeClr val="accent6"/>
-    </dgm:linClrLst>
-    <dgm:effectClrLst/>
-    <dgm:txLinClrLst/>
-    <dgm:txFillClrLst meth="repeat">
-      <a:schemeClr val="dk1"/>
-    </dgm:txFillClrLst>
-    <dgm:txEffectClrLst/>
-  </dgm:styleLbl>
-  <dgm:styleLbl name="solidFgAcc1">
-    <dgm:fillClrLst meth="repeat">
-      <a:schemeClr val="lt1"/>
-    </dgm:fillClrLst>
-    <dgm:linClrLst meth="repeat">
-      <a:schemeClr val="accent2"/>
-      <a:schemeClr val="accent3"/>
-      <a:schemeClr val="accent4"/>
-      <a:schemeClr val="accent5"/>
-      <a:schemeClr val="accent6"/>
-    </dgm:linClrLst>
-    <dgm:effectClrLst/>
-    <dgm:txLinClrLst/>
-    <dgm:txFillClrLst meth="repeat">
-      <a:schemeClr val="dk1"/>
-    </dgm:txFillClrLst>
-    <dgm:txEffectClrLst/>
-  </dgm:styleLbl>
-  <dgm:styleLbl name="solidAlignAcc1">
-    <dgm:fillClrLst meth="repeat">
-      <a:schemeClr val="lt1"/>
-    </dgm:fillClrLst>
-    <dgm:linClrLst meth="repeat">
-      <a:schemeClr val="accent2"/>
-      <a:schemeClr val="accent3"/>
-      <a:schemeClr val="accent4"/>
-      <a:schemeClr val="accent5"/>
-      <a:schemeClr val="accent6"/>
-    </dgm:linClrLst>
-    <dgm:effectClrLst/>
-    <dgm:txLinClrLst/>
-    <dgm:txFillClrLst meth="repeat">
-      <a:schemeClr val="dk1"/>
-    </dgm:txFillClrLst>
-    <dgm:txEffectClrLst/>
-  </dgm:styleLbl>
-  <dgm:styleLbl name="solidBgAcc1">
-    <dgm:fillClrLst meth="repeat">
-      <a:schemeClr val="lt1"/>
-    </dgm:fillClrLst>
-    <dgm:linClrLst meth="repeat">
-      <a:schemeClr val="accent2"/>
-      <a:schemeClr val="accent3"/>
-      <a:schemeClr val="accent4"/>
-      <a:schemeClr val="accent5"/>
-      <a:schemeClr val="accent6"/>
-    </dgm:linClrLst>
-    <dgm:effectClrLst/>
-    <dgm:txLinClrLst/>
-    <dgm:txFillClrLst meth="repeat">
-      <a:schemeClr val="dk1"/>
-    </dgm:txFillClrLst>
-    <dgm:txEffectClrLst/>
-  </dgm:styleLbl>
-  <dgm:styleLbl name="fgAccFollowNode1">
-    <dgm:fillClrLst meth="repeat">
-      <a:schemeClr val="accent2">
-        <a:tint val="40000"/>
-        <a:alpha val="90000"/>
-      </a:schemeClr>
-      <a:schemeClr val="accent3">
-        <a:tint val="40000"/>
-        <a:alpha val="90000"/>
-      </a:schemeClr>
-      <a:schemeClr val="accent4">
-        <a:tint val="40000"/>
-        <a:alpha val="90000"/>
-      </a:schemeClr>
-      <a:schemeClr val="accent5">
-        <a:tint val="40000"/>
-        <a:alpha val="90000"/>
-      </a:schemeClr>
-      <a:schemeClr val="accent6">
-        <a:tint val="40000"/>
-        <a:alpha val="90000"/>
-      </a:schemeClr>
-    </dgm:fillClrLst>
-    <dgm:linClrLst meth="repeat">
-      <a:schemeClr val="accent2">
-        <a:tint val="40000"/>
-        <a:alpha val="90000"/>
-      </a:schemeClr>
-      <a:schemeClr val="accent3">
-        <a:tint val="40000"/>
-        <a:alpha val="90000"/>
-      </a:schemeClr>
-      <a:schemeClr val="accent4">
-        <a:tint val="40000"/>
-        <a:alpha val="90000"/>
-      </a:schemeClr>
-      <a:schemeClr val="accent5">
-        <a:tint val="40000"/>
-        <a:alpha val="90000"/>
-      </a:schemeClr>
-      <a:schemeClr val="accent6">
-        <a:tint val="40000"/>
-        <a:alpha val="90000"/>
-      </a:schemeClr>
-    </dgm:linClrLst>
-    <dgm:effectClrLst/>
-    <dgm:txLinClrLst/>
-    <dgm:txFillClrLst meth="repeat">
-      <a:schemeClr val="dk1"/>
-    </dgm:txFillClrLst>
-    <dgm:txEffectClrLst/>
-  </dgm:styleLbl>
-  <dgm:styleLbl name="alignAccFollowNode1">
-    <dgm:fillClrLst meth="repeat">
-      <a:schemeClr val="accent2">
-        <a:tint val="40000"/>
-        <a:alpha val="90000"/>
-      </a:schemeClr>
-      <a:schemeClr val="accent3">
-        <a:tint val="40000"/>
-        <a:alpha val="90000"/>
-      </a:schemeClr>
-      <a:schemeClr val="accent4">
-        <a:tint val="40000"/>
-        <a:alpha val="90000"/>
-      </a:schemeClr>
-      <a:schemeClr val="accent5">
-        <a:tint val="40000"/>
-        <a:alpha val="90000"/>
-      </a:schemeClr>
-      <a:schemeClr val="accent6">
-        <a:tint val="40000"/>
-        <a:alpha val="90000"/>
-      </a:schemeClr>
-    </dgm:fillClrLst>
-    <dgm:linClrLst meth="repeat">
-      <a:schemeClr val="accent2">
-        <a:tint val="40000"/>
-        <a:alpha val="90000"/>
-      </a:schemeClr>
-      <a:schemeClr val="accent3">
-        <a:tint val="40000"/>
-        <a:alpha val="90000"/>
-      </a:schemeClr>
-      <a:schemeClr val="accent4">
-        <a:tint val="40000"/>
-        <a:alpha val="90000"/>
-      </a:schemeClr>
-      <a:schemeClr val="accent5">
-        <a:tint val="40000"/>
-        <a:alpha val="90000"/>
-      </a:schemeClr>
-      <a:schemeClr val="accent6">
-        <a:tint val="40000"/>
-        <a:alpha val="90000"/>
-      </a:schemeClr>
-    </dgm:linClrLst>
-    <dgm:effectClrLst/>
-    <dgm:txLinClrLst/>
-    <dgm:txFillClrLst meth="repeat">
-      <a:schemeClr val="dk1"/>
-    </dgm:txFillClrLst>
-    <dgm:txEffectClrLst/>
-  </dgm:styleLbl>
-  <dgm:styleLbl name="bgAccFollowNode1">
-    <dgm:fillClrLst meth="repeat">
-      <a:schemeClr val="accent2">
-        <a:tint val="40000"/>
-        <a:alpha val="90000"/>
-      </a:schemeClr>
-      <a:schemeClr val="accent3">
-        <a:tint val="40000"/>
-        <a:alpha val="90000"/>
-      </a:schemeClr>
-      <a:schemeClr val="accent4">
-        <a:tint val="40000"/>
-        <a:alpha val="90000"/>
-      </a:schemeClr>
-      <a:schemeClr val="accent5">
-        <a:tint val="40000"/>
-        <a:alpha val="90000"/>
-      </a:schemeClr>
-      <a:schemeClr val="accent6">
-        <a:tint val="40000"/>
-        <a:alpha val="90000"/>
-      </a:schemeClr>
-    </dgm:fillClrLst>
-    <dgm:linClrLst meth="repeat">
-      <a:schemeClr val="accent2">
-        <a:tint val="40000"/>
-        <a:alpha val="90000"/>
-      </a:schemeClr>
-      <a:schemeClr val="accent3">
-        <a:tint val="40000"/>
-        <a:alpha val="90000"/>
-      </a:schemeClr>
-      <a:schemeClr val="accent4">
-        <a:tint val="40000"/>
-        <a:alpha val="90000"/>
-      </a:schemeClr>
-      <a:schemeClr val="accent5">
-        <a:tint val="40000"/>
-        <a:alpha val="90000"/>
-      </a:schemeClr>
-      <a:schemeClr val="accent6">
-        <a:tint val="40000"/>
-        <a:alpha val="90000"/>
-      </a:schemeClr>
-    </dgm:linClrLst>
-    <dgm:effectClrLst/>
-    <dgm:txLinClrLst/>
-    <dgm:txFillClrLst meth="repeat">
-      <a:schemeClr val="dk1"/>
-    </dgm:txFillClrLst>
-    <dgm:txEffectClrLst/>
-  </dgm:styleLbl>
-  <dgm:styleLbl name="fgAcc0">
-    <dgm:fillClrLst meth="repeat">
-      <a:schemeClr val="lt1">
-        <a:alpha val="90000"/>
-      </a:schemeClr>
-    </dgm:fillClrLst>
-    <dgm:linClrLst>
-      <a:schemeClr val="accent1"/>
-    </dgm:linClrLst>
-    <dgm:effectClrLst/>
-    <dgm:txLinClrLst/>
-    <dgm:txFillClrLst meth="repeat">
-      <a:schemeClr val="dk1"/>
-    </dgm:txFillClrLst>
-    <dgm:txEffectClrLst/>
-  </dgm:styleLbl>
-  <dgm:styleLbl name="fgAcc2">
-    <dgm:fillClrLst meth="repeat">
-      <a:schemeClr val="lt1">
-        <a:alpha val="90000"/>
-      </a:schemeClr>
-    </dgm:fillClrLst>
-    <dgm:linClrLst>
-      <a:schemeClr val="accent2"/>
-    </dgm:linClrLst>
-    <dgm:effectClrLst/>
-    <dgm:txLinClrLst/>
-    <dgm:txFillClrLst meth="repeat">
-      <a:schemeClr val="dk1"/>
-    </dgm:txFillClrLst>
-    <dgm:txEffectClrLst/>
-  </dgm:styleLbl>
-  <dgm:styleLbl name="fgAcc3">
-    <dgm:fillClrLst meth="repeat">
-      <a:schemeClr val="lt1">
-        <a:alpha val="90000"/>
-      </a:schemeClr>
-    </dgm:fillClrLst>
-    <dgm:linClrLst>
-      <a:schemeClr val="accent3"/>
-    </dgm:linClrLst>
-    <dgm:effectClrLst/>
-    <dgm:txLinClrLst/>
-    <dgm:txFillClrLst meth="repeat">
-      <a:schemeClr val="dk1"/>
-    </dgm:txFillClrLst>
-    <dgm:txEffectClrLst/>
-  </dgm:styleLbl>
-  <dgm:styleLbl name="fgAcc4">
-    <dgm:fillClrLst meth="repeat">
-      <a:schemeClr val="lt1">
-        <a:alpha val="90000"/>
-      </a:schemeClr>
-    </dgm:fillClrLst>
-    <dgm:linClrLst>
-      <a:schemeClr val="accent4"/>
-    </dgm:linClrLst>
-    <dgm:effectClrLst/>
-    <dgm:txLinClrLst/>
-    <dgm:txFillClrLst meth="repeat">
-      <a:schemeClr val="dk1"/>
-    </dgm:txFillClrLst>
-    <dgm:txEffectClrLst/>
-  </dgm:styleLbl>
-  <dgm:styleLbl name="bgShp">
-    <dgm:fillClrLst meth="repeat">
-      <a:schemeClr val="bg1">
-        <a:lumMod val="95000"/>
-      </a:schemeClr>
-    </dgm:fillClrLst>
-    <dgm:linClrLst meth="repeat">
-      <a:schemeClr val="dk1"/>
-    </dgm:linClrLst>
-    <dgm:effectClrLst/>
-    <dgm:txLinClrLst/>
-    <dgm:txFillClrLst meth="repeat">
-      <a:schemeClr val="dk1"/>
-    </dgm:txFillClrLst>
-    <dgm:txEffectClrLst/>
-  </dgm:styleLbl>
-  <dgm:styleLbl name="dkBgShp">
-    <dgm:fillClrLst meth="repeat">
-      <a:schemeClr val="accent2">
-        <a:shade val="90000"/>
-      </a:schemeClr>
-    </dgm:fillClrLst>
-    <dgm:linClrLst meth="repeat">
-      <a:schemeClr val="dk1"/>
-    </dgm:linClrLst>
-    <dgm:effectClrLst/>
-    <dgm:txLinClrLst/>
-    <dgm:txFillClrLst meth="repeat">
-      <a:schemeClr val="lt1"/>
-    </dgm:txFillClrLst>
-    <dgm:txEffectClrLst/>
-  </dgm:styleLbl>
-  <dgm:styleLbl name="trBgShp">
-    <dgm:fillClrLst meth="repeat">
-      <a:schemeClr val="accent1">
-        <a:tint val="50000"/>
-        <a:alpha val="40000"/>
-      </a:schemeClr>
-    </dgm:fillClrLst>
-    <dgm:linClrLst meth="repeat">
-      <a:schemeClr val="accent2"/>
-    </dgm:linClrLst>
-    <dgm:effectClrLst/>
-    <dgm:txLinClrLst/>
-    <dgm:txFillClrLst meth="repeat">
-      <a:schemeClr val="lt1"/>
-    </dgm:txFillClrLst>
-    <dgm:txEffectClrLst/>
-  </dgm:styleLbl>
-  <dgm:styleLbl name="fgShp">
-    <dgm:fillClrLst meth="repeat">
-      <a:schemeClr val="accent2">
-        <a:tint val="40000"/>
-      </a:schemeClr>
-    </dgm:fillClrLst>
-    <dgm:linClrLst meth="repeat">
-      <a:schemeClr val="lt1"/>
-    </dgm:linClrLst>
-    <dgm:effectClrLst/>
-    <dgm:txLinClrLst/>
-    <dgm:txFillClrLst meth="repeat">
-      <a:schemeClr val="dk1"/>
-    </dgm:txFillClrLst>
-    <dgm:txEffectClrLst/>
-  </dgm:styleLbl>
-  <dgm:styleLbl name="revTx">
-    <dgm:fillClrLst meth="repeat">
-      <a:schemeClr val="lt1">
-        <a:alpha val="0"/>
-      </a:schemeClr>
-    </dgm:fillClrLst>
-    <dgm:linClrLst meth="repeat">
-      <a:schemeClr val="dk1">
-        <a:alpha val="0"/>
-      </a:schemeClr>
-    </dgm:linClrLst>
-    <dgm:effectClrLst/>
-    <dgm:txLinClrLst/>
-    <dgm:txFillClrLst meth="repeat">
-      <a:schemeClr val="tx1"/>
-    </dgm:txFillClrLst>
-    <dgm:txEffectClrLst/>
-  </dgm:styleLbl>
-</dgm:colorsDef>
-</file>
-
-<file path=ppt/diagrams/data1.xml><?xml version="1.0" encoding="utf-8"?>
-<dgm:dataModel xmlns:dgm="http://schemas.openxmlformats.org/drawingml/2006/diagram" xmlns:a="http://schemas.openxmlformats.org/drawingml/2006/main">
-  <dgm:ptLst>
-    <dgm:pt modelId="{00AA18DD-DC18-435A-BFEB-E15A435A401D}" type="doc">
-      <dgm:prSet loTypeId="urn:microsoft.com/office/officeart/2018/2/layout/IconLabelDescriptionList" loCatId="icon" qsTypeId="urn:microsoft.com/office/officeart/2005/8/quickstyle/simple1" qsCatId="simple" csTypeId="urn:microsoft.com/office/officeart/2018/5/colors/Iconchunking_neutralbg_colorful1" csCatId="colorful" phldr="1"/>
-      <dgm:spPr/>
-      <dgm:t>
-        <a:bodyPr/>
-        <a:lstStyle/>
-        <a:p>
-          <a:endParaRPr lang="en-US"/>
-        </a:p>
-      </dgm:t>
-    </dgm:pt>
-    <dgm:pt modelId="{5939F075-45B6-4DEB-B70E-EE7706BDF349}">
-      <dgm:prSet/>
-      <dgm:spPr/>
-      <dgm:t>
-        <a:bodyPr/>
-        <a:lstStyle/>
-        <a:p>
-          <a:pPr>
-            <a:defRPr b="1"/>
-          </a:pPr>
-          <a:r>
-            <a:rPr lang="en-US"/>
-            <a:t>My main message to you:</a:t>
-          </a:r>
-        </a:p>
-      </dgm:t>
-    </dgm:pt>
-    <dgm:pt modelId="{26F23207-64F8-427C-935E-16352CB49084}" type="parTrans" cxnId="{E5DCE7C3-7535-47C0-8CC5-68CDC86BF6A8}">
-      <dgm:prSet/>
-      <dgm:spPr/>
-      <dgm:t>
-        <a:bodyPr/>
-        <a:lstStyle/>
-        <a:p>
-          <a:endParaRPr lang="en-US"/>
-        </a:p>
-      </dgm:t>
-    </dgm:pt>
-    <dgm:pt modelId="{54D312CA-7094-4C79-9CEE-3FBC3D825219}" type="sibTrans" cxnId="{E5DCE7C3-7535-47C0-8CC5-68CDC86BF6A8}">
-      <dgm:prSet/>
-      <dgm:spPr/>
-      <dgm:t>
-        <a:bodyPr/>
-        <a:lstStyle/>
-        <a:p>
-          <a:endParaRPr lang="en-US"/>
-        </a:p>
-      </dgm:t>
-    </dgm:pt>
-    <dgm:pt modelId="{2D0573B8-0547-436E-85F9-E5419822E891}">
-      <dgm:prSet/>
-      <dgm:spPr/>
-      <dgm:t>
-        <a:bodyPr/>
-        <a:lstStyle/>
-        <a:p>
-          <a:pPr>
-            <a:defRPr b="1"/>
-          </a:pPr>
-          <a:r>
-            <a:rPr lang="en-US"/>
-            <a:t>Question 1 because blah</a:t>
-          </a:r>
-        </a:p>
-      </dgm:t>
-    </dgm:pt>
-    <dgm:pt modelId="{9A870BC6-6104-4C16-8D5C-D4615CE9A296}" type="parTrans" cxnId="{4EBB52FD-990A-47B1-AC11-C11AED264129}">
-      <dgm:prSet/>
-      <dgm:spPr/>
-      <dgm:t>
-        <a:bodyPr/>
-        <a:lstStyle/>
-        <a:p>
-          <a:endParaRPr lang="en-US"/>
-        </a:p>
-      </dgm:t>
-    </dgm:pt>
-    <dgm:pt modelId="{5333A5C4-C116-4240-8838-F93F01818AB5}" type="sibTrans" cxnId="{4EBB52FD-990A-47B1-AC11-C11AED264129}">
-      <dgm:prSet/>
-      <dgm:spPr/>
-      <dgm:t>
-        <a:bodyPr/>
-        <a:lstStyle/>
-        <a:p>
-          <a:endParaRPr lang="en-US"/>
-        </a:p>
-      </dgm:t>
-    </dgm:pt>
-    <dgm:pt modelId="{2AF13D63-5BB0-4633-980E-E713F1CBF5F6}">
-      <dgm:prSet/>
-      <dgm:spPr/>
-      <dgm:t>
-        <a:bodyPr/>
-        <a:lstStyle/>
-        <a:p>
-          <a:pPr>
-            <a:defRPr b="1"/>
-          </a:pPr>
-          <a:r>
-            <a:rPr lang="en-US"/>
-            <a:t>Question 2 because double blah</a:t>
-          </a:r>
-        </a:p>
-      </dgm:t>
-    </dgm:pt>
-    <dgm:pt modelId="{CE8AD715-2894-425E-BE95-08FB4C5702E4}" type="parTrans" cxnId="{D7AA73DA-476E-420D-B8B2-8A5D8A328B12}">
-      <dgm:prSet/>
-      <dgm:spPr/>
-      <dgm:t>
-        <a:bodyPr/>
-        <a:lstStyle/>
-        <a:p>
-          <a:endParaRPr lang="en-US"/>
-        </a:p>
-      </dgm:t>
-    </dgm:pt>
-    <dgm:pt modelId="{44E9DDE1-374F-4C52-B9CF-128AA76B1E6A}" type="sibTrans" cxnId="{D7AA73DA-476E-420D-B8B2-8A5D8A328B12}">
-      <dgm:prSet/>
-      <dgm:spPr/>
-      <dgm:t>
-        <a:bodyPr/>
-        <a:lstStyle/>
-        <a:p>
-          <a:endParaRPr lang="en-US"/>
-        </a:p>
-      </dgm:t>
-    </dgm:pt>
-    <dgm:pt modelId="{F1D65EAD-CCEB-4F7B-B661-D4A76FA40888}">
-      <dgm:prSet/>
-      <dgm:spPr/>
-      <dgm:t>
-        <a:bodyPr/>
-        <a:lstStyle/>
-        <a:p>
-          <a:pPr>
-            <a:defRPr b="1"/>
-          </a:pPr>
-          <a:r>
-            <a:rPr lang="en-US"/>
-            <a:t>I answered both questions</a:t>
-          </a:r>
-        </a:p>
-      </dgm:t>
-    </dgm:pt>
-    <dgm:pt modelId="{2318A56F-CE9B-4B80-999E-4BE1E7577C0D}" type="parTrans" cxnId="{2A44D5AB-6534-43AB-950E-D60B6354D10B}">
-      <dgm:prSet/>
-      <dgm:spPr/>
-      <dgm:t>
-        <a:bodyPr/>
-        <a:lstStyle/>
-        <a:p>
-          <a:endParaRPr lang="en-US"/>
-        </a:p>
-      </dgm:t>
-    </dgm:pt>
-    <dgm:pt modelId="{D4B6D6B5-D46E-4EA5-BB83-9BD79132BB0F}" type="sibTrans" cxnId="{2A44D5AB-6534-43AB-950E-D60B6354D10B}">
-      <dgm:prSet/>
-      <dgm:spPr/>
-      <dgm:t>
-        <a:bodyPr/>
-        <a:lstStyle/>
-        <a:p>
-          <a:endParaRPr lang="en-US"/>
-        </a:p>
-      </dgm:t>
-    </dgm:pt>
-    <dgm:pt modelId="{0F09E02A-4106-4A9F-9AF9-E71E5825274C}">
-      <dgm:prSet/>
-      <dgm:spPr/>
-      <dgm:t>
-        <a:bodyPr/>
-        <a:lstStyle/>
-        <a:p>
-          <a:r>
-            <a:rPr lang="en-US"/>
-            <a:t>Q1: blah^2</a:t>
-          </a:r>
-        </a:p>
-      </dgm:t>
-    </dgm:pt>
-    <dgm:pt modelId="{9002D101-0AEB-4306-8CD6-597035D25BB7}" type="parTrans" cxnId="{F0BDD4B5-D6A1-4F64-A091-DA34969B2115}">
-      <dgm:prSet/>
-      <dgm:spPr/>
-      <dgm:t>
-        <a:bodyPr/>
-        <a:lstStyle/>
-        <a:p>
-          <a:endParaRPr lang="en-US"/>
-        </a:p>
-      </dgm:t>
-    </dgm:pt>
-    <dgm:pt modelId="{288041A4-480F-4294-85D3-64FE5F3F35A9}" type="sibTrans" cxnId="{F0BDD4B5-D6A1-4F64-A091-DA34969B2115}">
-      <dgm:prSet/>
-      <dgm:spPr/>
-      <dgm:t>
-        <a:bodyPr/>
-        <a:lstStyle/>
-        <a:p>
-          <a:endParaRPr lang="en-US"/>
-        </a:p>
-      </dgm:t>
-    </dgm:pt>
-    <dgm:pt modelId="{0079B860-66A2-48B2-A1AF-ECBCBAB2C75C}">
-      <dgm:prSet/>
-      <dgm:spPr/>
-      <dgm:t>
-        <a:bodyPr/>
-        <a:lstStyle/>
-        <a:p>
-          <a:r>
-            <a:rPr lang="en-US"/>
-            <a:t>Q2: blah^3</a:t>
-          </a:r>
-        </a:p>
-      </dgm:t>
-    </dgm:pt>
-    <dgm:pt modelId="{CED48826-4BD3-4DD5-B195-97ABE708BC42}" type="parTrans" cxnId="{45011D0D-CEC9-4175-979C-9EE117243E28}">
-      <dgm:prSet/>
-      <dgm:spPr/>
-      <dgm:t>
-        <a:bodyPr/>
-        <a:lstStyle/>
-        <a:p>
-          <a:endParaRPr lang="en-US"/>
-        </a:p>
-      </dgm:t>
-    </dgm:pt>
-    <dgm:pt modelId="{10B434A8-26CD-4075-B494-695CA1AF060A}" type="sibTrans" cxnId="{45011D0D-CEC9-4175-979C-9EE117243E28}">
-      <dgm:prSet/>
-      <dgm:spPr/>
-      <dgm:t>
-        <a:bodyPr/>
-        <a:lstStyle/>
-        <a:p>
-          <a:endParaRPr lang="en-US"/>
-        </a:p>
-      </dgm:t>
-    </dgm:pt>
-    <dgm:pt modelId="{471930FC-C4CB-42BE-A3F0-5843696B30B0}">
-      <dgm:prSet/>
-      <dgm:spPr/>
-      <dgm:t>
-        <a:bodyPr/>
-        <a:lstStyle/>
-        <a:p>
-          <a:pPr>
-            <a:defRPr b="1"/>
-          </a:pPr>
-          <a:r>
-            <a:rPr lang="en-US"/>
-            <a:t>Here is what I found overall:</a:t>
-          </a:r>
-        </a:p>
-      </dgm:t>
-    </dgm:pt>
-    <dgm:pt modelId="{E73404B5-3C76-4234-9F4F-58B0733A00B3}" type="parTrans" cxnId="{A9E47F06-03B3-43EB-8761-A8B327E8DA33}">
-      <dgm:prSet/>
-      <dgm:spPr/>
-      <dgm:t>
-        <a:bodyPr/>
-        <a:lstStyle/>
-        <a:p>
-          <a:endParaRPr lang="en-US"/>
-        </a:p>
-      </dgm:t>
-    </dgm:pt>
-    <dgm:pt modelId="{5A4F0E5D-54F1-4C02-9024-EADE7D39CEF5}" type="sibTrans" cxnId="{A9E47F06-03B3-43EB-8761-A8B327E8DA33}">
-      <dgm:prSet/>
-      <dgm:spPr/>
-      <dgm:t>
-        <a:bodyPr/>
-        <a:lstStyle/>
-        <a:p>
-          <a:endParaRPr lang="en-US"/>
-        </a:p>
-      </dgm:t>
-    </dgm:pt>
-    <dgm:pt modelId="{15D256E9-DE7B-4D2C-8E8F-738377FA151C}">
-      <dgm:prSet/>
-      <dgm:spPr/>
-      <dgm:t>
-        <a:bodyPr/>
-        <a:lstStyle/>
-        <a:p>
-          <a:r>
-            <a:rPr lang="en-US"/>
-            <a:t>Blah is boring</a:t>
-          </a:r>
-        </a:p>
-      </dgm:t>
-    </dgm:pt>
-    <dgm:pt modelId="{7B7B563D-5A9E-4074-9250-72259BD87B00}" type="parTrans" cxnId="{4BE662D9-BD5E-4B05-B8FA-265A676AE22B}">
-      <dgm:prSet/>
-      <dgm:spPr/>
-      <dgm:t>
-        <a:bodyPr/>
-        <a:lstStyle/>
-        <a:p>
-          <a:endParaRPr lang="en-US"/>
-        </a:p>
-      </dgm:t>
-    </dgm:pt>
-    <dgm:pt modelId="{E55194DA-B5CA-4F85-AC30-26AA6A7AE39C}" type="sibTrans" cxnId="{4BE662D9-BD5E-4B05-B8FA-265A676AE22B}">
-      <dgm:prSet/>
-      <dgm:spPr/>
-      <dgm:t>
-        <a:bodyPr/>
-        <a:lstStyle/>
-        <a:p>
-          <a:endParaRPr lang="en-US"/>
-        </a:p>
-      </dgm:t>
-    </dgm:pt>
-    <dgm:pt modelId="{A842F729-F885-45D4-9AFB-BE231DF260DB}" type="pres">
-      <dgm:prSet presAssocID="{00AA18DD-DC18-435A-BFEB-E15A435A401D}" presName="root" presStyleCnt="0">
-        <dgm:presLayoutVars>
-          <dgm:dir/>
-          <dgm:resizeHandles val="exact"/>
-        </dgm:presLayoutVars>
-      </dgm:prSet>
-      <dgm:spPr/>
-    </dgm:pt>
-    <dgm:pt modelId="{706F56CE-2E26-459D-850F-34B62D231914}" type="pres">
-      <dgm:prSet presAssocID="{5939F075-45B6-4DEB-B70E-EE7706BDF349}" presName="compNode" presStyleCnt="0"/>
-      <dgm:spPr/>
-    </dgm:pt>
-    <dgm:pt modelId="{AC9BBE39-9A1C-4538-B245-CA9DAC603508}" type="pres">
-      <dgm:prSet presAssocID="{5939F075-45B6-4DEB-B70E-EE7706BDF349}" presName="iconRect" presStyleLbl="node1" presStyleIdx="0" presStyleCnt="5"/>
-      <dgm:spPr>
-        <a:blipFill>
-          <a:blip xmlns:r="http://schemas.openxmlformats.org/officeDocument/2006/relationships" r:embed="rId1">
-            <a:extLst>
-              <a:ext uri="{28A0092B-C50C-407E-A947-70E740481C1C}">
-                <a14:useLocalDpi xmlns:a14="http://schemas.microsoft.com/office/drawing/2010/main" val="0"/>
-              </a:ext>
-              <a:ext uri="{96DAC541-7B7A-43D3-8B79-37D633B846F1}">
-                <asvg:svgBlip xmlns:asvg="http://schemas.microsoft.com/office/drawing/2016/SVG/main" r:embed="rId2"/>
-              </a:ext>
-            </a:extLst>
-          </a:blip>
-          <a:stretch>
-            <a:fillRect/>
-          </a:stretch>
-        </a:blipFill>
-        <a:ln>
-          <a:noFill/>
-        </a:ln>
-      </dgm:spPr>
-      <dgm:extLst>
-        <a:ext uri="{E40237B7-FDA0-4F09-8148-C483321AD2D9}">
-          <dgm14:cNvPr xmlns:dgm14="http://schemas.microsoft.com/office/drawing/2010/diagram" id="0" name="" descr="Chat Bubble"/>
-        </a:ext>
-      </dgm:extLst>
-    </dgm:pt>
-    <dgm:pt modelId="{B693E7DF-FEF7-497E-9680-CCD9B2ADDB56}" type="pres">
-      <dgm:prSet presAssocID="{5939F075-45B6-4DEB-B70E-EE7706BDF349}" presName="iconSpace" presStyleCnt="0"/>
-      <dgm:spPr/>
-    </dgm:pt>
-    <dgm:pt modelId="{E17D72C3-9370-4D46-B710-901E211CC61B}" type="pres">
-      <dgm:prSet presAssocID="{5939F075-45B6-4DEB-B70E-EE7706BDF349}" presName="parTx" presStyleLbl="revTx" presStyleIdx="0" presStyleCnt="10">
-        <dgm:presLayoutVars>
-          <dgm:chMax val="0"/>
-          <dgm:chPref val="0"/>
-        </dgm:presLayoutVars>
-      </dgm:prSet>
-      <dgm:spPr/>
-    </dgm:pt>
-    <dgm:pt modelId="{73AF1722-1D2A-4E01-873F-B117A022761F}" type="pres">
-      <dgm:prSet presAssocID="{5939F075-45B6-4DEB-B70E-EE7706BDF349}" presName="txSpace" presStyleCnt="0"/>
-      <dgm:spPr/>
-    </dgm:pt>
-    <dgm:pt modelId="{4FA3D6D6-B755-42D0-ACCA-F53949929100}" type="pres">
-      <dgm:prSet presAssocID="{5939F075-45B6-4DEB-B70E-EE7706BDF349}" presName="desTx" presStyleLbl="revTx" presStyleIdx="1" presStyleCnt="10">
-        <dgm:presLayoutVars/>
-      </dgm:prSet>
-      <dgm:spPr/>
-    </dgm:pt>
-    <dgm:pt modelId="{DB531199-C8A6-4024-AF01-63F91F84F64E}" type="pres">
-      <dgm:prSet presAssocID="{54D312CA-7094-4C79-9CEE-3FBC3D825219}" presName="sibTrans" presStyleCnt="0"/>
-      <dgm:spPr/>
-    </dgm:pt>
-    <dgm:pt modelId="{F8E50562-265A-4444-9B69-D5247BB11D8E}" type="pres">
-      <dgm:prSet presAssocID="{2D0573B8-0547-436E-85F9-E5419822E891}" presName="compNode" presStyleCnt="0"/>
-      <dgm:spPr/>
-    </dgm:pt>
-    <dgm:pt modelId="{4E697141-7461-4B19-BFBD-9571342C7908}" type="pres">
-      <dgm:prSet presAssocID="{2D0573B8-0547-436E-85F9-E5419822E891}" presName="iconRect" presStyleLbl="node1" presStyleIdx="1" presStyleCnt="5"/>
-      <dgm:spPr>
-        <a:blipFill>
-          <a:blip xmlns:r="http://schemas.openxmlformats.org/officeDocument/2006/relationships" r:embed="rId3">
-            <a:extLst>
-              <a:ext uri="{28A0092B-C50C-407E-A947-70E740481C1C}">
-                <a14:useLocalDpi xmlns:a14="http://schemas.microsoft.com/office/drawing/2010/main" val="0"/>
-              </a:ext>
-              <a:ext uri="{96DAC541-7B7A-43D3-8B79-37D633B846F1}">
-                <asvg:svgBlip xmlns:asvg="http://schemas.microsoft.com/office/drawing/2016/SVG/main" r:embed="rId4"/>
-              </a:ext>
-            </a:extLst>
-          </a:blip>
-          <a:stretch>
-            <a:fillRect/>
-          </a:stretch>
-        </a:blipFill>
-        <a:ln>
-          <a:noFill/>
-        </a:ln>
-      </dgm:spPr>
-      <dgm:extLst>
-        <a:ext uri="{E40237B7-FDA0-4F09-8148-C483321AD2D9}">
-          <dgm14:cNvPr xmlns:dgm14="http://schemas.microsoft.com/office/drawing/2010/diagram" id="0" name="" descr="Checkmark"/>
-        </a:ext>
-      </dgm:extLst>
-    </dgm:pt>
-    <dgm:pt modelId="{CFBB6C28-2BE4-48C6-B9F8-1CE4DFF1EB5C}" type="pres">
-      <dgm:prSet presAssocID="{2D0573B8-0547-436E-85F9-E5419822E891}" presName="iconSpace" presStyleCnt="0"/>
-      <dgm:spPr/>
-    </dgm:pt>
-    <dgm:pt modelId="{519DEAA8-AD07-4D95-A709-487D6F6DBC47}" type="pres">
-      <dgm:prSet presAssocID="{2D0573B8-0547-436E-85F9-E5419822E891}" presName="parTx" presStyleLbl="revTx" presStyleIdx="2" presStyleCnt="10">
-        <dgm:presLayoutVars>
-          <dgm:chMax val="0"/>
-          <dgm:chPref val="0"/>
-        </dgm:presLayoutVars>
-      </dgm:prSet>
-      <dgm:spPr/>
-    </dgm:pt>
-    <dgm:pt modelId="{6A5EA3C9-B406-4927-81F4-2B2D62F18E5D}" type="pres">
-      <dgm:prSet presAssocID="{2D0573B8-0547-436E-85F9-E5419822E891}" presName="txSpace" presStyleCnt="0"/>
-      <dgm:spPr/>
-    </dgm:pt>
-    <dgm:pt modelId="{45B21AD0-FF9B-45A9-A7E0-2986A6376C14}" type="pres">
-      <dgm:prSet presAssocID="{2D0573B8-0547-436E-85F9-E5419822E891}" presName="desTx" presStyleLbl="revTx" presStyleIdx="3" presStyleCnt="10">
-        <dgm:presLayoutVars/>
-      </dgm:prSet>
-      <dgm:spPr/>
-    </dgm:pt>
-    <dgm:pt modelId="{C137428B-089B-4816-8D33-FBE5DE6AF760}" type="pres">
-      <dgm:prSet presAssocID="{5333A5C4-C116-4240-8838-F93F01818AB5}" presName="sibTrans" presStyleCnt="0"/>
-      <dgm:spPr/>
-    </dgm:pt>
-    <dgm:pt modelId="{600148C9-DCC7-4AB8-BA17-108136255B06}" type="pres">
-      <dgm:prSet presAssocID="{2AF13D63-5BB0-4633-980E-E713F1CBF5F6}" presName="compNode" presStyleCnt="0"/>
-      <dgm:spPr/>
-    </dgm:pt>
-    <dgm:pt modelId="{4E705B27-4C60-4AC3-B95B-5B2208205940}" type="pres">
-      <dgm:prSet presAssocID="{2AF13D63-5BB0-4633-980E-E713F1CBF5F6}" presName="iconRect" presStyleLbl="node1" presStyleIdx="2" presStyleCnt="5"/>
-      <dgm:spPr>
-        <a:blipFill>
-          <a:blip xmlns:r="http://schemas.openxmlformats.org/officeDocument/2006/relationships" r:embed="rId5">
-            <a:extLst>
-              <a:ext uri="{28A0092B-C50C-407E-A947-70E740481C1C}">
-                <a14:useLocalDpi xmlns:a14="http://schemas.microsoft.com/office/drawing/2010/main" val="0"/>
-              </a:ext>
-              <a:ext uri="{96DAC541-7B7A-43D3-8B79-37D633B846F1}">
-                <asvg:svgBlip xmlns:asvg="http://schemas.microsoft.com/office/drawing/2016/SVG/main" r:embed="rId6"/>
-              </a:ext>
-            </a:extLst>
-          </a:blip>
-          <a:stretch>
-            <a:fillRect/>
-          </a:stretch>
-        </a:blipFill>
-        <a:ln>
-          <a:noFill/>
-        </a:ln>
-      </dgm:spPr>
-      <dgm:extLst>
-        <a:ext uri="{E40237B7-FDA0-4F09-8148-C483321AD2D9}">
-          <dgm14:cNvPr xmlns:dgm14="http://schemas.microsoft.com/office/drawing/2010/diagram" id="0" name="" descr="Help"/>
-        </a:ext>
-      </dgm:extLst>
-    </dgm:pt>
-    <dgm:pt modelId="{CDB5B1DE-A590-48B0-B027-0773BB6AB31A}" type="pres">
-      <dgm:prSet presAssocID="{2AF13D63-5BB0-4633-980E-E713F1CBF5F6}" presName="iconSpace" presStyleCnt="0"/>
-      <dgm:spPr/>
-    </dgm:pt>
-    <dgm:pt modelId="{E00D64F2-3E33-4A26-86F8-D465947064D3}" type="pres">
-      <dgm:prSet presAssocID="{2AF13D63-5BB0-4633-980E-E713F1CBF5F6}" presName="parTx" presStyleLbl="revTx" presStyleIdx="4" presStyleCnt="10">
-        <dgm:presLayoutVars>
-          <dgm:chMax val="0"/>
-          <dgm:chPref val="0"/>
-        </dgm:presLayoutVars>
-      </dgm:prSet>
-      <dgm:spPr/>
-    </dgm:pt>
-    <dgm:pt modelId="{71FBE365-2A18-4481-A087-3ACB5881C065}" type="pres">
-      <dgm:prSet presAssocID="{2AF13D63-5BB0-4633-980E-E713F1CBF5F6}" presName="txSpace" presStyleCnt="0"/>
-      <dgm:spPr/>
-    </dgm:pt>
-    <dgm:pt modelId="{F6704455-16A9-47CB-AA23-928C81482EAB}" type="pres">
-      <dgm:prSet presAssocID="{2AF13D63-5BB0-4633-980E-E713F1CBF5F6}" presName="desTx" presStyleLbl="revTx" presStyleIdx="5" presStyleCnt="10">
-        <dgm:presLayoutVars/>
-      </dgm:prSet>
-      <dgm:spPr/>
-    </dgm:pt>
-    <dgm:pt modelId="{5AB15FE2-3BC3-48B9-B47E-3B9712AE2BCD}" type="pres">
-      <dgm:prSet presAssocID="{44E9DDE1-374F-4C52-B9CF-128AA76B1E6A}" presName="sibTrans" presStyleCnt="0"/>
-      <dgm:spPr/>
-    </dgm:pt>
-    <dgm:pt modelId="{FD5C06D4-49CD-4FAB-A5DF-A4CF4E36BDD5}" type="pres">
-      <dgm:prSet presAssocID="{F1D65EAD-CCEB-4F7B-B661-D4A76FA40888}" presName="compNode" presStyleCnt="0"/>
-      <dgm:spPr/>
-    </dgm:pt>
-    <dgm:pt modelId="{DE3E83CD-D14F-4501-B087-743A0AC78DCC}" type="pres">
-      <dgm:prSet presAssocID="{F1D65EAD-CCEB-4F7B-B661-D4A76FA40888}" presName="iconRect" presStyleLbl="node1" presStyleIdx="3" presStyleCnt="5"/>
-      <dgm:spPr>
-        <a:blipFill>
-          <a:blip xmlns:r="http://schemas.openxmlformats.org/officeDocument/2006/relationships" r:embed="rId7">
-            <a:extLst>
-              <a:ext uri="{28A0092B-C50C-407E-A947-70E740481C1C}">
-                <a14:useLocalDpi xmlns:a14="http://schemas.microsoft.com/office/drawing/2010/main" val="0"/>
-              </a:ext>
-              <a:ext uri="{96DAC541-7B7A-43D3-8B79-37D633B846F1}">
-                <asvg:svgBlip xmlns:asvg="http://schemas.microsoft.com/office/drawing/2016/SVG/main" r:embed="rId8"/>
-              </a:ext>
-            </a:extLst>
-          </a:blip>
-          <a:stretch>
-            <a:fillRect/>
-          </a:stretch>
-        </a:blipFill>
-        <a:ln>
-          <a:noFill/>
-        </a:ln>
-      </dgm:spPr>
-      <dgm:extLst>
-        <a:ext uri="{E40237B7-FDA0-4F09-8148-C483321AD2D9}">
-          <dgm14:cNvPr xmlns:dgm14="http://schemas.microsoft.com/office/drawing/2010/diagram" id="0" name="" descr="Magnifying glass"/>
-        </a:ext>
-      </dgm:extLst>
-    </dgm:pt>
-    <dgm:pt modelId="{6C5B0009-4A99-4855-BD0D-02651F51954C}" type="pres">
-      <dgm:prSet presAssocID="{F1D65EAD-CCEB-4F7B-B661-D4A76FA40888}" presName="iconSpace" presStyleCnt="0"/>
-      <dgm:spPr/>
-    </dgm:pt>
-    <dgm:pt modelId="{5BA6AA48-0E55-4AE3-8D88-9A44DB242E45}" type="pres">
-      <dgm:prSet presAssocID="{F1D65EAD-CCEB-4F7B-B661-D4A76FA40888}" presName="parTx" presStyleLbl="revTx" presStyleIdx="6" presStyleCnt="10">
-        <dgm:presLayoutVars>
-          <dgm:chMax val="0"/>
-          <dgm:chPref val="0"/>
-        </dgm:presLayoutVars>
-      </dgm:prSet>
-      <dgm:spPr/>
-    </dgm:pt>
-    <dgm:pt modelId="{80B82BB5-D64C-4FCC-9B97-1E4E9156C04E}" type="pres">
-      <dgm:prSet presAssocID="{F1D65EAD-CCEB-4F7B-B661-D4A76FA40888}" presName="txSpace" presStyleCnt="0"/>
-      <dgm:spPr/>
-    </dgm:pt>
-    <dgm:pt modelId="{CC8FAE22-73FF-44E3-B69D-853F32E85514}" type="pres">
-      <dgm:prSet presAssocID="{F1D65EAD-CCEB-4F7B-B661-D4A76FA40888}" presName="desTx" presStyleLbl="revTx" presStyleIdx="7" presStyleCnt="10">
-        <dgm:presLayoutVars/>
-      </dgm:prSet>
-      <dgm:spPr/>
-    </dgm:pt>
-    <dgm:pt modelId="{07DE9105-8E32-4543-AFA4-B69C1D49C602}" type="pres">
-      <dgm:prSet presAssocID="{D4B6D6B5-D46E-4EA5-BB83-9BD79132BB0F}" presName="sibTrans" presStyleCnt="0"/>
-      <dgm:spPr/>
-    </dgm:pt>
-    <dgm:pt modelId="{5586ECFC-73BE-4599-A711-CD0C4CC01B88}" type="pres">
-      <dgm:prSet presAssocID="{471930FC-C4CB-42BE-A3F0-5843696B30B0}" presName="compNode" presStyleCnt="0"/>
-      <dgm:spPr/>
-    </dgm:pt>
-    <dgm:pt modelId="{57598D28-EB80-45F2-8E0A-3D3E78423867}" type="pres">
-      <dgm:prSet presAssocID="{471930FC-C4CB-42BE-A3F0-5843696B30B0}" presName="iconRect" presStyleLbl="node1" presStyleIdx="4" presStyleCnt="5"/>
-      <dgm:spPr>
-        <a:blipFill>
-          <a:blip xmlns:r="http://schemas.openxmlformats.org/officeDocument/2006/relationships" r:embed="rId9">
-            <a:extLst>
-              <a:ext uri="{28A0092B-C50C-407E-A947-70E740481C1C}">
-                <a14:useLocalDpi xmlns:a14="http://schemas.microsoft.com/office/drawing/2010/main" val="0"/>
-              </a:ext>
-              <a:ext uri="{96DAC541-7B7A-43D3-8B79-37D633B846F1}">
-                <asvg:svgBlip xmlns:asvg="http://schemas.microsoft.com/office/drawing/2016/SVG/main" r:embed="rId10"/>
-              </a:ext>
-            </a:extLst>
-          </a:blip>
-          <a:stretch>
-            <a:fillRect/>
-          </a:stretch>
-        </a:blipFill>
-        <a:ln>
-          <a:noFill/>
-        </a:ln>
-      </dgm:spPr>
-      <dgm:extLst>
-        <a:ext uri="{E40237B7-FDA0-4F09-8148-C483321AD2D9}">
-          <dgm14:cNvPr xmlns:dgm14="http://schemas.microsoft.com/office/drawing/2010/diagram" id="0" name="" descr="Taco"/>
-        </a:ext>
-      </dgm:extLst>
-    </dgm:pt>
-    <dgm:pt modelId="{992204C0-CD01-407B-AF39-E447C28DEDB5}" type="pres">
-      <dgm:prSet presAssocID="{471930FC-C4CB-42BE-A3F0-5843696B30B0}" presName="iconSpace" presStyleCnt="0"/>
-      <dgm:spPr/>
-    </dgm:pt>
-    <dgm:pt modelId="{DFD86F3B-F072-4560-90E6-D2B6B5F6D3F2}" type="pres">
-      <dgm:prSet presAssocID="{471930FC-C4CB-42BE-A3F0-5843696B30B0}" presName="parTx" presStyleLbl="revTx" presStyleIdx="8" presStyleCnt="10">
-        <dgm:presLayoutVars>
-          <dgm:chMax val="0"/>
-          <dgm:chPref val="0"/>
-        </dgm:presLayoutVars>
-      </dgm:prSet>
-      <dgm:spPr/>
-    </dgm:pt>
-    <dgm:pt modelId="{999B58F4-5843-4889-9ECB-3604FF13D25F}" type="pres">
-      <dgm:prSet presAssocID="{471930FC-C4CB-42BE-A3F0-5843696B30B0}" presName="txSpace" presStyleCnt="0"/>
-      <dgm:spPr/>
-    </dgm:pt>
-    <dgm:pt modelId="{9049E4BA-955F-4E6A-B1A6-CF18035C9B4F}" type="pres">
-      <dgm:prSet presAssocID="{471930FC-C4CB-42BE-A3F0-5843696B30B0}" presName="desTx" presStyleLbl="revTx" presStyleIdx="9" presStyleCnt="10">
-        <dgm:presLayoutVars/>
-      </dgm:prSet>
-      <dgm:spPr/>
-    </dgm:pt>
-  </dgm:ptLst>
-  <dgm:cxnLst>
-    <dgm:cxn modelId="{A9E47F06-03B3-43EB-8761-A8B327E8DA33}" srcId="{00AA18DD-DC18-435A-BFEB-E15A435A401D}" destId="{471930FC-C4CB-42BE-A3F0-5843696B30B0}" srcOrd="4" destOrd="0" parTransId="{E73404B5-3C76-4234-9F4F-58B0733A00B3}" sibTransId="{5A4F0E5D-54F1-4C02-9024-EADE7D39CEF5}"/>
-    <dgm:cxn modelId="{A887F107-B36C-C34A-897C-DF9BD776B7D9}" type="presOf" srcId="{2D0573B8-0547-436E-85F9-E5419822E891}" destId="{519DEAA8-AD07-4D95-A709-487D6F6DBC47}" srcOrd="0" destOrd="0" presId="urn:microsoft.com/office/officeart/2018/2/layout/IconLabelDescriptionList"/>
-    <dgm:cxn modelId="{45011D0D-CEC9-4175-979C-9EE117243E28}" srcId="{F1D65EAD-CCEB-4F7B-B661-D4A76FA40888}" destId="{0079B860-66A2-48B2-A1AF-ECBCBAB2C75C}" srcOrd="1" destOrd="0" parTransId="{CED48826-4BD3-4DD5-B195-97ABE708BC42}" sibTransId="{10B434A8-26CD-4075-B494-695CA1AF060A}"/>
-    <dgm:cxn modelId="{4F08CC13-B791-E445-B3F4-CEC443C2BC96}" type="presOf" srcId="{00AA18DD-DC18-435A-BFEB-E15A435A401D}" destId="{A842F729-F885-45D4-9AFB-BE231DF260DB}" srcOrd="0" destOrd="0" presId="urn:microsoft.com/office/officeart/2018/2/layout/IconLabelDescriptionList"/>
-    <dgm:cxn modelId="{180BA241-06FE-8B4D-8785-1B00842ADD5C}" type="presOf" srcId="{5939F075-45B6-4DEB-B70E-EE7706BDF349}" destId="{E17D72C3-9370-4D46-B710-901E211CC61B}" srcOrd="0" destOrd="0" presId="urn:microsoft.com/office/officeart/2018/2/layout/IconLabelDescriptionList"/>
-    <dgm:cxn modelId="{D5557560-74FD-2645-9BBA-D2E6B954CD83}" type="presOf" srcId="{0079B860-66A2-48B2-A1AF-ECBCBAB2C75C}" destId="{CC8FAE22-73FF-44E3-B69D-853F32E85514}" srcOrd="0" destOrd="1" presId="urn:microsoft.com/office/officeart/2018/2/layout/IconLabelDescriptionList"/>
-    <dgm:cxn modelId="{54E25078-CB32-0346-8388-138B75A18792}" type="presOf" srcId="{15D256E9-DE7B-4D2C-8E8F-738377FA151C}" destId="{9049E4BA-955F-4E6A-B1A6-CF18035C9B4F}" srcOrd="0" destOrd="0" presId="urn:microsoft.com/office/officeart/2018/2/layout/IconLabelDescriptionList"/>
-    <dgm:cxn modelId="{46C03A8B-B9E7-7E46-9308-7FCC588DC01C}" type="presOf" srcId="{471930FC-C4CB-42BE-A3F0-5843696B30B0}" destId="{DFD86F3B-F072-4560-90E6-D2B6B5F6D3F2}" srcOrd="0" destOrd="0" presId="urn:microsoft.com/office/officeart/2018/2/layout/IconLabelDescriptionList"/>
-    <dgm:cxn modelId="{2A44D5AB-6534-43AB-950E-D60B6354D10B}" srcId="{00AA18DD-DC18-435A-BFEB-E15A435A401D}" destId="{F1D65EAD-CCEB-4F7B-B661-D4A76FA40888}" srcOrd="3" destOrd="0" parTransId="{2318A56F-CE9B-4B80-999E-4BE1E7577C0D}" sibTransId="{D4B6D6B5-D46E-4EA5-BB83-9BD79132BB0F}"/>
-    <dgm:cxn modelId="{2AA86BAD-8BF2-0F40-B855-EAF3C9E0A87E}" type="presOf" srcId="{2AF13D63-5BB0-4633-980E-E713F1CBF5F6}" destId="{E00D64F2-3E33-4A26-86F8-D465947064D3}" srcOrd="0" destOrd="0" presId="urn:microsoft.com/office/officeart/2018/2/layout/IconLabelDescriptionList"/>
-    <dgm:cxn modelId="{F0BDD4B5-D6A1-4F64-A091-DA34969B2115}" srcId="{F1D65EAD-CCEB-4F7B-B661-D4A76FA40888}" destId="{0F09E02A-4106-4A9F-9AF9-E71E5825274C}" srcOrd="0" destOrd="0" parTransId="{9002D101-0AEB-4306-8CD6-597035D25BB7}" sibTransId="{288041A4-480F-4294-85D3-64FE5F3F35A9}"/>
-    <dgm:cxn modelId="{E5DCE7C3-7535-47C0-8CC5-68CDC86BF6A8}" srcId="{00AA18DD-DC18-435A-BFEB-E15A435A401D}" destId="{5939F075-45B6-4DEB-B70E-EE7706BDF349}" srcOrd="0" destOrd="0" parTransId="{26F23207-64F8-427C-935E-16352CB49084}" sibTransId="{54D312CA-7094-4C79-9CEE-3FBC3D825219}"/>
-    <dgm:cxn modelId="{E4B21ECB-A8B6-9145-B725-DCDED757351C}" type="presOf" srcId="{0F09E02A-4106-4A9F-9AF9-E71E5825274C}" destId="{CC8FAE22-73FF-44E3-B69D-853F32E85514}" srcOrd="0" destOrd="0" presId="urn:microsoft.com/office/officeart/2018/2/layout/IconLabelDescriptionList"/>
-    <dgm:cxn modelId="{005B8FD7-F65B-644A-B786-0A5EC242AC73}" type="presOf" srcId="{F1D65EAD-CCEB-4F7B-B661-D4A76FA40888}" destId="{5BA6AA48-0E55-4AE3-8D88-9A44DB242E45}" srcOrd="0" destOrd="0" presId="urn:microsoft.com/office/officeart/2018/2/layout/IconLabelDescriptionList"/>
-    <dgm:cxn modelId="{4BE662D9-BD5E-4B05-B8FA-265A676AE22B}" srcId="{471930FC-C4CB-42BE-A3F0-5843696B30B0}" destId="{15D256E9-DE7B-4D2C-8E8F-738377FA151C}" srcOrd="0" destOrd="0" parTransId="{7B7B563D-5A9E-4074-9250-72259BD87B00}" sibTransId="{E55194DA-B5CA-4F85-AC30-26AA6A7AE39C}"/>
-    <dgm:cxn modelId="{D7AA73DA-476E-420D-B8B2-8A5D8A328B12}" srcId="{00AA18DD-DC18-435A-BFEB-E15A435A401D}" destId="{2AF13D63-5BB0-4633-980E-E713F1CBF5F6}" srcOrd="2" destOrd="0" parTransId="{CE8AD715-2894-425E-BE95-08FB4C5702E4}" sibTransId="{44E9DDE1-374F-4C52-B9CF-128AA76B1E6A}"/>
-    <dgm:cxn modelId="{4EBB52FD-990A-47B1-AC11-C11AED264129}" srcId="{00AA18DD-DC18-435A-BFEB-E15A435A401D}" destId="{2D0573B8-0547-436E-85F9-E5419822E891}" srcOrd="1" destOrd="0" parTransId="{9A870BC6-6104-4C16-8D5C-D4615CE9A296}" sibTransId="{5333A5C4-C116-4240-8838-F93F01818AB5}"/>
-    <dgm:cxn modelId="{5AD82CBA-FB62-C047-96DB-F97404C69897}" type="presParOf" srcId="{A842F729-F885-45D4-9AFB-BE231DF260DB}" destId="{706F56CE-2E26-459D-850F-34B62D231914}" srcOrd="0" destOrd="0" presId="urn:microsoft.com/office/officeart/2018/2/layout/IconLabelDescriptionList"/>
-    <dgm:cxn modelId="{D71889F6-5878-864D-8FD8-4B7178F900A7}" type="presParOf" srcId="{706F56CE-2E26-459D-850F-34B62D231914}" destId="{AC9BBE39-9A1C-4538-B245-CA9DAC603508}" srcOrd="0" destOrd="0" presId="urn:microsoft.com/office/officeart/2018/2/layout/IconLabelDescriptionList"/>
-    <dgm:cxn modelId="{B32655E0-7037-2E46-89EF-3ED30AE75218}" type="presParOf" srcId="{706F56CE-2E26-459D-850F-34B62D231914}" destId="{B693E7DF-FEF7-497E-9680-CCD9B2ADDB56}" srcOrd="1" destOrd="0" presId="urn:microsoft.com/office/officeart/2018/2/layout/IconLabelDescriptionList"/>
-    <dgm:cxn modelId="{646CAF5F-C524-5E4A-894E-84E314823983}" type="presParOf" srcId="{706F56CE-2E26-459D-850F-34B62D231914}" destId="{E17D72C3-9370-4D46-B710-901E211CC61B}" srcOrd="2" destOrd="0" presId="urn:microsoft.com/office/officeart/2018/2/layout/IconLabelDescriptionList"/>
-    <dgm:cxn modelId="{D12353C2-326B-0245-96F7-20CCF20E752E}" type="presParOf" srcId="{706F56CE-2E26-459D-850F-34B62D231914}" destId="{73AF1722-1D2A-4E01-873F-B117A022761F}" srcOrd="3" destOrd="0" presId="urn:microsoft.com/office/officeart/2018/2/layout/IconLabelDescriptionList"/>
-    <dgm:cxn modelId="{78FA2992-CE8D-D74F-A8D6-ECD928E1FF7C}" type="presParOf" srcId="{706F56CE-2E26-459D-850F-34B62D231914}" destId="{4FA3D6D6-B755-42D0-ACCA-F53949929100}" srcOrd="4" destOrd="0" presId="urn:microsoft.com/office/officeart/2018/2/layout/IconLabelDescriptionList"/>
-    <dgm:cxn modelId="{DCDE6874-ACFA-A24D-96B4-566420A9FB67}" type="presParOf" srcId="{A842F729-F885-45D4-9AFB-BE231DF260DB}" destId="{DB531199-C8A6-4024-AF01-63F91F84F64E}" srcOrd="1" destOrd="0" presId="urn:microsoft.com/office/officeart/2018/2/layout/IconLabelDescriptionList"/>
-    <dgm:cxn modelId="{7FCC530B-2B85-ED45-B09F-854C132EB5B1}" type="presParOf" srcId="{A842F729-F885-45D4-9AFB-BE231DF260DB}" destId="{F8E50562-265A-4444-9B69-D5247BB11D8E}" srcOrd="2" destOrd="0" presId="urn:microsoft.com/office/officeart/2018/2/layout/IconLabelDescriptionList"/>
-    <dgm:cxn modelId="{A3D6CBD1-28CE-8C4C-AE26-A06166EA88E5}" type="presParOf" srcId="{F8E50562-265A-4444-9B69-D5247BB11D8E}" destId="{4E697141-7461-4B19-BFBD-9571342C7908}" srcOrd="0" destOrd="0" presId="urn:microsoft.com/office/officeart/2018/2/layout/IconLabelDescriptionList"/>
-    <dgm:cxn modelId="{44FB1EC5-B17A-0645-A896-2B76BA65B041}" type="presParOf" srcId="{F8E50562-265A-4444-9B69-D5247BB11D8E}" destId="{CFBB6C28-2BE4-48C6-B9F8-1CE4DFF1EB5C}" srcOrd="1" destOrd="0" presId="urn:microsoft.com/office/officeart/2018/2/layout/IconLabelDescriptionList"/>
-    <dgm:cxn modelId="{1BFA56A3-4BB4-BD47-B92D-49F3E20111CB}" type="presParOf" srcId="{F8E50562-265A-4444-9B69-D5247BB11D8E}" destId="{519DEAA8-AD07-4D95-A709-487D6F6DBC47}" srcOrd="2" destOrd="0" presId="urn:microsoft.com/office/officeart/2018/2/layout/IconLabelDescriptionList"/>
-    <dgm:cxn modelId="{48EE363F-D0C4-264D-B98F-DFCF49727B5A}" type="presParOf" srcId="{F8E50562-265A-4444-9B69-D5247BB11D8E}" destId="{6A5EA3C9-B406-4927-81F4-2B2D62F18E5D}" srcOrd="3" destOrd="0" presId="urn:microsoft.com/office/officeart/2018/2/layout/IconLabelDescriptionList"/>
-    <dgm:cxn modelId="{8E573A80-05D4-DD42-A2EA-CE6A4EE04775}" type="presParOf" srcId="{F8E50562-265A-4444-9B69-D5247BB11D8E}" destId="{45B21AD0-FF9B-45A9-A7E0-2986A6376C14}" srcOrd="4" destOrd="0" presId="urn:microsoft.com/office/officeart/2018/2/layout/IconLabelDescriptionList"/>
-    <dgm:cxn modelId="{A3AC8F10-E8A3-744F-AB69-F210E9EF8592}" type="presParOf" srcId="{A842F729-F885-45D4-9AFB-BE231DF260DB}" destId="{C137428B-089B-4816-8D33-FBE5DE6AF760}" srcOrd="3" destOrd="0" presId="urn:microsoft.com/office/officeart/2018/2/layout/IconLabelDescriptionList"/>
-    <dgm:cxn modelId="{ECBAF607-01D4-AA42-BAFC-21B9BC1E3977}" type="presParOf" srcId="{A842F729-F885-45D4-9AFB-BE231DF260DB}" destId="{600148C9-DCC7-4AB8-BA17-108136255B06}" srcOrd="4" destOrd="0" presId="urn:microsoft.com/office/officeart/2018/2/layout/IconLabelDescriptionList"/>
-    <dgm:cxn modelId="{094BBDE9-D602-3444-BBA1-813CD3FD2609}" type="presParOf" srcId="{600148C9-DCC7-4AB8-BA17-108136255B06}" destId="{4E705B27-4C60-4AC3-B95B-5B2208205940}" srcOrd="0" destOrd="0" presId="urn:microsoft.com/office/officeart/2018/2/layout/IconLabelDescriptionList"/>
-    <dgm:cxn modelId="{03027375-3824-8943-8F68-7A0FFBD0E3CA}" type="presParOf" srcId="{600148C9-DCC7-4AB8-BA17-108136255B06}" destId="{CDB5B1DE-A590-48B0-B027-0773BB6AB31A}" srcOrd="1" destOrd="0" presId="urn:microsoft.com/office/officeart/2018/2/layout/IconLabelDescriptionList"/>
-    <dgm:cxn modelId="{D9211563-7E9B-6440-A406-8725EE4CB2AE}" type="presParOf" srcId="{600148C9-DCC7-4AB8-BA17-108136255B06}" destId="{E00D64F2-3E33-4A26-86F8-D465947064D3}" srcOrd="2" destOrd="0" presId="urn:microsoft.com/office/officeart/2018/2/layout/IconLabelDescriptionList"/>
-    <dgm:cxn modelId="{BDD52216-F75E-B141-B822-FF3C6191AF3B}" type="presParOf" srcId="{600148C9-DCC7-4AB8-BA17-108136255B06}" destId="{71FBE365-2A18-4481-A087-3ACB5881C065}" srcOrd="3" destOrd="0" presId="urn:microsoft.com/office/officeart/2018/2/layout/IconLabelDescriptionList"/>
-    <dgm:cxn modelId="{0325ADC1-4B97-A540-86C9-D67381DDC839}" type="presParOf" srcId="{600148C9-DCC7-4AB8-BA17-108136255B06}" destId="{F6704455-16A9-47CB-AA23-928C81482EAB}" srcOrd="4" destOrd="0" presId="urn:microsoft.com/office/officeart/2018/2/layout/IconLabelDescriptionList"/>
-    <dgm:cxn modelId="{75D1158C-4B3E-AD4B-BC08-139CD1169878}" type="presParOf" srcId="{A842F729-F885-45D4-9AFB-BE231DF260DB}" destId="{5AB15FE2-3BC3-48B9-B47E-3B9712AE2BCD}" srcOrd="5" destOrd="0" presId="urn:microsoft.com/office/officeart/2018/2/layout/IconLabelDescriptionList"/>
-    <dgm:cxn modelId="{2EAB3E45-182B-D14F-B5C7-A850B5475CD2}" type="presParOf" srcId="{A842F729-F885-45D4-9AFB-BE231DF260DB}" destId="{FD5C06D4-49CD-4FAB-A5DF-A4CF4E36BDD5}" srcOrd="6" destOrd="0" presId="urn:microsoft.com/office/officeart/2018/2/layout/IconLabelDescriptionList"/>
-    <dgm:cxn modelId="{A77333A5-57E7-7D45-9FC8-B0DF4025EE55}" type="presParOf" srcId="{FD5C06D4-49CD-4FAB-A5DF-A4CF4E36BDD5}" destId="{DE3E83CD-D14F-4501-B087-743A0AC78DCC}" srcOrd="0" destOrd="0" presId="urn:microsoft.com/office/officeart/2018/2/layout/IconLabelDescriptionList"/>
-    <dgm:cxn modelId="{687871F9-FD08-0440-86A5-E57FDF94B9C5}" type="presParOf" srcId="{FD5C06D4-49CD-4FAB-A5DF-A4CF4E36BDD5}" destId="{6C5B0009-4A99-4855-BD0D-02651F51954C}" srcOrd="1" destOrd="0" presId="urn:microsoft.com/office/officeart/2018/2/layout/IconLabelDescriptionList"/>
-    <dgm:cxn modelId="{9A16EBDC-8C3C-254E-ACA3-F032ABDAA1C1}" type="presParOf" srcId="{FD5C06D4-49CD-4FAB-A5DF-A4CF4E36BDD5}" destId="{5BA6AA48-0E55-4AE3-8D88-9A44DB242E45}" srcOrd="2" destOrd="0" presId="urn:microsoft.com/office/officeart/2018/2/layout/IconLabelDescriptionList"/>
-    <dgm:cxn modelId="{F55FCEB2-BF1D-9F4D-BFF5-390832DAFAAB}" type="presParOf" srcId="{FD5C06D4-49CD-4FAB-A5DF-A4CF4E36BDD5}" destId="{80B82BB5-D64C-4FCC-9B97-1E4E9156C04E}" srcOrd="3" destOrd="0" presId="urn:microsoft.com/office/officeart/2018/2/layout/IconLabelDescriptionList"/>
-    <dgm:cxn modelId="{14D5B866-6212-764E-A749-094B9C882A78}" type="presParOf" srcId="{FD5C06D4-49CD-4FAB-A5DF-A4CF4E36BDD5}" destId="{CC8FAE22-73FF-44E3-B69D-853F32E85514}" srcOrd="4" destOrd="0" presId="urn:microsoft.com/office/officeart/2018/2/layout/IconLabelDescriptionList"/>
-    <dgm:cxn modelId="{994EE6B0-D71A-AB4D-A8DA-EFC8CCA20328}" type="presParOf" srcId="{A842F729-F885-45D4-9AFB-BE231DF260DB}" destId="{07DE9105-8E32-4543-AFA4-B69C1D49C602}" srcOrd="7" destOrd="0" presId="urn:microsoft.com/office/officeart/2018/2/layout/IconLabelDescriptionList"/>
-    <dgm:cxn modelId="{36F1C6CC-6D3E-354C-8140-E6A1A959978F}" type="presParOf" srcId="{A842F729-F885-45D4-9AFB-BE231DF260DB}" destId="{5586ECFC-73BE-4599-A711-CD0C4CC01B88}" srcOrd="8" destOrd="0" presId="urn:microsoft.com/office/officeart/2018/2/layout/IconLabelDescriptionList"/>
-    <dgm:cxn modelId="{98F90729-DAC2-C64B-ABA0-43228FF0CE49}" type="presParOf" srcId="{5586ECFC-73BE-4599-A711-CD0C4CC01B88}" destId="{57598D28-EB80-45F2-8E0A-3D3E78423867}" srcOrd="0" destOrd="0" presId="urn:microsoft.com/office/officeart/2018/2/layout/IconLabelDescriptionList"/>
-    <dgm:cxn modelId="{43BE8E5C-F9A3-8148-812E-7A42641E2AD7}" type="presParOf" srcId="{5586ECFC-73BE-4599-A711-CD0C4CC01B88}" destId="{992204C0-CD01-407B-AF39-E447C28DEDB5}" srcOrd="1" destOrd="0" presId="urn:microsoft.com/office/officeart/2018/2/layout/IconLabelDescriptionList"/>
-    <dgm:cxn modelId="{396220C5-1001-294C-9417-9F96134F4EE7}" type="presParOf" srcId="{5586ECFC-73BE-4599-A711-CD0C4CC01B88}" destId="{DFD86F3B-F072-4560-90E6-D2B6B5F6D3F2}" srcOrd="2" destOrd="0" presId="urn:microsoft.com/office/officeart/2018/2/layout/IconLabelDescriptionList"/>
-    <dgm:cxn modelId="{0E1B05A8-23A2-4A40-A3A7-77B3823FD34A}" type="presParOf" srcId="{5586ECFC-73BE-4599-A711-CD0C4CC01B88}" destId="{999B58F4-5843-4889-9ECB-3604FF13D25F}" srcOrd="3" destOrd="0" presId="urn:microsoft.com/office/officeart/2018/2/layout/IconLabelDescriptionList"/>
-    <dgm:cxn modelId="{90FD55EF-642E-2D47-9E42-C3EB4C67EF6B}" type="presParOf" srcId="{5586ECFC-73BE-4599-A711-CD0C4CC01B88}" destId="{9049E4BA-955F-4E6A-B1A6-CF18035C9B4F}" srcOrd="4" destOrd="0" presId="urn:microsoft.com/office/officeart/2018/2/layout/IconLabelDescriptionList"/>
-  </dgm:cxnLst>
-  <dgm:bg/>
-  <dgm:whole/>
-  <dgm:extLst>
-    <a:ext uri="http://schemas.microsoft.com/office/drawing/2008/diagram">
-      <dsp:dataModelExt xmlns:dsp="http://schemas.microsoft.com/office/drawing/2008/diagram" relId="rId6" minVer="http://schemas.openxmlformats.org/drawingml/2006/diagram"/>
-    </a:ext>
-  </dgm:extLst>
-</dgm:dataModel>
-</file>
-
-<file path=ppt/diagrams/drawing1.xml><?xml version="1.0" encoding="utf-8"?>
-<dsp:drawing xmlns:dgm="http://schemas.openxmlformats.org/drawingml/2006/diagram" xmlns:dsp="http://schemas.microsoft.com/office/drawing/2008/diagram" xmlns:a="http://schemas.openxmlformats.org/drawingml/2006/main">
-  <dsp:spTree>
-    <dsp:nvGrpSpPr>
-      <dsp:cNvPr id="0" name=""/>
-      <dsp:cNvGrpSpPr/>
-    </dsp:nvGrpSpPr>
-    <dsp:grpSpPr/>
-    <dsp:sp modelId="{AC9BBE39-9A1C-4538-B245-CA9DAC603508}">
-      <dsp:nvSpPr>
-        <dsp:cNvPr id="0" name=""/>
-        <dsp:cNvSpPr/>
-      </dsp:nvSpPr>
-      <dsp:spPr>
-        <a:xfrm>
-          <a:off x="5419" y="925879"/>
-          <a:ext cx="488003" cy="488003"/>
-        </a:xfrm>
-        <a:prstGeom prst="rect">
-          <a:avLst/>
-        </a:prstGeom>
-        <a:blipFill>
-          <a:blip xmlns:r="http://schemas.openxmlformats.org/officeDocument/2006/relationships" r:embed="rId1">
-            <a:extLst>
-              <a:ext uri="{28A0092B-C50C-407E-A947-70E740481C1C}">
-                <a14:useLocalDpi xmlns:a14="http://schemas.microsoft.com/office/drawing/2010/main" val="0"/>
-              </a:ext>
-              <a:ext uri="{96DAC541-7B7A-43D3-8B79-37D633B846F1}">
-                <asvg:svgBlip xmlns:asvg="http://schemas.microsoft.com/office/drawing/2016/SVG/main" r:embed="rId2"/>
-              </a:ext>
-            </a:extLst>
-          </a:blip>
-          <a:stretch>
-            <a:fillRect/>
-          </a:stretch>
-        </a:blipFill>
-        <a:ln w="15875" cap="flat" cmpd="sng" algn="ctr">
-          <a:noFill/>
-          <a:prstDash val="solid"/>
-        </a:ln>
-        <a:effectLst/>
-      </dsp:spPr>
-      <dsp:style>
-        <a:lnRef idx="2">
-          <a:scrgbClr r="0" g="0" b="0"/>
-        </a:lnRef>
-        <a:fillRef idx="1">
-          <a:scrgbClr r="0" g="0" b="0"/>
-        </a:fillRef>
-        <a:effectRef idx="0">
-          <a:scrgbClr r="0" g="0" b="0"/>
-        </a:effectRef>
-        <a:fontRef idx="minor">
-          <a:schemeClr val="lt1"/>
-        </a:fontRef>
-      </dsp:style>
-    </dsp:sp>
-    <dsp:sp modelId="{E17D72C3-9370-4D46-B710-901E211CC61B}">
-      <dsp:nvSpPr>
-        <dsp:cNvPr id="0" name=""/>
-        <dsp:cNvSpPr/>
-      </dsp:nvSpPr>
-      <dsp:spPr>
-        <a:xfrm>
-          <a:off x="5419" y="1479031"/>
-          <a:ext cx="1394296" cy="562075"/>
-        </a:xfrm>
-        <a:prstGeom prst="rect">
-          <a:avLst/>
-        </a:prstGeom>
-        <a:noFill/>
-        <a:ln>
-          <a:noFill/>
-        </a:ln>
-        <a:effectLst/>
-      </dsp:spPr>
-      <dsp:style>
-        <a:lnRef idx="0">
-          <a:scrgbClr r="0" g="0" b="0"/>
-        </a:lnRef>
-        <a:fillRef idx="0">
-          <a:scrgbClr r="0" g="0" b="0"/>
-        </a:fillRef>
-        <a:effectRef idx="0">
-          <a:scrgbClr r="0" g="0" b="0"/>
-        </a:effectRef>
-        <a:fontRef idx="minor"/>
-      </dsp:style>
-      <dsp:txBody>
-        <a:bodyPr spcFirstLastPara="0" vert="horz" wrap="square" lIns="0" tIns="0" rIns="0" bIns="0" numCol="1" spcCol="1270" anchor="t" anchorCtr="0">
-          <a:noAutofit/>
-        </a:bodyPr>
-        <a:lstStyle/>
-        <a:p>
-          <a:pPr marL="0" lvl="0" indent="0" algn="l" defTabSz="622300">
-            <a:lnSpc>
-              <a:spcPct val="90000"/>
-            </a:lnSpc>
-            <a:spcBef>
-              <a:spcPct val="0"/>
-            </a:spcBef>
-            <a:spcAft>
-              <a:spcPct val="35000"/>
-            </a:spcAft>
-            <a:buNone/>
-            <a:defRPr b="1"/>
-          </a:pPr>
-          <a:r>
-            <a:rPr lang="en-US" sz="1400" kern="1200"/>
-            <a:t>My main message to you:</a:t>
-          </a:r>
-        </a:p>
-      </dsp:txBody>
-      <dsp:txXfrm>
-        <a:off x="5419" y="1479031"/>
-        <a:ext cx="1394296" cy="562075"/>
-      </dsp:txXfrm>
-    </dsp:sp>
-    <dsp:sp modelId="{4FA3D6D6-B755-42D0-ACCA-F53949929100}">
-      <dsp:nvSpPr>
-        <dsp:cNvPr id="0" name=""/>
-        <dsp:cNvSpPr/>
-      </dsp:nvSpPr>
-      <dsp:spPr>
-        <a:xfrm>
-          <a:off x="5419" y="2071408"/>
-          <a:ext cx="1394296" cy="369545"/>
-        </a:xfrm>
-        <a:prstGeom prst="rect">
-          <a:avLst/>
-        </a:prstGeom>
-        <a:noFill/>
-        <a:ln>
-          <a:noFill/>
-        </a:ln>
-        <a:effectLst/>
-      </dsp:spPr>
-      <dsp:style>
-        <a:lnRef idx="0">
-          <a:scrgbClr r="0" g="0" b="0"/>
-        </a:lnRef>
-        <a:fillRef idx="0">
-          <a:scrgbClr r="0" g="0" b="0"/>
-        </a:fillRef>
-        <a:effectRef idx="0">
-          <a:scrgbClr r="0" g="0" b="0"/>
-        </a:effectRef>
-        <a:fontRef idx="minor"/>
-      </dsp:style>
-    </dsp:sp>
-    <dsp:sp modelId="{4E697141-7461-4B19-BFBD-9571342C7908}">
-      <dsp:nvSpPr>
-        <dsp:cNvPr id="0" name=""/>
-        <dsp:cNvSpPr/>
-      </dsp:nvSpPr>
-      <dsp:spPr>
-        <a:xfrm>
-          <a:off x="1643718" y="925879"/>
-          <a:ext cx="488003" cy="488003"/>
-        </a:xfrm>
-        <a:prstGeom prst="rect">
-          <a:avLst/>
-        </a:prstGeom>
-        <a:blipFill>
-          <a:blip xmlns:r="http://schemas.openxmlformats.org/officeDocument/2006/relationships" r:embed="rId3">
-            <a:extLst>
-              <a:ext uri="{28A0092B-C50C-407E-A947-70E740481C1C}">
-                <a14:useLocalDpi xmlns:a14="http://schemas.microsoft.com/office/drawing/2010/main" val="0"/>
-              </a:ext>
-              <a:ext uri="{96DAC541-7B7A-43D3-8B79-37D633B846F1}">
-                <asvg:svgBlip xmlns:asvg="http://schemas.microsoft.com/office/drawing/2016/SVG/main" r:embed="rId4"/>
-              </a:ext>
-            </a:extLst>
-          </a:blip>
-          <a:stretch>
-            <a:fillRect/>
-          </a:stretch>
-        </a:blipFill>
-        <a:ln w="15875" cap="flat" cmpd="sng" algn="ctr">
-          <a:noFill/>
-          <a:prstDash val="solid"/>
-        </a:ln>
-        <a:effectLst/>
-      </dsp:spPr>
-      <dsp:style>
-        <a:lnRef idx="2">
-          <a:scrgbClr r="0" g="0" b="0"/>
-        </a:lnRef>
-        <a:fillRef idx="1">
-          <a:scrgbClr r="0" g="0" b="0"/>
-        </a:fillRef>
-        <a:effectRef idx="0">
-          <a:scrgbClr r="0" g="0" b="0"/>
-        </a:effectRef>
-        <a:fontRef idx="minor">
-          <a:schemeClr val="lt1"/>
-        </a:fontRef>
-      </dsp:style>
-    </dsp:sp>
-    <dsp:sp modelId="{519DEAA8-AD07-4D95-A709-487D6F6DBC47}">
-      <dsp:nvSpPr>
-        <dsp:cNvPr id="0" name=""/>
-        <dsp:cNvSpPr/>
-      </dsp:nvSpPr>
-      <dsp:spPr>
-        <a:xfrm>
-          <a:off x="1643718" y="1479031"/>
-          <a:ext cx="1394296" cy="562075"/>
-        </a:xfrm>
-        <a:prstGeom prst="rect">
-          <a:avLst/>
-        </a:prstGeom>
-        <a:noFill/>
-        <a:ln>
-          <a:noFill/>
-        </a:ln>
-        <a:effectLst/>
-      </dsp:spPr>
-      <dsp:style>
-        <a:lnRef idx="0">
-          <a:scrgbClr r="0" g="0" b="0"/>
-        </a:lnRef>
-        <a:fillRef idx="0">
-          <a:scrgbClr r="0" g="0" b="0"/>
-        </a:fillRef>
-        <a:effectRef idx="0">
-          <a:scrgbClr r="0" g="0" b="0"/>
-        </a:effectRef>
-        <a:fontRef idx="minor"/>
-      </dsp:style>
-      <dsp:txBody>
-        <a:bodyPr spcFirstLastPara="0" vert="horz" wrap="square" lIns="0" tIns="0" rIns="0" bIns="0" numCol="1" spcCol="1270" anchor="t" anchorCtr="0">
-          <a:noAutofit/>
-        </a:bodyPr>
-        <a:lstStyle/>
-        <a:p>
-          <a:pPr marL="0" lvl="0" indent="0" algn="l" defTabSz="622300">
-            <a:lnSpc>
-              <a:spcPct val="90000"/>
-            </a:lnSpc>
-            <a:spcBef>
-              <a:spcPct val="0"/>
-            </a:spcBef>
-            <a:spcAft>
-              <a:spcPct val="35000"/>
-            </a:spcAft>
-            <a:buNone/>
-            <a:defRPr b="1"/>
-          </a:pPr>
-          <a:r>
-            <a:rPr lang="en-US" sz="1400" kern="1200"/>
-            <a:t>Question 1 because blah</a:t>
-          </a:r>
-        </a:p>
-      </dsp:txBody>
-      <dsp:txXfrm>
-        <a:off x="1643718" y="1479031"/>
-        <a:ext cx="1394296" cy="562075"/>
-      </dsp:txXfrm>
-    </dsp:sp>
-    <dsp:sp modelId="{45B21AD0-FF9B-45A9-A7E0-2986A6376C14}">
-      <dsp:nvSpPr>
-        <dsp:cNvPr id="0" name=""/>
-        <dsp:cNvSpPr/>
-      </dsp:nvSpPr>
-      <dsp:spPr>
-        <a:xfrm>
-          <a:off x="1643718" y="2071408"/>
-          <a:ext cx="1394296" cy="369545"/>
-        </a:xfrm>
-        <a:prstGeom prst="rect">
-          <a:avLst/>
-        </a:prstGeom>
-        <a:noFill/>
-        <a:ln>
-          <a:noFill/>
-        </a:ln>
-        <a:effectLst/>
-      </dsp:spPr>
-      <dsp:style>
-        <a:lnRef idx="0">
-          <a:scrgbClr r="0" g="0" b="0"/>
-        </a:lnRef>
-        <a:fillRef idx="0">
-          <a:scrgbClr r="0" g="0" b="0"/>
-        </a:fillRef>
-        <a:effectRef idx="0">
-          <a:scrgbClr r="0" g="0" b="0"/>
-        </a:effectRef>
-        <a:fontRef idx="minor"/>
-      </dsp:style>
-    </dsp:sp>
-    <dsp:sp modelId="{4E705B27-4C60-4AC3-B95B-5B2208205940}">
-      <dsp:nvSpPr>
-        <dsp:cNvPr id="0" name=""/>
-        <dsp:cNvSpPr/>
-      </dsp:nvSpPr>
-      <dsp:spPr>
-        <a:xfrm>
-          <a:off x="3282017" y="925879"/>
-          <a:ext cx="488003" cy="488003"/>
-        </a:xfrm>
-        <a:prstGeom prst="rect">
-          <a:avLst/>
-        </a:prstGeom>
-        <a:blipFill>
-          <a:blip xmlns:r="http://schemas.openxmlformats.org/officeDocument/2006/relationships" r:embed="rId5">
-            <a:extLst>
-              <a:ext uri="{28A0092B-C50C-407E-A947-70E740481C1C}">
-                <a14:useLocalDpi xmlns:a14="http://schemas.microsoft.com/office/drawing/2010/main" val="0"/>
-              </a:ext>
-              <a:ext uri="{96DAC541-7B7A-43D3-8B79-37D633B846F1}">
-                <asvg:svgBlip xmlns:asvg="http://schemas.microsoft.com/office/drawing/2016/SVG/main" r:embed="rId6"/>
-              </a:ext>
-            </a:extLst>
-          </a:blip>
-          <a:stretch>
-            <a:fillRect/>
-          </a:stretch>
-        </a:blipFill>
-        <a:ln w="15875" cap="flat" cmpd="sng" algn="ctr">
-          <a:noFill/>
-          <a:prstDash val="solid"/>
-        </a:ln>
-        <a:effectLst/>
-      </dsp:spPr>
-      <dsp:style>
-        <a:lnRef idx="2">
-          <a:scrgbClr r="0" g="0" b="0"/>
-        </a:lnRef>
-        <a:fillRef idx="1">
-          <a:scrgbClr r="0" g="0" b="0"/>
-        </a:fillRef>
-        <a:effectRef idx="0">
-          <a:scrgbClr r="0" g="0" b="0"/>
-        </a:effectRef>
-        <a:fontRef idx="minor">
-          <a:schemeClr val="lt1"/>
-        </a:fontRef>
-      </dsp:style>
-    </dsp:sp>
-    <dsp:sp modelId="{E00D64F2-3E33-4A26-86F8-D465947064D3}">
-      <dsp:nvSpPr>
-        <dsp:cNvPr id="0" name=""/>
-        <dsp:cNvSpPr/>
-      </dsp:nvSpPr>
-      <dsp:spPr>
-        <a:xfrm>
-          <a:off x="3282017" y="1479031"/>
-          <a:ext cx="1394296" cy="562075"/>
-        </a:xfrm>
-        <a:prstGeom prst="rect">
-          <a:avLst/>
-        </a:prstGeom>
-        <a:noFill/>
-        <a:ln>
-          <a:noFill/>
-        </a:ln>
-        <a:effectLst/>
-      </dsp:spPr>
-      <dsp:style>
-        <a:lnRef idx="0">
-          <a:scrgbClr r="0" g="0" b="0"/>
-        </a:lnRef>
-        <a:fillRef idx="0">
-          <a:scrgbClr r="0" g="0" b="0"/>
-        </a:fillRef>
-        <a:effectRef idx="0">
-          <a:scrgbClr r="0" g="0" b="0"/>
-        </a:effectRef>
-        <a:fontRef idx="minor"/>
-      </dsp:style>
-      <dsp:txBody>
-        <a:bodyPr spcFirstLastPara="0" vert="horz" wrap="square" lIns="0" tIns="0" rIns="0" bIns="0" numCol="1" spcCol="1270" anchor="t" anchorCtr="0">
-          <a:noAutofit/>
-        </a:bodyPr>
-        <a:lstStyle/>
-        <a:p>
-          <a:pPr marL="0" lvl="0" indent="0" algn="l" defTabSz="622300">
-            <a:lnSpc>
-              <a:spcPct val="90000"/>
-            </a:lnSpc>
-            <a:spcBef>
-              <a:spcPct val="0"/>
-            </a:spcBef>
-            <a:spcAft>
-              <a:spcPct val="35000"/>
-            </a:spcAft>
-            <a:buNone/>
-            <a:defRPr b="1"/>
-          </a:pPr>
-          <a:r>
-            <a:rPr lang="en-US" sz="1400" kern="1200"/>
-            <a:t>Question 2 because double blah</a:t>
-          </a:r>
-        </a:p>
-      </dsp:txBody>
-      <dsp:txXfrm>
-        <a:off x="3282017" y="1479031"/>
-        <a:ext cx="1394296" cy="562075"/>
-      </dsp:txXfrm>
-    </dsp:sp>
-    <dsp:sp modelId="{F6704455-16A9-47CB-AA23-928C81482EAB}">
-      <dsp:nvSpPr>
-        <dsp:cNvPr id="0" name=""/>
-        <dsp:cNvSpPr/>
-      </dsp:nvSpPr>
-      <dsp:spPr>
-        <a:xfrm>
-          <a:off x="3282017" y="2071408"/>
-          <a:ext cx="1394296" cy="369545"/>
-        </a:xfrm>
-        <a:prstGeom prst="rect">
-          <a:avLst/>
-        </a:prstGeom>
-        <a:noFill/>
-        <a:ln>
-          <a:noFill/>
-        </a:ln>
-        <a:effectLst/>
-      </dsp:spPr>
-      <dsp:style>
-        <a:lnRef idx="0">
-          <a:scrgbClr r="0" g="0" b="0"/>
-        </a:lnRef>
-        <a:fillRef idx="0">
-          <a:scrgbClr r="0" g="0" b="0"/>
-        </a:fillRef>
-        <a:effectRef idx="0">
-          <a:scrgbClr r="0" g="0" b="0"/>
-        </a:effectRef>
-        <a:fontRef idx="minor"/>
-      </dsp:style>
-    </dsp:sp>
-    <dsp:sp modelId="{DE3E83CD-D14F-4501-B087-743A0AC78DCC}">
-      <dsp:nvSpPr>
-        <dsp:cNvPr id="0" name=""/>
-        <dsp:cNvSpPr/>
-      </dsp:nvSpPr>
-      <dsp:spPr>
-        <a:xfrm>
-          <a:off x="4920315" y="925879"/>
-          <a:ext cx="488003" cy="488003"/>
-        </a:xfrm>
-        <a:prstGeom prst="rect">
-          <a:avLst/>
-        </a:prstGeom>
-        <a:blipFill>
-          <a:blip xmlns:r="http://schemas.openxmlformats.org/officeDocument/2006/relationships" r:embed="rId7">
-            <a:extLst>
-              <a:ext uri="{28A0092B-C50C-407E-A947-70E740481C1C}">
-                <a14:useLocalDpi xmlns:a14="http://schemas.microsoft.com/office/drawing/2010/main" val="0"/>
-              </a:ext>
-              <a:ext uri="{96DAC541-7B7A-43D3-8B79-37D633B846F1}">
-                <asvg:svgBlip xmlns:asvg="http://schemas.microsoft.com/office/drawing/2016/SVG/main" r:embed="rId8"/>
-              </a:ext>
-            </a:extLst>
-          </a:blip>
-          <a:stretch>
-            <a:fillRect/>
-          </a:stretch>
-        </a:blipFill>
-        <a:ln w="15875" cap="flat" cmpd="sng" algn="ctr">
-          <a:noFill/>
-          <a:prstDash val="solid"/>
-        </a:ln>
-        <a:effectLst/>
-      </dsp:spPr>
-      <dsp:style>
-        <a:lnRef idx="2">
-          <a:scrgbClr r="0" g="0" b="0"/>
-        </a:lnRef>
-        <a:fillRef idx="1">
-          <a:scrgbClr r="0" g="0" b="0"/>
-        </a:fillRef>
-        <a:effectRef idx="0">
-          <a:scrgbClr r="0" g="0" b="0"/>
-        </a:effectRef>
-        <a:fontRef idx="minor">
-          <a:schemeClr val="lt1"/>
-        </a:fontRef>
-      </dsp:style>
-    </dsp:sp>
-    <dsp:sp modelId="{5BA6AA48-0E55-4AE3-8D88-9A44DB242E45}">
-      <dsp:nvSpPr>
-        <dsp:cNvPr id="0" name=""/>
-        <dsp:cNvSpPr/>
-      </dsp:nvSpPr>
-      <dsp:spPr>
-        <a:xfrm>
-          <a:off x="4920315" y="1479031"/>
-          <a:ext cx="1394296" cy="562075"/>
-        </a:xfrm>
-        <a:prstGeom prst="rect">
-          <a:avLst/>
-        </a:prstGeom>
-        <a:noFill/>
-        <a:ln>
-          <a:noFill/>
-        </a:ln>
-        <a:effectLst/>
-      </dsp:spPr>
-      <dsp:style>
-        <a:lnRef idx="0">
-          <a:scrgbClr r="0" g="0" b="0"/>
-        </a:lnRef>
-        <a:fillRef idx="0">
-          <a:scrgbClr r="0" g="0" b="0"/>
-        </a:fillRef>
-        <a:effectRef idx="0">
-          <a:scrgbClr r="0" g="0" b="0"/>
-        </a:effectRef>
-        <a:fontRef idx="minor"/>
-      </dsp:style>
-      <dsp:txBody>
-        <a:bodyPr spcFirstLastPara="0" vert="horz" wrap="square" lIns="0" tIns="0" rIns="0" bIns="0" numCol="1" spcCol="1270" anchor="t" anchorCtr="0">
-          <a:noAutofit/>
-        </a:bodyPr>
-        <a:lstStyle/>
-        <a:p>
-          <a:pPr marL="0" lvl="0" indent="0" algn="l" defTabSz="622300">
-            <a:lnSpc>
-              <a:spcPct val="90000"/>
-            </a:lnSpc>
-            <a:spcBef>
-              <a:spcPct val="0"/>
-            </a:spcBef>
-            <a:spcAft>
-              <a:spcPct val="35000"/>
-            </a:spcAft>
-            <a:buNone/>
-            <a:defRPr b="1"/>
-          </a:pPr>
-          <a:r>
-            <a:rPr lang="en-US" sz="1400" kern="1200"/>
-            <a:t>I answered both questions</a:t>
-          </a:r>
-        </a:p>
-      </dsp:txBody>
-      <dsp:txXfrm>
-        <a:off x="4920315" y="1479031"/>
-        <a:ext cx="1394296" cy="562075"/>
-      </dsp:txXfrm>
-    </dsp:sp>
-    <dsp:sp modelId="{CC8FAE22-73FF-44E3-B69D-853F32E85514}">
-      <dsp:nvSpPr>
-        <dsp:cNvPr id="0" name=""/>
-        <dsp:cNvSpPr/>
-      </dsp:nvSpPr>
-      <dsp:spPr>
-        <a:xfrm>
-          <a:off x="4920315" y="2071408"/>
-          <a:ext cx="1394296" cy="369545"/>
-        </a:xfrm>
-        <a:prstGeom prst="rect">
-          <a:avLst/>
-        </a:prstGeom>
-        <a:noFill/>
-        <a:ln>
-          <a:noFill/>
-        </a:ln>
-        <a:effectLst/>
-      </dsp:spPr>
-      <dsp:style>
-        <a:lnRef idx="0">
-          <a:scrgbClr r="0" g="0" b="0"/>
-        </a:lnRef>
-        <a:fillRef idx="0">
-          <a:scrgbClr r="0" g="0" b="0"/>
-        </a:fillRef>
-        <a:effectRef idx="0">
-          <a:scrgbClr r="0" g="0" b="0"/>
-        </a:effectRef>
-        <a:fontRef idx="minor"/>
-      </dsp:style>
-      <dsp:txBody>
-        <a:bodyPr spcFirstLastPara="0" vert="horz" wrap="square" lIns="0" tIns="0" rIns="0" bIns="0" numCol="1" spcCol="1270" anchor="t" anchorCtr="0">
-          <a:noAutofit/>
-        </a:bodyPr>
-        <a:lstStyle/>
-        <a:p>
-          <a:pPr marL="0" lvl="0" indent="0" algn="l" defTabSz="488950">
-            <a:lnSpc>
-              <a:spcPct val="90000"/>
-            </a:lnSpc>
-            <a:spcBef>
-              <a:spcPct val="0"/>
-            </a:spcBef>
-            <a:spcAft>
-              <a:spcPct val="35000"/>
-            </a:spcAft>
-            <a:buNone/>
-          </a:pPr>
-          <a:r>
-            <a:rPr lang="en-US" sz="1100" kern="1200"/>
-            <a:t>Q1: blah^2</a:t>
-          </a:r>
-        </a:p>
-        <a:p>
-          <a:pPr marL="0" lvl="0" indent="0" algn="l" defTabSz="488950">
-            <a:lnSpc>
-              <a:spcPct val="90000"/>
-            </a:lnSpc>
-            <a:spcBef>
-              <a:spcPct val="0"/>
-            </a:spcBef>
-            <a:spcAft>
-              <a:spcPct val="35000"/>
-            </a:spcAft>
-            <a:buNone/>
-          </a:pPr>
-          <a:r>
-            <a:rPr lang="en-US" sz="1100" kern="1200"/>
-            <a:t>Q2: blah^3</a:t>
-          </a:r>
-        </a:p>
-      </dsp:txBody>
-      <dsp:txXfrm>
-        <a:off x="4920315" y="2071408"/>
-        <a:ext cx="1394296" cy="369545"/>
-      </dsp:txXfrm>
-    </dsp:sp>
-    <dsp:sp modelId="{57598D28-EB80-45F2-8E0A-3D3E78423867}">
-      <dsp:nvSpPr>
-        <dsp:cNvPr id="0" name=""/>
-        <dsp:cNvSpPr/>
-      </dsp:nvSpPr>
-      <dsp:spPr>
-        <a:xfrm>
-          <a:off x="6558614" y="925879"/>
-          <a:ext cx="488003" cy="488003"/>
-        </a:xfrm>
-        <a:prstGeom prst="rect">
-          <a:avLst/>
-        </a:prstGeom>
-        <a:blipFill>
-          <a:blip xmlns:r="http://schemas.openxmlformats.org/officeDocument/2006/relationships" r:embed="rId9">
-            <a:extLst>
-              <a:ext uri="{28A0092B-C50C-407E-A947-70E740481C1C}">
-                <a14:useLocalDpi xmlns:a14="http://schemas.microsoft.com/office/drawing/2010/main" val="0"/>
-              </a:ext>
-              <a:ext uri="{96DAC541-7B7A-43D3-8B79-37D633B846F1}">
-                <asvg:svgBlip xmlns:asvg="http://schemas.microsoft.com/office/drawing/2016/SVG/main" r:embed="rId10"/>
-              </a:ext>
-            </a:extLst>
-          </a:blip>
-          <a:stretch>
-            <a:fillRect/>
-          </a:stretch>
-        </a:blipFill>
-        <a:ln w="15875" cap="flat" cmpd="sng" algn="ctr">
-          <a:noFill/>
-          <a:prstDash val="solid"/>
-        </a:ln>
-        <a:effectLst/>
-      </dsp:spPr>
-      <dsp:style>
-        <a:lnRef idx="2">
-          <a:scrgbClr r="0" g="0" b="0"/>
-        </a:lnRef>
-        <a:fillRef idx="1">
-          <a:scrgbClr r="0" g="0" b="0"/>
-        </a:fillRef>
-        <a:effectRef idx="0">
-          <a:scrgbClr r="0" g="0" b="0"/>
-        </a:effectRef>
-        <a:fontRef idx="minor">
-          <a:schemeClr val="lt1"/>
-        </a:fontRef>
-      </dsp:style>
-    </dsp:sp>
-    <dsp:sp modelId="{DFD86F3B-F072-4560-90E6-D2B6B5F6D3F2}">
-      <dsp:nvSpPr>
-        <dsp:cNvPr id="0" name=""/>
-        <dsp:cNvSpPr/>
-      </dsp:nvSpPr>
-      <dsp:spPr>
-        <a:xfrm>
-          <a:off x="6558614" y="1479031"/>
-          <a:ext cx="1394296" cy="562075"/>
-        </a:xfrm>
-        <a:prstGeom prst="rect">
-          <a:avLst/>
-        </a:prstGeom>
-        <a:noFill/>
-        <a:ln>
-          <a:noFill/>
-        </a:ln>
-        <a:effectLst/>
-      </dsp:spPr>
-      <dsp:style>
-        <a:lnRef idx="0">
-          <a:scrgbClr r="0" g="0" b="0"/>
-        </a:lnRef>
-        <a:fillRef idx="0">
-          <a:scrgbClr r="0" g="0" b="0"/>
-        </a:fillRef>
-        <a:effectRef idx="0">
-          <a:scrgbClr r="0" g="0" b="0"/>
-        </a:effectRef>
-        <a:fontRef idx="minor"/>
-      </dsp:style>
-      <dsp:txBody>
-        <a:bodyPr spcFirstLastPara="0" vert="horz" wrap="square" lIns="0" tIns="0" rIns="0" bIns="0" numCol="1" spcCol="1270" anchor="t" anchorCtr="0">
-          <a:noAutofit/>
-        </a:bodyPr>
-        <a:lstStyle/>
-        <a:p>
-          <a:pPr marL="0" lvl="0" indent="0" algn="l" defTabSz="622300">
-            <a:lnSpc>
-              <a:spcPct val="90000"/>
-            </a:lnSpc>
-            <a:spcBef>
-              <a:spcPct val="0"/>
-            </a:spcBef>
-            <a:spcAft>
-              <a:spcPct val="35000"/>
-            </a:spcAft>
-            <a:buNone/>
-            <a:defRPr b="1"/>
-          </a:pPr>
-          <a:r>
-            <a:rPr lang="en-US" sz="1400" kern="1200"/>
-            <a:t>Here is what I found overall:</a:t>
-          </a:r>
-        </a:p>
-      </dsp:txBody>
-      <dsp:txXfrm>
-        <a:off x="6558614" y="1479031"/>
-        <a:ext cx="1394296" cy="562075"/>
-      </dsp:txXfrm>
-    </dsp:sp>
-    <dsp:sp modelId="{9049E4BA-955F-4E6A-B1A6-CF18035C9B4F}">
-      <dsp:nvSpPr>
-        <dsp:cNvPr id="0" name=""/>
-        <dsp:cNvSpPr/>
-      </dsp:nvSpPr>
-      <dsp:spPr>
-        <a:xfrm>
-          <a:off x="6558614" y="2071408"/>
-          <a:ext cx="1394296" cy="369545"/>
-        </a:xfrm>
-        <a:prstGeom prst="rect">
-          <a:avLst/>
-        </a:prstGeom>
-        <a:noFill/>
-        <a:ln>
-          <a:noFill/>
-        </a:ln>
-        <a:effectLst/>
-      </dsp:spPr>
-      <dsp:style>
-        <a:lnRef idx="0">
-          <a:scrgbClr r="0" g="0" b="0"/>
-        </a:lnRef>
-        <a:fillRef idx="0">
-          <a:scrgbClr r="0" g="0" b="0"/>
-        </a:fillRef>
-        <a:effectRef idx="0">
-          <a:scrgbClr r="0" g="0" b="0"/>
-        </a:effectRef>
-        <a:fontRef idx="minor"/>
-      </dsp:style>
-      <dsp:txBody>
-        <a:bodyPr spcFirstLastPara="0" vert="horz" wrap="square" lIns="0" tIns="0" rIns="0" bIns="0" numCol="1" spcCol="1270" anchor="t" anchorCtr="0">
-          <a:noAutofit/>
-        </a:bodyPr>
-        <a:lstStyle/>
-        <a:p>
-          <a:pPr marL="0" lvl="0" indent="0" algn="l" defTabSz="488950">
-            <a:lnSpc>
-              <a:spcPct val="90000"/>
-            </a:lnSpc>
-            <a:spcBef>
-              <a:spcPct val="0"/>
-            </a:spcBef>
-            <a:spcAft>
-              <a:spcPct val="35000"/>
-            </a:spcAft>
-            <a:buNone/>
-          </a:pPr>
-          <a:r>
-            <a:rPr lang="en-US" sz="1100" kern="1200"/>
-            <a:t>Blah is boring</a:t>
-          </a:r>
-        </a:p>
-      </dsp:txBody>
-      <dsp:txXfrm>
-        <a:off x="6558614" y="2071408"/>
-        <a:ext cx="1394296" cy="369545"/>
-      </dsp:txXfrm>
-    </dsp:sp>
-  </dsp:spTree>
-</dsp:drawing>
-</file>
-
-<file path=ppt/diagrams/layout1.xml><?xml version="1.0" encoding="utf-8"?>
-<dgm:layoutDef xmlns:dgm="http://schemas.openxmlformats.org/drawingml/2006/diagram" xmlns:a="http://schemas.openxmlformats.org/drawingml/2006/main" uniqueId="urn:microsoft.com/office/officeart/2018/2/layout/IconLabelDescriptionList">
-  <dgm:title val="Icon Label Description List"/>
-  <dgm:desc val="Use to show non-sequential or grouped chunks of information. The placeholder holds an icon or small picture, and corresponding text boxes show Level 1 and Level 2 text respectively. Works well for minimal Level 1 text accompanied by lengthier Level two text."/>
-  <dgm:catLst>
-    <dgm:cat type="icon" pri="500"/>
-  </dgm:catLst>
-  <dgm:sampData useDef="1">
-    <dgm:dataModel>
-      <dgm:ptLst/>
-      <dgm:bg/>
-      <dgm:whole/>
-    </dgm:dataModel>
-  </dgm:sampData>
-  <dgm:styleData useDef="1">
-    <dgm:dataModel>
-      <dgm:ptLst/>
-      <dgm:bg/>
-      <dgm:whole/>
-    </dgm:dataModel>
-  </dgm:styleData>
-  <dgm:clrData useDef="1">
-    <dgm:dataModel>
-      <dgm:ptLst/>
-      <dgm:bg/>
-      <dgm:whole/>
-    </dgm:dataModel>
-  </dgm:clrData>
-  <dgm:layoutNode name="root">
-    <dgm:varLst>
-      <dgm:dir/>
-      <dgm:resizeHandles val="exact"/>
-    </dgm:varLst>
-    <dgm:choose name="Name0">
-      <dgm:if name="Name1" axis="self" func="var" arg="dir" op="equ" val="norm">
-        <dgm:alg type="lin"/>
-      </dgm:if>
-      <dgm:else name="Name2">
-        <dgm:alg type="lin">
-          <dgm:param type="linDir" val="fromR"/>
-        </dgm:alg>
-      </dgm:else>
-    </dgm:choose>
-    <dgm:shape xmlns:r="http://schemas.openxmlformats.org/officeDocument/2006/relationships" r:blip="">
-      <dgm:adjLst/>
-    </dgm:shape>
-    <dgm:presOf/>
-    <dgm:constrLst>
-      <dgm:constr type="h" for="ch" forName="compNode" refType="h" fact="0.45"/>
-      <dgm:constr type="w" for="ch" forName="compNode" val="120"/>
-      <dgm:constr type="w" for="ch" forName="sibTrans" refType="w" refFor="ch" refForName="compNode" fact="0.175"/>
-      <dgm:constr type="primFontSz" for="des" forName="parTx" val="36"/>
-      <dgm:constr type="primFontSz" for="des" forName="desTx" refType="primFontSz" refFor="des" refForName="parTx" op="lte" fact="0.75"/>
-      <dgm:constr type="h" for="des" forName="compNode" op="equ"/>
-      <dgm:constr type="h" for="des" forName="iconRect" op="equ"/>
-      <dgm:constr type="w" for="des" forName="iconRect" op="equ"/>
-      <dgm:constr type="h" for="des" forName="iconSpace" op="equ"/>
-      <dgm:constr type="h" for="des" forName="parTx" op="equ"/>
-      <dgm:constr type="h" for="des" forName="txSpace" op="equ"/>
-      <dgm:constr type="h" for="des" forName="desTx" op="equ"/>
-    </dgm:constrLst>
-    <dgm:ruleLst>
-      <dgm:rule type="w" for="ch" forName="compNode" val="0" fact="NaN" max="NaN"/>
-    </dgm:ruleLst>
-    <dgm:forEach name="Name3" axis="ch" ptType="node">
-      <dgm:layoutNode name="compNode">
-        <dgm:alg type="composite"/>
-        <dgm:shape xmlns:r="http://schemas.openxmlformats.org/officeDocument/2006/relationships" r:blip="">
-          <dgm:adjLst/>
-        </dgm:shape>
-        <dgm:presOf axis="self"/>
-        <dgm:constrLst>
-          <dgm:constr type="w" for="ch" forName="iconRect" refType="w" fact="0.35"/>
-          <dgm:constr type="h" for="ch" forName="iconRect" refType="w" refFor="ch" refForName="iconRect"/>
-          <dgm:constr type="l" for="ch" forName="iconRect"/>
-          <dgm:constr type="t" for="ch" forName="iconRect"/>
-          <dgm:constr type="w" for="ch" forName="iconSpace" refType="w"/>
-          <dgm:constr type="h" for="ch" forName="iconSpace" refType="h" fact="0.043"/>
-          <dgm:constr type="l" for="ch" forName="iconSpace"/>
-          <dgm:constr type="t" for="ch" forName="iconSpace" refType="b" refFor="ch" refForName="iconRect"/>
-          <dgm:constr type="w" for="ch" forName="parTx" refType="w"/>
-          <dgm:constr type="h" for="ch" forName="parTx" refType="w" fact="0.15"/>
-          <dgm:constr type="l" for="ch" forName="parTx"/>
-          <dgm:constr type="t" for="ch" forName="parTx" refType="b" refFor="ch" refForName="iconSpace"/>
-          <dgm:constr type="h" for="ch" forName="txSpace" refType="h" fact="0.02"/>
-          <dgm:constr type="w" for="ch" forName="txSpace" refType="w"/>
-          <dgm:constr type="l" for="ch" forName="txSpace"/>
-          <dgm:constr type="t" for="ch" forName="txSpace" refType="b" refFor="ch" refForName="parTx"/>
-          <dgm:constr type="w" for="ch" forName="desTx" refType="w"/>
-          <dgm:constr type="l" for="ch" forName="desTx"/>
-          <dgm:constr type="t" for="ch" forName="desTx" refType="b" refFor="ch" refForName="txSpace"/>
-        </dgm:constrLst>
-        <dgm:ruleLst>
-          <dgm:rule type="h" val="INF" fact="NaN" max="NaN"/>
-        </dgm:ruleLst>
-        <dgm:layoutNode name="iconRect" styleLbl="node1">
-          <dgm:alg type="sp"/>
-          <dgm:shape xmlns:r="http://schemas.openxmlformats.org/officeDocument/2006/relationships" type="rect" r:blip="" blipPhldr="1">
-            <dgm:adjLst/>
-          </dgm:shape>
-          <dgm:presOf/>
-          <dgm:constrLst/>
-          <dgm:ruleLst/>
-        </dgm:layoutNode>
-        <dgm:layoutNode name="iconSpace">
-          <dgm:alg type="sp"/>
-          <dgm:shape xmlns:r="http://schemas.openxmlformats.org/officeDocument/2006/relationships" r:blip="">
-            <dgm:adjLst/>
-          </dgm:shape>
-          <dgm:presOf/>
-          <dgm:constrLst/>
-          <dgm:ruleLst/>
-        </dgm:layoutNode>
-        <dgm:layoutNode name="parTx" styleLbl="revTx">
-          <dgm:varLst>
-            <dgm:chMax val="0"/>
-            <dgm:chPref val="0"/>
-          </dgm:varLst>
-          <dgm:alg type="tx">
-            <dgm:param type="txAnchorVert" val="t"/>
-            <dgm:param type="parTxLTRAlign" val="l"/>
-            <dgm:param type="shpTxLTRAlignCh" val="l"/>
-            <dgm:param type="parTxRTLAlign" val="r"/>
-            <dgm:param type="shpTxRTLAlignCh" val="r"/>
-          </dgm:alg>
-          <dgm:shape xmlns:r="http://schemas.openxmlformats.org/officeDocument/2006/relationships" type="rect" r:blip="">
-            <dgm:adjLst/>
-          </dgm:shape>
-          <dgm:presOf axis="self" ptType="node"/>
-          <dgm:constrLst>
-            <dgm:constr type="lMarg"/>
-            <dgm:constr type="rMarg"/>
-            <dgm:constr type="tMarg"/>
-            <dgm:constr type="bMarg"/>
-          </dgm:constrLst>
-          <dgm:ruleLst>
-            <dgm:rule type="primFontSz" val="14" fact="NaN" max="NaN"/>
-            <dgm:rule type="h" val="INF" fact="NaN" max="NaN"/>
-          </dgm:ruleLst>
-        </dgm:layoutNode>
-        <dgm:layoutNode name="txSpace">
-          <dgm:alg type="sp"/>
-          <dgm:shape xmlns:r="http://schemas.openxmlformats.org/officeDocument/2006/relationships" r:blip="">
-            <dgm:adjLst/>
-          </dgm:shape>
-          <dgm:presOf/>
-          <dgm:constrLst/>
-          <dgm:ruleLst/>
-        </dgm:layoutNode>
-        <dgm:layoutNode name="desTx" styleLbl="revTx">
-          <dgm:varLst/>
-          <dgm:alg type="tx">
-            <dgm:param type="stBulletLvl" val="0"/>
-            <dgm:param type="txAnchorVert" val="t"/>
-            <dgm:param type="parTxLTRAlign" val="l"/>
-            <dgm:param type="shpTxLTRAlignCh" val="l"/>
-            <dgm:param type="parTxRTLAlign" val="r"/>
-            <dgm:param type="shpTxRTLAlignCh" val="r"/>
-          </dgm:alg>
-          <dgm:shape xmlns:r="http://schemas.openxmlformats.org/officeDocument/2006/relationships" type="rect" r:blip="">
-            <dgm:adjLst/>
-          </dgm:shape>
-          <dgm:presOf axis="des" ptType="node"/>
-          <dgm:constrLst>
-            <dgm:constr type="secFontSz" refType="primFontSz"/>
-            <dgm:constr type="lMarg"/>
-            <dgm:constr type="rMarg"/>
-            <dgm:constr type="tMarg"/>
-            <dgm:constr type="bMarg"/>
-          </dgm:constrLst>
-          <dgm:ruleLst>
-            <dgm:rule type="primFontSz" val="NaN" fact="NaN" max="17"/>
-            <dgm:rule type="h" val="INF" fact="NaN" max="NaN"/>
-          </dgm:ruleLst>
-        </dgm:layoutNode>
-      </dgm:layoutNode>
-      <dgm:forEach name="Name4" axis="followSib" ptType="sibTrans" cnt="1">
-        <dgm:layoutNode name="sibTrans">
-          <dgm:alg type="sp"/>
-          <dgm:shape xmlns:r="http://schemas.openxmlformats.org/officeDocument/2006/relationships" r:blip="">
-            <dgm:adjLst/>
-          </dgm:shape>
-          <dgm:presOf axis="self"/>
-          <dgm:constrLst/>
-          <dgm:ruleLst/>
-        </dgm:layoutNode>
-      </dgm:forEach>
-    </dgm:forEach>
-  </dgm:layoutNode>
-  <dgm:extLst>
-    <a:ext uri="{68A01E43-0DF5-4B5B-8FA6-DAF915123BFB}">
-      <dgm1612:lstStyle xmlns:dgm1612="http://schemas.microsoft.com/office/drawing/2016/12/diagram">
-        <a:lvl1pPr>
-          <a:lnSpc>
-            <a:spcPct val="100000"/>
-          </a:lnSpc>
-          <a:defRPr b="1"/>
-        </a:lvl1pPr>
-        <a:lvl2pPr>
-          <a:lnSpc>
-            <a:spcPct val="100000"/>
-          </a:lnSpc>
-        </a:lvl2pPr>
-      </dgm1612:lstStyle>
-    </a:ext>
-  </dgm:extLst>
-</dgm:layoutDef>
-</file>
-
-<file path=ppt/diagrams/quickStyle1.xml><?xml version="1.0" encoding="utf-8"?>
-<dgm:styleDef xmlns:dgm="http://schemas.openxmlformats.org/drawingml/2006/diagram" xmlns:a="http://schemas.openxmlformats.org/drawingml/2006/main" uniqueId="urn:microsoft.com/office/officeart/2005/8/quickstyle/simple1">
-  <dgm:title val=""/>
-  <dgm:desc val=""/>
-  <dgm:catLst>
-    <dgm:cat type="simple" pri="10100"/>
-  </dgm:catLst>
-  <dgm:scene3d>
-    <a:camera prst="orthographicFront"/>
-    <a:lightRig rig="threePt" dir="t"/>
-  </dgm:scene3d>
-  <dgm:styleLbl name="node0">
-    <dgm:scene3d>
-      <a:camera prst="orthographicFront"/>
-      <a:lightRig rig="threePt" dir="t"/>
-    </dgm:scene3d>
-    <dgm:sp3d/>
-    <dgm:txPr/>
-    <dgm:style>
-      <a:lnRef idx="2">
-        <a:scrgbClr r="0" g="0" b="0"/>
-      </a:lnRef>
-      <a:fillRef idx="1">
-        <a:scrgbClr r="0" g="0" b="0"/>
-      </a:fillRef>
-      <a:effectRef idx="0">
-        <a:scrgbClr r="0" g="0" b="0"/>
-      </a:effectRef>
-      <a:fontRef idx="minor">
-        <a:schemeClr val="lt1"/>
-      </a:fontRef>
-    </dgm:style>
-  </dgm:styleLbl>
-  <dgm:styleLbl name="lnNode1">
-    <dgm:scene3d>
-      <a:camera prst="orthographicFront"/>
-      <a:lightRig rig="threePt" dir="t"/>
-    </dgm:scene3d>
-    <dgm:sp3d/>
-    <dgm:txPr/>
-    <dgm:style>
-      <a:lnRef idx="2">
-        <a:scrgbClr r="0" g="0" b="0"/>
-      </a:lnRef>
-      <a:fillRef idx="1">
-        <a:scrgbClr r="0" g="0" b="0"/>
-      </a:fillRef>
-      <a:effectRef idx="0">
-        <a:scrgbClr r="0" g="0" b="0"/>
-      </a:effectRef>
-      <a:fontRef idx="minor">
-        <a:schemeClr val="lt1"/>
-      </a:fontRef>
-    </dgm:style>
-  </dgm:styleLbl>
-  <dgm:styleLbl name="vennNode1">
-    <dgm:scene3d>
-      <a:camera prst="orthographicFront"/>
-      <a:lightRig rig="threePt" dir="t"/>
-    </dgm:scene3d>
-    <dgm:sp3d/>
-    <dgm:txPr/>
-    <dgm:style>
-      <a:lnRef idx="2">
-        <a:scrgbClr r="0" g="0" b="0"/>
-      </a:lnRef>
-      <a:fillRef idx="1">
-        <a:scrgbClr r="0" g="0" b="0"/>
-      </a:fillRef>
-      <a:effectRef idx="0">
-        <a:scrgbClr r="0" g="0" b="0"/>
-      </a:effectRef>
-      <a:fontRef idx="minor">
-        <a:schemeClr val="tx1"/>
-      </a:fontRef>
-    </dgm:style>
-  </dgm:styleLbl>
-  <dgm:styleLbl name="alignNode1">
-    <dgm:scene3d>
-      <a:camera prst="orthographicFront"/>
-      <a:lightRig rig="threePt" dir="t"/>
-    </dgm:scene3d>
-    <dgm:sp3d/>
-    <dgm:txPr/>
-    <dgm:style>
-      <a:lnRef idx="2">
-        <a:scrgbClr r="0" g="0" b="0"/>
-      </a:lnRef>
-      <a:fillRef idx="1">
-        <a:scrgbClr r="0" g="0" b="0"/>
-      </a:fillRef>
-      <a:effectRef idx="0">
-        <a:scrgbClr r="0" g="0" b="0"/>
-      </a:effectRef>
-      <a:fontRef idx="minor">
-        <a:schemeClr val="lt1"/>
-      </a:fontRef>
-    </dgm:style>
-  </dgm:styleLbl>
-  <dgm:styleLbl name="node1">
-    <dgm:scene3d>
-      <a:camera prst="orthographicFront"/>
-      <a:lightRig rig="threePt" dir="t"/>
-    </dgm:scene3d>
-    <dgm:sp3d/>
-    <dgm:txPr/>
-    <dgm:style>
-      <a:lnRef idx="2">
-        <a:scrgbClr r="0" g="0" b="0"/>
-      </a:lnRef>
-      <a:fillRef idx="1">
-        <a:scrgbClr r="0" g="0" b="0"/>
-      </a:fillRef>
-      <a:effectRef idx="0">
-        <a:scrgbClr r="0" g="0" b="0"/>
-      </a:effectRef>
-      <a:fontRef idx="minor">
-        <a:schemeClr val="lt1"/>
-      </a:fontRef>
-    </dgm:style>
-  </dgm:styleLbl>
-  <dgm:styleLbl name="node2">
-    <dgm:scene3d>
-      <a:camera prst="orthographicFront"/>
-      <a:lightRig rig="threePt" dir="t"/>
-    </dgm:scene3d>
-    <dgm:sp3d/>
-    <dgm:txPr/>
-    <dgm:style>
-      <a:lnRef idx="2">
-        <a:scrgbClr r="0" g="0" b="0"/>
-      </a:lnRef>
-      <a:fillRef idx="1">
-        <a:scrgbClr r="0" g="0" b="0"/>
-      </a:fillRef>
-      <a:effectRef idx="0">
-        <a:scrgbClr r="0" g="0" b="0"/>
-      </a:effectRef>
-      <a:fontRef idx="minor">
-        <a:schemeClr val="lt1"/>
-      </a:fontRef>
-    </dgm:style>
-  </dgm:styleLbl>
-  <dgm:styleLbl name="node3">
-    <dgm:scene3d>
-      <a:camera prst="orthographicFront"/>
-      <a:lightRig rig="threePt" dir="t"/>
-    </dgm:scene3d>
-    <dgm:sp3d/>
-    <dgm:txPr/>
-    <dgm:style>
-      <a:lnRef idx="2">
-        <a:scrgbClr r="0" g="0" b="0"/>
-      </a:lnRef>
-      <a:fillRef idx="1">
-        <a:scrgbClr r="0" g="0" b="0"/>
-      </a:fillRef>
-      <a:effectRef idx="0">
-        <a:scrgbClr r="0" g="0" b="0"/>
-      </a:effectRef>
-      <a:fontRef idx="minor">
-        <a:schemeClr val="lt1"/>
-      </a:fontRef>
-    </dgm:style>
-  </dgm:styleLbl>
-  <dgm:styleLbl name="node4">
-    <dgm:scene3d>
-      <a:camera prst="orthographicFront"/>
-      <a:lightRig rig="threePt" dir="t"/>
-    </dgm:scene3d>
-    <dgm:sp3d/>
-    <dgm:txPr/>
-    <dgm:style>
-      <a:lnRef idx="2">
-        <a:scrgbClr r="0" g="0" b="0"/>
-      </a:lnRef>
-      <a:fillRef idx="1">
-        <a:scrgbClr r="0" g="0" b="0"/>
-      </a:fillRef>
-      <a:effectRef idx="0">
-        <a:scrgbClr r="0" g="0" b="0"/>
-      </a:effectRef>
-      <a:fontRef idx="minor">
-        <a:schemeClr val="lt1"/>
-      </a:fontRef>
-    </dgm:style>
-  </dgm:styleLbl>
-  <dgm:styleLbl name="fgImgPlace1">
-    <dgm:scene3d>
-      <a:camera prst="orthographicFront"/>
-      <a:lightRig rig="threePt" dir="t"/>
-    </dgm:scene3d>
-    <dgm:sp3d/>
-    <dgm:txPr/>
-    <dgm:style>
-      <a:lnRef idx="2">
-        <a:scrgbClr r="0" g="0" b="0"/>
-      </a:lnRef>
-      <a:fillRef idx="1">
-        <a:scrgbClr r="0" g="0" b="0"/>
-      </a:fillRef>
-      <a:effectRef idx="0">
-        <a:scrgbClr r="0" g="0" b="0"/>
-      </a:effectRef>
-      <a:fontRef idx="minor"/>
-    </dgm:style>
-  </dgm:styleLbl>
-  <dgm:styleLbl name="alignImgPlace1">
-    <dgm:scene3d>
-      <a:camera prst="orthographicFront"/>
-      <a:lightRig rig="threePt" dir="t"/>
-    </dgm:scene3d>
-    <dgm:sp3d/>
-    <dgm:txPr/>
-    <dgm:style>
-      <a:lnRef idx="2">
-        <a:scrgbClr r="0" g="0" b="0"/>
-      </a:lnRef>
-      <a:fillRef idx="1">
-        <a:scrgbClr r="0" g="0" b="0"/>
-      </a:fillRef>
-      <a:effectRef idx="0">
-        <a:scrgbClr r="0" g="0" b="0"/>
-      </a:effectRef>
-      <a:fontRef idx="minor"/>
-    </dgm:style>
-  </dgm:styleLbl>
-  <dgm:styleLbl name="bgImgPlace1">
-    <dgm:scene3d>
-      <a:camera prst="orthographicFront"/>
-      <a:lightRig rig="threePt" dir="t"/>
-    </dgm:scene3d>
-    <dgm:sp3d/>
-    <dgm:txPr/>
-    <dgm:style>
-      <a:lnRef idx="2">
-        <a:scrgbClr r="0" g="0" b="0"/>
-      </a:lnRef>
-      <a:fillRef idx="1">
-        <a:scrgbClr r="0" g="0" b="0"/>
-      </a:fillRef>
-      <a:effectRef idx="0">
-        <a:scrgbClr r="0" g="0" b="0"/>
-      </a:effectRef>
-      <a:fontRef idx="minor"/>
-    </dgm:style>
-  </dgm:styleLbl>
-  <dgm:styleLbl name="sibTrans2D1">
-    <dgm:scene3d>
-      <a:camera prst="orthographicFront"/>
-      <a:lightRig rig="threePt" dir="t"/>
-    </dgm:scene3d>
-    <dgm:sp3d/>
-    <dgm:txPr/>
-    <dgm:style>
-      <a:lnRef idx="0">
-        <a:scrgbClr r="0" g="0" b="0"/>
-      </a:lnRef>
-      <a:fillRef idx="1">
-        <a:scrgbClr r="0" g="0" b="0"/>
-      </a:fillRef>
-      <a:effectRef idx="0">
-        <a:scrgbClr r="0" g="0" b="0"/>
-      </a:effectRef>
-      <a:fontRef idx="minor">
-        <a:schemeClr val="lt1"/>
-      </a:fontRef>
-    </dgm:style>
-  </dgm:styleLbl>
-  <dgm:styleLbl name="fgSibTrans2D1">
-    <dgm:scene3d>
-      <a:camera prst="orthographicFront"/>
-      <a:lightRig rig="threePt" dir="t"/>
-    </dgm:scene3d>
-    <dgm:sp3d/>
-    <dgm:txPr/>
-    <dgm:style>
-      <a:lnRef idx="0">
-        <a:scrgbClr r="0" g="0" b="0"/>
-      </a:lnRef>
-      <a:fillRef idx="1">
-        <a:scrgbClr r="0" g="0" b="0"/>
-      </a:fillRef>
-      <a:effectRef idx="0">
-        <a:scrgbClr r="0" g="0" b="0"/>
-      </a:effectRef>
-      <a:fontRef idx="minor">
-        <a:schemeClr val="lt1"/>
-      </a:fontRef>
-    </dgm:style>
-  </dgm:styleLbl>
-  <dgm:styleLbl name="bgSibTrans2D1">
-    <dgm:scene3d>
-      <a:camera prst="orthographicFront"/>
-      <a:lightRig rig="threePt" dir="t"/>
-    </dgm:scene3d>
-    <dgm:sp3d/>
-    <dgm:txPr/>
-    <dgm:style>
-      <a:lnRef idx="0">
-        <a:scrgbClr r="0" g="0" b="0"/>
-      </a:lnRef>
-      <a:fillRef idx="1">
-        <a:scrgbClr r="0" g="0" b="0"/>
-      </a:fillRef>
-      <a:effectRef idx="0">
-        <a:scrgbClr r="0" g="0" b="0"/>
-      </a:effectRef>
-      <a:fontRef idx="minor">
-        <a:schemeClr val="lt1"/>
-      </a:fontRef>
-    </dgm:style>
-  </dgm:styleLbl>
-  <dgm:styleLbl name="sibTrans1D1">
-    <dgm:scene3d>
-      <a:camera prst="orthographicFront"/>
-      <a:lightRig rig="threePt" dir="t"/>
-    </dgm:scene3d>
-    <dgm:sp3d/>
-    <dgm:txPr/>
-    <dgm:style>
-      <a:lnRef idx="1">
-        <a:scrgbClr r="0" g="0" b="0"/>
-      </a:lnRef>
-      <a:fillRef idx="0">
-        <a:scrgbClr r="0" g="0" b="0"/>
-      </a:fillRef>
-      <a:effectRef idx="0">
-        <a:scrgbClr r="0" g="0" b="0"/>
-      </a:effectRef>
-      <a:fontRef idx="minor"/>
-    </dgm:style>
-  </dgm:styleLbl>
-  <dgm:styleLbl name="callout">
-    <dgm:scene3d>
-      <a:camera prst="orthographicFront"/>
-      <a:lightRig rig="threePt" dir="t"/>
-    </dgm:scene3d>
-    <dgm:sp3d/>
-    <dgm:txPr/>
-    <dgm:style>
-      <a:lnRef idx="2">
-        <a:scrgbClr r="0" g="0" b="0"/>
-      </a:lnRef>
-      <a:fillRef idx="1">
-        <a:scrgbClr r="0" g="0" b="0"/>
-      </a:fillRef>
-      <a:effectRef idx="0">
-        <a:scrgbClr r="0" g="0" b="0"/>
-      </a:effectRef>
-      <a:fontRef idx="minor"/>
-    </dgm:style>
-  </dgm:styleLbl>
-  <dgm:styleLbl name="asst0">
-    <dgm:scene3d>
-      <a:camera prst="orthographicFront"/>
-      <a:lightRig rig="threePt" dir="t"/>
-    </dgm:scene3d>
-    <dgm:sp3d/>
-    <dgm:txPr/>
-    <dgm:style>
-      <a:lnRef idx="2">
-        <a:scrgbClr r="0" g="0" b="0"/>
-      </a:lnRef>
-      <a:fillRef idx="1">
-        <a:scrgbClr r="0" g="0" b="0"/>
-      </a:fillRef>
-      <a:effectRef idx="0">
-        <a:scrgbClr r="0" g="0" b="0"/>
-      </a:effectRef>
-      <a:fontRef idx="minor">
-        <a:schemeClr val="lt1"/>
-      </a:fontRef>
-    </dgm:style>
-  </dgm:styleLbl>
-  <dgm:styleLbl name="asst1">
-    <dgm:scene3d>
-      <a:camera prst="orthographicFront"/>
-      <a:lightRig rig="threePt" dir="t"/>
-    </dgm:scene3d>
-    <dgm:sp3d/>
-    <dgm:txPr/>
-    <dgm:style>
-      <a:lnRef idx="2">
-        <a:scrgbClr r="0" g="0" b="0"/>
-      </a:lnRef>
-      <a:fillRef idx="1">
-        <a:scrgbClr r="0" g="0" b="0"/>
-      </a:fillRef>
-      <a:effectRef idx="0">
-        <a:scrgbClr r="0" g="0" b="0"/>
-      </a:effectRef>
-      <a:fontRef idx="minor">
-        <a:schemeClr val="lt1"/>
-      </a:fontRef>
-    </dgm:style>
-  </dgm:styleLbl>
-  <dgm:styleLbl name="asst2">
-    <dgm:scene3d>
-      <a:camera prst="orthographicFront"/>
-      <a:lightRig rig="threePt" dir="t"/>
-    </dgm:scene3d>
-    <dgm:sp3d/>
-    <dgm:txPr/>
-    <dgm:style>
-      <a:lnRef idx="2">
-        <a:scrgbClr r="0" g="0" b="0"/>
-      </a:lnRef>
-      <a:fillRef idx="1">
-        <a:scrgbClr r="0" g="0" b="0"/>
-      </a:fillRef>
-      <a:effectRef idx="0">
-        <a:scrgbClr r="0" g="0" b="0"/>
-      </a:effectRef>
-      <a:fontRef idx="minor">
-        <a:schemeClr val="lt1"/>
-      </a:fontRef>
-    </dgm:style>
-  </dgm:styleLbl>
-  <dgm:styleLbl name="asst3">
-    <dgm:scene3d>
-      <a:camera prst="orthographicFront"/>
-      <a:lightRig rig="threePt" dir="t"/>
-    </dgm:scene3d>
-    <dgm:sp3d/>
-    <dgm:txPr/>
-    <dgm:style>
-      <a:lnRef idx="2">
-        <a:scrgbClr r="0" g="0" b="0"/>
-      </a:lnRef>
-      <a:fillRef idx="1">
-        <a:scrgbClr r="0" g="0" b="0"/>
-      </a:fillRef>
-      <a:effectRef idx="0">
-        <a:scrgbClr r="0" g="0" b="0"/>
-      </a:effectRef>
-      <a:fontRef idx="minor">
-        <a:schemeClr val="lt1"/>
-      </a:fontRef>
-    </dgm:style>
-  </dgm:styleLbl>
-  <dgm:styleLbl name="asst4">
-    <dgm:scene3d>
-      <a:camera prst="orthographicFront"/>
-      <a:lightRig rig="threePt" dir="t"/>
-    </dgm:scene3d>
-    <dgm:sp3d/>
-    <dgm:txPr/>
-    <dgm:style>
-      <a:lnRef idx="2">
-        <a:scrgbClr r="0" g="0" b="0"/>
-      </a:lnRef>
-      <a:fillRef idx="1">
-        <a:scrgbClr r="0" g="0" b="0"/>
-      </a:fillRef>
-      <a:effectRef idx="0">
-        <a:scrgbClr r="0" g="0" b="0"/>
-      </a:effectRef>
-      <a:fontRef idx="minor">
-        <a:schemeClr val="lt1"/>
-      </a:fontRef>
-    </dgm:style>
-  </dgm:styleLbl>
-  <dgm:styleLbl name="parChTrans2D1">
-    <dgm:scene3d>
-      <a:camera prst="orthographicFront"/>
-      <a:lightRig rig="threePt" dir="t"/>
-    </dgm:scene3d>
-    <dgm:sp3d/>
-    <dgm:txPr/>
-    <dgm:style>
-      <a:lnRef idx="2">
-        <a:scrgbClr r="0" g="0" b="0"/>
-      </a:lnRef>
-      <a:fillRef idx="1">
-        <a:scrgbClr r="0" g="0" b="0"/>
-      </a:fillRef>
-      <a:effectRef idx="0">
-        <a:scrgbClr r="0" g="0" b="0"/>
-      </a:effectRef>
-      <a:fontRef idx="minor">
-        <a:schemeClr val="lt1"/>
-      </a:fontRef>
-    </dgm:style>
-  </dgm:styleLbl>
-  <dgm:styleLbl name="parChTrans2D2">
-    <dgm:scene3d>
-      <a:camera prst="orthographicFront"/>
-      <a:lightRig rig="threePt" dir="t"/>
-    </dgm:scene3d>
-    <dgm:sp3d/>
-    <dgm:txPr/>
-    <dgm:style>
-      <a:lnRef idx="2">
-        <a:scrgbClr r="0" g="0" b="0"/>
-      </a:lnRef>
-      <a:fillRef idx="1">
-        <a:scrgbClr r="0" g="0" b="0"/>
-      </a:fillRef>
-      <a:effectRef idx="0">
-        <a:scrgbClr r="0" g="0" b="0"/>
-      </a:effectRef>
-      <a:fontRef idx="minor">
-        <a:schemeClr val="lt1"/>
-      </a:fontRef>
-    </dgm:style>
-  </dgm:styleLbl>
-  <dgm:styleLbl name="parChTrans2D3">
-    <dgm:scene3d>
-      <a:camera prst="orthographicFront"/>
-      <a:lightRig rig="threePt" dir="t"/>
-    </dgm:scene3d>
-    <dgm:sp3d/>
-    <dgm:txPr/>
-    <dgm:style>
-      <a:lnRef idx="2">
-        <a:scrgbClr r="0" g="0" b="0"/>
-      </a:lnRef>
-      <a:fillRef idx="1">
-        <a:scrgbClr r="0" g="0" b="0"/>
-      </a:fillRef>
-      <a:effectRef idx="0">
-        <a:scrgbClr r="0" g="0" b="0"/>
-      </a:effectRef>
-      <a:fontRef idx="minor">
-        <a:schemeClr val="lt1"/>
-      </a:fontRef>
-    </dgm:style>
-  </dgm:styleLbl>
-  <dgm:styleLbl name="parChTrans2D4">
-    <dgm:scene3d>
-      <a:camera prst="orthographicFront"/>
-      <a:lightRig rig="threePt" dir="t"/>
-    </dgm:scene3d>
-    <dgm:sp3d/>
-    <dgm:txPr/>
-    <dgm:style>
-      <a:lnRef idx="2">
-        <a:scrgbClr r="0" g="0" b="0"/>
-      </a:lnRef>
-      <a:fillRef idx="1">
-        <a:scrgbClr r="0" g="0" b="0"/>
-      </a:fillRef>
-      <a:effectRef idx="0">
-        <a:scrgbClr r="0" g="0" b="0"/>
-      </a:effectRef>
-      <a:fontRef idx="minor">
-        <a:schemeClr val="lt1"/>
-      </a:fontRef>
-    </dgm:style>
-  </dgm:styleLbl>
-  <dgm:styleLbl name="parChTrans1D1">
-    <dgm:scene3d>
-      <a:camera prst="orthographicFront"/>
-      <a:lightRig rig="threePt" dir="t"/>
-    </dgm:scene3d>
-    <dgm:sp3d/>
-    <dgm:txPr/>
-    <dgm:style>
-      <a:lnRef idx="2">
-        <a:scrgbClr r="0" g="0" b="0"/>
-      </a:lnRef>
-      <a:fillRef idx="0">
-        <a:scrgbClr r="0" g="0" b="0"/>
-      </a:fillRef>
-      <a:effectRef idx="0">
-        <a:scrgbClr r="0" g="0" b="0"/>
-      </a:effectRef>
-      <a:fontRef idx="minor"/>
-    </dgm:style>
-  </dgm:styleLbl>
-  <dgm:styleLbl name="parChTrans1D2">
-    <dgm:scene3d>
-      <a:camera prst="orthographicFront"/>
-      <a:lightRig rig="threePt" dir="t"/>
-    </dgm:scene3d>
-    <dgm:sp3d/>
-    <dgm:txPr/>
-    <dgm:style>
-      <a:lnRef idx="2">
-        <a:scrgbClr r="0" g="0" b="0"/>
-      </a:lnRef>
-      <a:fillRef idx="0">
-        <a:scrgbClr r="0" g="0" b="0"/>
-      </a:fillRef>
-      <a:effectRef idx="0">
-        <a:scrgbClr r="0" g="0" b="0"/>
-      </a:effectRef>
-      <a:fontRef idx="minor"/>
-    </dgm:style>
-  </dgm:styleLbl>
-  <dgm:styleLbl name="parChTrans1D3">
-    <dgm:scene3d>
-      <a:camera prst="orthographicFront"/>
-      <a:lightRig rig="threePt" dir="t"/>
-    </dgm:scene3d>
-    <dgm:sp3d/>
-    <dgm:txPr/>
-    <dgm:style>
-      <a:lnRef idx="2">
-        <a:scrgbClr r="0" g="0" b="0"/>
-      </a:lnRef>
-      <a:fillRef idx="0">
-        <a:scrgbClr r="0" g="0" b="0"/>
-      </a:fillRef>
-      <a:effectRef idx="0">
-        <a:scrgbClr r="0" g="0" b="0"/>
-      </a:effectRef>
-      <a:fontRef idx="minor"/>
-    </dgm:style>
-  </dgm:styleLbl>
-  <dgm:styleLbl name="parChTrans1D4">
-    <dgm:scene3d>
-      <a:camera prst="orthographicFront"/>
-      <a:lightRig rig="threePt" dir="t"/>
-    </dgm:scene3d>
-    <dgm:sp3d/>
-    <dgm:txPr/>
-    <dgm:style>
-      <a:lnRef idx="2">
-        <a:scrgbClr r="0" g="0" b="0"/>
-      </a:lnRef>
-      <a:fillRef idx="0">
-        <a:scrgbClr r="0" g="0" b="0"/>
-      </a:fillRef>
-      <a:effectRef idx="0">
-        <a:scrgbClr r="0" g="0" b="0"/>
-      </a:effectRef>
-      <a:fontRef idx="minor"/>
-    </dgm:style>
-  </dgm:styleLbl>
-  <dgm:styleLbl name="fgAcc1">
-    <dgm:scene3d>
-      <a:camera prst="orthographicFront"/>
-      <a:lightRig rig="threePt" dir="t"/>
-    </dgm:scene3d>
-    <dgm:sp3d/>
-    <dgm:txPr/>
-    <dgm:style>
-      <a:lnRef idx="2">
-        <a:scrgbClr r="0" g="0" b="0"/>
-      </a:lnRef>
-      <a:fillRef idx="1">
-        <a:scrgbClr r="0" g="0" b="0"/>
-      </a:fillRef>
-      <a:effectRef idx="0">
-        <a:scrgbClr r="0" g="0" b="0"/>
-      </a:effectRef>
-      <a:fontRef idx="minor"/>
-    </dgm:style>
-  </dgm:styleLbl>
-  <dgm:styleLbl name="conFgAcc1">
-    <dgm:scene3d>
-      <a:camera prst="orthographicFront"/>
-      <a:lightRig rig="threePt" dir="t"/>
-    </dgm:scene3d>
-    <dgm:sp3d/>
-    <dgm:txPr/>
-    <dgm:style>
-      <a:lnRef idx="2">
-        <a:scrgbClr r="0" g="0" b="0"/>
-      </a:lnRef>
-      <a:fillRef idx="1">
-        <a:scrgbClr r="0" g="0" b="0"/>
-      </a:fillRef>
-      <a:effectRef idx="0">
-        <a:scrgbClr r="0" g="0" b="0"/>
-      </a:effectRef>
-      <a:fontRef idx="minor"/>
-    </dgm:style>
-  </dgm:styleLbl>
-  <dgm:styleLbl name="alignAcc1">
-    <dgm:scene3d>
-      <a:camera prst="orthographicFront"/>
-      <a:lightRig rig="threePt" dir="t"/>
-    </dgm:scene3d>
-    <dgm:sp3d/>
-    <dgm:txPr/>
-    <dgm:style>
-      <a:lnRef idx="2">
-        <a:scrgbClr r="0" g="0" b="0"/>
-      </a:lnRef>
-      <a:fillRef idx="1">
-        <a:scrgbClr r="0" g="0" b="0"/>
-      </a:fillRef>
-      <a:effectRef idx="0">
-        <a:scrgbClr r="0" g="0" b="0"/>
-      </a:effectRef>
-      <a:fontRef idx="minor"/>
-    </dgm:style>
-  </dgm:styleLbl>
-  <dgm:styleLbl name="trAlignAcc1">
-    <dgm:scene3d>
-      <a:camera prst="orthographicFront"/>
-      <a:lightRig rig="threePt" dir="t"/>
-    </dgm:scene3d>
-    <dgm:sp3d/>
-    <dgm:txPr/>
-    <dgm:style>
-      <a:lnRef idx="1">
-        <a:scrgbClr r="0" g="0" b="0"/>
-      </a:lnRef>
-      <a:fillRef idx="1">
-        <a:scrgbClr r="0" g="0" b="0"/>
-      </a:fillRef>
-      <a:effectRef idx="0">
-        <a:scrgbClr r="0" g="0" b="0"/>
-      </a:effectRef>
-      <a:fontRef idx="minor"/>
-    </dgm:style>
-  </dgm:styleLbl>
-  <dgm:styleLbl name="bgAcc1">
-    <dgm:scene3d>
-      <a:camera prst="orthographicFront"/>
-      <a:lightRig rig="threePt" dir="t"/>
-    </dgm:scene3d>
-    <dgm:sp3d/>
-    <dgm:txPr/>
-    <dgm:style>
-      <a:lnRef idx="2">
-        <a:scrgbClr r="0" g="0" b="0"/>
-      </a:lnRef>
-      <a:fillRef idx="1">
-        <a:scrgbClr r="0" g="0" b="0"/>
-      </a:fillRef>
-      <a:effectRef idx="0">
-        <a:scrgbClr r="0" g="0" b="0"/>
-      </a:effectRef>
-      <a:fontRef idx="minor"/>
-    </dgm:style>
-  </dgm:styleLbl>
-  <dgm:styleLbl name="solidFgAcc1">
-    <dgm:scene3d>
-      <a:camera prst="orthographicFront"/>
-      <a:lightRig rig="threePt" dir="t"/>
-    </dgm:scene3d>
-    <dgm:sp3d/>
-    <dgm:txPr/>
-    <dgm:style>
-      <a:lnRef idx="2">
-        <a:scrgbClr r="0" g="0" b="0"/>
-      </a:lnRef>
-      <a:fillRef idx="1">
-        <a:scrgbClr r="0" g="0" b="0"/>
-      </a:fillRef>
-      <a:effectRef idx="0">
-        <a:scrgbClr r="0" g="0" b="0"/>
-      </a:effectRef>
-      <a:fontRef idx="minor"/>
-    </dgm:style>
-  </dgm:styleLbl>
-  <dgm:styleLbl name="solidAlignAcc1">
-    <dgm:scene3d>
-      <a:camera prst="orthographicFront"/>
-      <a:lightRig rig="threePt" dir="t"/>
-    </dgm:scene3d>
-    <dgm:sp3d/>
-    <dgm:txPr/>
-    <dgm:style>
-      <a:lnRef idx="2">
-        <a:scrgbClr r="0" g="0" b="0"/>
-      </a:lnRef>
-      <a:fillRef idx="1">
-        <a:scrgbClr r="0" g="0" b="0"/>
-      </a:fillRef>
-      <a:effectRef idx="0">
-        <a:scrgbClr r="0" g="0" b="0"/>
-      </a:effectRef>
-      <a:fontRef idx="minor"/>
-    </dgm:style>
-  </dgm:styleLbl>
-  <dgm:styleLbl name="solidBgAcc1">
-    <dgm:scene3d>
-      <a:camera prst="orthographicFront"/>
-      <a:lightRig rig="threePt" dir="t"/>
-    </dgm:scene3d>
-    <dgm:sp3d/>
-    <dgm:txPr/>
-    <dgm:style>
-      <a:lnRef idx="2">
-        <a:scrgbClr r="0" g="0" b="0"/>
-      </a:lnRef>
-      <a:fillRef idx="1">
-        <a:scrgbClr r="0" g="0" b="0"/>
-      </a:fillRef>
-      <a:effectRef idx="0">
-        <a:scrgbClr r="0" g="0" b="0"/>
-      </a:effectRef>
-      <a:fontRef idx="minor"/>
-    </dgm:style>
-  </dgm:styleLbl>
-  <dgm:styleLbl name="fgAccFollowNode1">
-    <dgm:scene3d>
-      <a:camera prst="orthographicFront"/>
-      <a:lightRig rig="threePt" dir="t"/>
-    </dgm:scene3d>
-    <dgm:sp3d/>
-    <dgm:txPr/>
-    <dgm:style>
-      <a:lnRef idx="2">
-        <a:scrgbClr r="0" g="0" b="0"/>
-      </a:lnRef>
-      <a:fillRef idx="1">
-        <a:scrgbClr r="0" g="0" b="0"/>
-      </a:fillRef>
-      <a:effectRef idx="0">
-        <a:scrgbClr r="0" g="0" b="0"/>
-      </a:effectRef>
-      <a:fontRef idx="minor"/>
-    </dgm:style>
-  </dgm:styleLbl>
-  <dgm:styleLbl name="alignAccFollowNode1">
-    <dgm:scene3d>
-      <a:camera prst="orthographicFront"/>
-      <a:lightRig rig="threePt" dir="t"/>
-    </dgm:scene3d>
-    <dgm:sp3d/>
-    <dgm:txPr/>
-    <dgm:style>
-      <a:lnRef idx="2">
-        <a:scrgbClr r="0" g="0" b="0"/>
-      </a:lnRef>
-      <a:fillRef idx="1">
-        <a:scrgbClr r="0" g="0" b="0"/>
-      </a:fillRef>
-      <a:effectRef idx="0">
-        <a:scrgbClr r="0" g="0" b="0"/>
-      </a:effectRef>
-      <a:fontRef idx="minor"/>
-    </dgm:style>
-  </dgm:styleLbl>
-  <dgm:styleLbl name="bgAccFollowNode1">
-    <dgm:scene3d>
-      <a:camera prst="orthographicFront"/>
-      <a:lightRig rig="threePt" dir="t"/>
-    </dgm:scene3d>
-    <dgm:sp3d/>
-    <dgm:txPr/>
-    <dgm:style>
-      <a:lnRef idx="2">
-        <a:scrgbClr r="0" g="0" b="0"/>
-      </a:lnRef>
-      <a:fillRef idx="1">
-        <a:scrgbClr r="0" g="0" b="0"/>
-      </a:fillRef>
-      <a:effectRef idx="0">
-        <a:scrgbClr r="0" g="0" b="0"/>
-      </a:effectRef>
-      <a:fontRef idx="minor"/>
-    </dgm:style>
-  </dgm:styleLbl>
-  <dgm:styleLbl name="fgAcc0">
-    <dgm:scene3d>
-      <a:camera prst="orthographicFront"/>
-      <a:lightRig rig="threePt" dir="t"/>
-    </dgm:scene3d>
-    <dgm:sp3d/>
-    <dgm:txPr/>
-    <dgm:style>
-      <a:lnRef idx="2">
-        <a:scrgbClr r="0" g="0" b="0"/>
-      </a:lnRef>
-      <a:fillRef idx="1">
-        <a:scrgbClr r="0" g="0" b="0"/>
-      </a:fillRef>
-      <a:effectRef idx="0">
-        <a:scrgbClr r="0" g="0" b="0"/>
-      </a:effectRef>
-      <a:fontRef idx="minor"/>
-    </dgm:style>
-  </dgm:styleLbl>
-  <dgm:styleLbl name="fgAcc2">
-    <dgm:scene3d>
-      <a:camera prst="orthographicFront"/>
-      <a:lightRig rig="threePt" dir="t"/>
-    </dgm:scene3d>
-    <dgm:sp3d/>
-    <dgm:txPr/>
-    <dgm:style>
-      <a:lnRef idx="2">
-        <a:scrgbClr r="0" g="0" b="0"/>
-      </a:lnRef>
-      <a:fillRef idx="1">
-        <a:scrgbClr r="0" g="0" b="0"/>
-      </a:fillRef>
-      <a:effectRef idx="0">
-        <a:scrgbClr r="0" g="0" b="0"/>
-      </a:effectRef>
-      <a:fontRef idx="minor"/>
-    </dgm:style>
-  </dgm:styleLbl>
-  <dgm:styleLbl name="fgAcc3">
-    <dgm:scene3d>
-      <a:camera prst="orthographicFront"/>
-      <a:lightRig rig="threePt" dir="t"/>
-    </dgm:scene3d>
-    <dgm:sp3d/>
-    <dgm:txPr/>
-    <dgm:style>
-      <a:lnRef idx="2">
-        <a:scrgbClr r="0" g="0" b="0"/>
-      </a:lnRef>
-      <a:fillRef idx="1">
-        <a:scrgbClr r="0" g="0" b="0"/>
-      </a:fillRef>
-      <a:effectRef idx="0">
-        <a:scrgbClr r="0" g="0" b="0"/>
-      </a:effectRef>
-      <a:fontRef idx="minor"/>
-    </dgm:style>
-  </dgm:styleLbl>
-  <dgm:styleLbl name="fgAcc4">
-    <dgm:scene3d>
-      <a:camera prst="orthographicFront"/>
-      <a:lightRig rig="threePt" dir="t"/>
-    </dgm:scene3d>
-    <dgm:sp3d/>
-    <dgm:txPr/>
-    <dgm:style>
-      <a:lnRef idx="2">
-        <a:scrgbClr r="0" g="0" b="0"/>
-      </a:lnRef>
-      <a:fillRef idx="1">
-        <a:scrgbClr r="0" g="0" b="0"/>
-      </a:fillRef>
-      <a:effectRef idx="0">
-        <a:scrgbClr r="0" g="0" b="0"/>
-      </a:effectRef>
-      <a:fontRef idx="minor"/>
-    </dgm:style>
-  </dgm:styleLbl>
-  <dgm:styleLbl name="bgShp">
-    <dgm:scene3d>
-      <a:camera prst="orthographicFront"/>
-      <a:lightRig rig="threePt" dir="t"/>
-    </dgm:scene3d>
-    <dgm:sp3d/>
-    <dgm:txPr/>
-    <dgm:style>
-      <a:lnRef idx="0">
-        <a:scrgbClr r="0" g="0" b="0"/>
-      </a:lnRef>
-      <a:fillRef idx="1">
-        <a:scrgbClr r="0" g="0" b="0"/>
-      </a:fillRef>
-      <a:effectRef idx="0">
-        <a:scrgbClr r="0" g="0" b="0"/>
-      </a:effectRef>
-      <a:fontRef idx="minor"/>
-    </dgm:style>
-  </dgm:styleLbl>
-  <dgm:styleLbl name="dkBgShp">
-    <dgm:scene3d>
-      <a:camera prst="orthographicFront"/>
-      <a:lightRig rig="threePt" dir="t"/>
-    </dgm:scene3d>
-    <dgm:sp3d/>
-    <dgm:txPr/>
-    <dgm:style>
-      <a:lnRef idx="0">
-        <a:scrgbClr r="0" g="0" b="0"/>
-      </a:lnRef>
-      <a:fillRef idx="1">
-        <a:scrgbClr r="0" g="0" b="0"/>
-      </a:fillRef>
-      <a:effectRef idx="0">
-        <a:scrgbClr r="0" g="0" b="0"/>
-      </a:effectRef>
-      <a:fontRef idx="minor"/>
-    </dgm:style>
-  </dgm:styleLbl>
-  <dgm:styleLbl name="trBgShp">
-    <dgm:scene3d>
-      <a:camera prst="orthographicFront"/>
-      <a:lightRig rig="threePt" dir="t"/>
-    </dgm:scene3d>
-    <dgm:sp3d/>
-    <dgm:txPr/>
-    <dgm:style>
-      <a:lnRef idx="0">
-        <a:scrgbClr r="0" g="0" b="0"/>
-      </a:lnRef>
-      <a:fillRef idx="1">
-        <a:scrgbClr r="0" g="0" b="0"/>
-      </a:fillRef>
-      <a:effectRef idx="0">
-        <a:scrgbClr r="0" g="0" b="0"/>
-      </a:effectRef>
-      <a:fontRef idx="minor"/>
-    </dgm:style>
-  </dgm:styleLbl>
-  <dgm:styleLbl name="fgShp">
-    <dgm:scene3d>
-      <a:camera prst="orthographicFront"/>
-      <a:lightRig rig="threePt" dir="t"/>
-    </dgm:scene3d>
-    <dgm:sp3d/>
-    <dgm:txPr/>
-    <dgm:style>
-      <a:lnRef idx="2">
-        <a:scrgbClr r="0" g="0" b="0"/>
-      </a:lnRef>
-      <a:fillRef idx="1">
-        <a:scrgbClr r="0" g="0" b="0"/>
-      </a:fillRef>
-      <a:effectRef idx="0">
-        <a:scrgbClr r="0" g="0" b="0"/>
-      </a:effectRef>
-      <a:fontRef idx="minor"/>
-    </dgm:style>
-  </dgm:styleLbl>
-  <dgm:styleLbl name="revTx">
-    <dgm:scene3d>
-      <a:camera prst="orthographicFront"/>
-      <a:lightRig rig="threePt" dir="t"/>
-    </dgm:scene3d>
-    <dgm:sp3d/>
-    <dgm:txPr/>
-    <dgm:style>
-      <a:lnRef idx="0">
-        <a:scrgbClr r="0" g="0" b="0"/>
-      </a:lnRef>
-      <a:fillRef idx="0">
-        <a:scrgbClr r="0" g="0" b="0"/>
-      </a:fillRef>
-      <a:effectRef idx="0">
-        <a:scrgbClr r="0" g="0" b="0"/>
-      </a:effectRef>
-      <a:fontRef idx="minor"/>
-    </dgm:style>
-  </dgm:styleLbl>
-</dgm:styleDef>
-</file>
-
 <file path=ppt/notesMasters/notesMaster1.xml><?xml version="1.0" encoding="utf-8"?>
 <p:notesMaster xmlns:a="http://schemas.openxmlformats.org/drawingml/2006/main" xmlns:r="http://schemas.openxmlformats.org/officeDocument/2006/relationships" xmlns:p="http://schemas.openxmlformats.org/presentationml/2006/main">
   <p:cSld>
@@ -3875,7 +234,7 @@
           <a:p>
             <a:fld id="{10D858C0-A1C8-416E-AEEE-7668E8E54166}" type="datetimeFigureOut">
               <a:rPr lang="en-US" smtClean="0"/>
-              <a:t>11/12/20</a:t>
+              <a:t>11/17/2020</a:t>
             </a:fld>
             <a:endParaRPr lang="en-US"/>
           </a:p>
@@ -4359,7 +718,7 @@
           <a:p>
             <a:fld id="{6CBBDB16-D3F8-4765-9107-3D5BDEEA5700}" type="datetimeFigureOut">
               <a:rPr lang="en-US" smtClean="0"/>
-              <a:t>11/12/20</a:t>
+              <a:t>11/17/2020</a:t>
             </a:fld>
             <a:endParaRPr lang="en-US"/>
           </a:p>
@@ -4694,7 +1053,7 @@
           <a:p>
             <a:fld id="{6CBBDB16-D3F8-4765-9107-3D5BDEEA5700}" type="datetimeFigureOut">
               <a:rPr lang="en-US" smtClean="0"/>
-              <a:t>11/12/20</a:t>
+              <a:t>11/17/2020</a:t>
             </a:fld>
             <a:endParaRPr lang="en-US"/>
           </a:p>
@@ -4997,7 +1356,7 @@
           <a:p>
             <a:fld id="{6CBBDB16-D3F8-4765-9107-3D5BDEEA5700}" type="datetimeFigureOut">
               <a:rPr lang="en-US" smtClean="0"/>
-              <a:t>11/12/20</a:t>
+              <a:t>11/17/2020</a:t>
             </a:fld>
             <a:endParaRPr lang="en-US"/>
           </a:p>
@@ -5245,7 +1604,7 @@
           <a:p>
             <a:fld id="{6CBBDB16-D3F8-4765-9107-3D5BDEEA5700}" type="datetimeFigureOut">
               <a:rPr lang="en-US" smtClean="0"/>
-              <a:t>11/12/20</a:t>
+              <a:t>11/17/2020</a:t>
             </a:fld>
             <a:endParaRPr lang="en-US"/>
           </a:p>
@@ -5653,7 +2012,7 @@
           <a:p>
             <a:fld id="{6CBBDB16-D3F8-4765-9107-3D5BDEEA5700}" type="datetimeFigureOut">
               <a:rPr lang="en-US" smtClean="0"/>
-              <a:t>11/12/20</a:t>
+              <a:t>11/17/2020</a:t>
             </a:fld>
             <a:endParaRPr lang="en-US"/>
           </a:p>
@@ -5968,7 +2327,7 @@
           <a:p>
             <a:fld id="{6CBBDB16-D3F8-4765-9107-3D5BDEEA5700}" type="datetimeFigureOut">
               <a:rPr lang="en-US" smtClean="0"/>
-              <a:t>11/12/20</a:t>
+              <a:t>11/17/2020</a:t>
             </a:fld>
             <a:endParaRPr lang="en-US"/>
           </a:p>
@@ -6513,7 +2872,7 @@
           <a:p>
             <a:fld id="{6CBBDB16-D3F8-4765-9107-3D5BDEEA5700}" type="datetimeFigureOut">
               <a:rPr lang="en-US" smtClean="0"/>
-              <a:t>11/12/20</a:t>
+              <a:t>11/17/2020</a:t>
             </a:fld>
             <a:endParaRPr lang="en-US"/>
           </a:p>
@@ -6709,7 +3068,7 @@
           <a:p>
             <a:fld id="{6CBBDB16-D3F8-4765-9107-3D5BDEEA5700}" type="datetimeFigureOut">
               <a:rPr lang="en-US" smtClean="0"/>
-              <a:t>11/12/20</a:t>
+              <a:t>11/17/2020</a:t>
             </a:fld>
             <a:endParaRPr lang="en-US"/>
           </a:p>
@@ -6923,7 +3282,7 @@
           <a:p>
             <a:fld id="{6CBBDB16-D3F8-4765-9107-3D5BDEEA5700}" type="datetimeFigureOut">
               <a:rPr lang="en-US" smtClean="0"/>
-              <a:t>11/12/20</a:t>
+              <a:t>11/17/2020</a:t>
             </a:fld>
             <a:endParaRPr lang="en-US"/>
           </a:p>
@@ -7293,7 +3652,7 @@
           <a:p>
             <a:fld id="{6CBBDB16-D3F8-4765-9107-3D5BDEEA5700}" type="datetimeFigureOut">
               <a:rPr lang="en-US" smtClean="0"/>
-              <a:t>11/12/20</a:t>
+              <a:t>11/17/2020</a:t>
             </a:fld>
             <a:endParaRPr lang="en-US"/>
           </a:p>
@@ -7697,7 +4056,7 @@
           <a:p>
             <a:fld id="{6CBBDB16-D3F8-4765-9107-3D5BDEEA5700}" type="datetimeFigureOut">
               <a:rPr lang="en-US" smtClean="0"/>
-              <a:t>11/12/20</a:t>
+              <a:t>11/17/2020</a:t>
             </a:fld>
             <a:endParaRPr lang="en-US"/>
           </a:p>
@@ -8009,7 +4368,7 @@
           <a:p>
             <a:fld id="{6CBBDB16-D3F8-4765-9107-3D5BDEEA5700}" type="datetimeFigureOut">
               <a:rPr lang="en-US" smtClean="0"/>
-              <a:t>11/12/20</a:t>
+              <a:t>11/17/2020</a:t>
             </a:fld>
             <a:endParaRPr lang="en-US"/>
           </a:p>
@@ -8837,18 +5196,19 @@
         <p:spPr>
           <a:xfrm>
             <a:off x="1974254" y="5166421"/>
-            <a:ext cx="8445357" cy="883524"/>
+            <a:ext cx="8592924" cy="1178720"/>
           </a:xfrm>
         </p:spPr>
         <p:txBody>
           <a:bodyPr>
-            <a:normAutofit/>
+            <a:normAutofit fontScale="90000"/>
           </a:bodyPr>
           <a:lstStyle/>
           <a:p>
-            <a:r>
-              <a:rPr lang="en-US" sz="4800"/>
-              <a:t>My Ridiculous Title Slide	</a:t>
+            <a:pPr algn="l"/>
+            <a:r>
+              <a:rPr lang="en-US" sz="4800" dirty="0"/>
+              <a:t>The Affect of Covid-19 on Low Income Communities	</a:t>
             </a:r>
           </a:p>
         </p:txBody>
@@ -8871,8 +5231,8 @@
         </p:nvSpPr>
         <p:spPr>
           <a:xfrm>
-            <a:off x="2133536" y="4752007"/>
-            <a:ext cx="8286075" cy="414413"/>
+            <a:off x="10300350" y="6329239"/>
+            <a:ext cx="884117" cy="414413"/>
           </a:xfrm>
         </p:spPr>
         <p:txBody>
@@ -8887,18 +5247,7 @@
               </a:lnSpc>
             </a:pPr>
             <a:r>
-              <a:rPr lang="en-US" sz="700"/>
-              <a:t>By Joe Do and Sally Smith</a:t>
-            </a:r>
-          </a:p>
-          <a:p>
-            <a:pPr>
-              <a:lnSpc>
-                <a:spcPct val="110000"/>
-              </a:lnSpc>
-            </a:pPr>
-            <a:r>
-              <a:rPr lang="en-US" sz="700"/>
+              <a:rPr lang="en-US" sz="700" dirty="0"/>
               <a:t>October 1, 2020</a:t>
             </a:r>
           </a:p>
@@ -9323,7 +5672,12 @@
             <p:ph type="title"/>
           </p:nvPr>
         </p:nvSpPr>
-        <p:spPr/>
+        <p:spPr>
+          <a:xfrm>
+            <a:off x="2116834" y="2890385"/>
+            <a:ext cx="7958331" cy="1077229"/>
+          </a:xfrm>
+        </p:spPr>
         <p:txBody>
           <a:bodyPr/>
           <a:lstStyle/>
@@ -9331,33 +5685,8 @@
             <a:pPr algn="ctr"/>
             <a:r>
               <a:rPr lang="en-US" dirty="0"/>
-              <a:t>Questions</a:t>
-            </a:r>
-          </a:p>
-        </p:txBody>
-      </p:sp>
-      <p:sp>
-        <p:nvSpPr>
-          <p:cNvPr id="3" name="Content Placeholder 2">
-            <a:extLst>
-              <a:ext uri="{FF2B5EF4-FFF2-40B4-BE49-F238E27FC236}">
-                <a16:creationId xmlns:a16="http://schemas.microsoft.com/office/drawing/2014/main" id="{C82F2D71-7A88-43BD-ADB7-198FD2F826BE}"/>
-              </a:ext>
-            </a:extLst>
-          </p:cNvPr>
-          <p:cNvSpPr>
-            <a:spLocks noGrp="1"/>
-          </p:cNvSpPr>
-          <p:nvPr>
-            <p:ph idx="1"/>
-          </p:nvPr>
-        </p:nvSpPr>
-        <p:spPr/>
-        <p:txBody>
-          <a:bodyPr/>
-          <a:lstStyle/>
-          <a:p>
-            <a:endParaRPr lang="en-US" dirty="0"/>
+              <a:t>Questions?</a:t>
+            </a:r>
           </a:p>
         </p:txBody>
       </p:sp>
@@ -9407,40 +5736,311 @@
             <p:ph type="title"/>
           </p:nvPr>
         </p:nvSpPr>
-        <p:spPr/>
-        <p:txBody>
-          <a:bodyPr/>
-          <a:lstStyle/>
-          <a:p>
+        <p:spPr>
+          <a:xfrm>
+            <a:off x="2611808" y="808056"/>
+            <a:ext cx="7958331" cy="551617"/>
+          </a:xfrm>
+        </p:spPr>
+        <p:txBody>
+          <a:bodyPr>
+            <a:normAutofit fontScale="90000"/>
+          </a:bodyPr>
+          <a:lstStyle/>
+          <a:p>
+            <a:pPr algn="l"/>
             <a:r>
               <a:rPr lang="en-US" dirty="0"/>
-              <a:t>Participants</a:t>
-            </a:r>
-          </a:p>
-        </p:txBody>
-      </p:sp>
-      <p:sp>
-        <p:nvSpPr>
-          <p:cNvPr id="3" name="Content Placeholder 2">
+              <a:t>Team Members</a:t>
+            </a:r>
+          </a:p>
+        </p:txBody>
+      </p:sp>
+      <p:pic>
+        <p:nvPicPr>
+          <p:cNvPr id="5" name="Content Placeholder 4" descr="Icon&#10;&#10;Description automatically generated">
             <a:extLst>
               <a:ext uri="{FF2B5EF4-FFF2-40B4-BE49-F238E27FC236}">
-                <a16:creationId xmlns:a16="http://schemas.microsoft.com/office/drawing/2014/main" id="{0F6467DA-FF95-B141-874B-75FAF9376191}"/>
+                <a16:creationId xmlns:a16="http://schemas.microsoft.com/office/drawing/2014/main" id="{EEF28498-0B6C-49D8-B385-8BDED6F72C80}"/>
               </a:ext>
             </a:extLst>
           </p:cNvPr>
-          <p:cNvSpPr>
-            <a:spLocks noGrp="1"/>
-          </p:cNvSpPr>
+          <p:cNvPicPr>
+            <a:picLocks noGrp="1" noChangeAspect="1"/>
+          </p:cNvPicPr>
           <p:nvPr>
             <p:ph idx="1"/>
           </p:nvPr>
-        </p:nvSpPr>
-        <p:spPr/>
-        <p:txBody>
-          <a:bodyPr/>
-          <a:lstStyle/>
-          <a:p>
-            <a:endParaRPr lang="en-US"/>
+        </p:nvPicPr>
+        <p:blipFill>
+          <a:blip r:embed="rId2">
+            <a:extLst>
+              <a:ext uri="{28A0092B-C50C-407E-A947-70E740481C1C}">
+                <a14:useLocalDpi xmlns:a14="http://schemas.microsoft.com/office/drawing/2010/main" val="0"/>
+              </a:ext>
+            </a:extLst>
+          </a:blip>
+          <a:stretch>
+            <a:fillRect/>
+          </a:stretch>
+        </p:blipFill>
+        <p:spPr>
+          <a:xfrm>
+            <a:off x="2611808" y="2146906"/>
+            <a:ext cx="1371600" cy="1371600"/>
+          </a:xfrm>
+        </p:spPr>
+      </p:pic>
+      <p:pic>
+        <p:nvPicPr>
+          <p:cNvPr id="6" name="Content Placeholder 4" descr="Icon&#10;&#10;Description automatically generated">
+            <a:extLst>
+              <a:ext uri="{FF2B5EF4-FFF2-40B4-BE49-F238E27FC236}">
+                <a16:creationId xmlns:a16="http://schemas.microsoft.com/office/drawing/2014/main" id="{4D75E55A-FD5B-4138-AEDF-483712442067}"/>
+              </a:ext>
+            </a:extLst>
+          </p:cNvPr>
+          <p:cNvPicPr>
+            <a:picLocks noChangeAspect="1"/>
+          </p:cNvPicPr>
+          <p:nvPr/>
+        </p:nvPicPr>
+        <p:blipFill>
+          <a:blip r:embed="rId2">
+            <a:extLst>
+              <a:ext uri="{28A0092B-C50C-407E-A947-70E740481C1C}">
+                <a14:useLocalDpi xmlns:a14="http://schemas.microsoft.com/office/drawing/2010/main" val="0"/>
+              </a:ext>
+            </a:extLst>
+          </a:blip>
+          <a:stretch>
+            <a:fillRect/>
+          </a:stretch>
+        </p:blipFill>
+        <p:spPr>
+          <a:xfrm>
+            <a:off x="4444418" y="2146906"/>
+            <a:ext cx="1371600" cy="1371600"/>
+          </a:xfrm>
+          <a:prstGeom prst="rect">
+            <a:avLst/>
+          </a:prstGeom>
+        </p:spPr>
+      </p:pic>
+      <p:pic>
+        <p:nvPicPr>
+          <p:cNvPr id="7" name="Content Placeholder 4" descr="Icon&#10;&#10;Description automatically generated">
+            <a:extLst>
+              <a:ext uri="{FF2B5EF4-FFF2-40B4-BE49-F238E27FC236}">
+                <a16:creationId xmlns:a16="http://schemas.microsoft.com/office/drawing/2014/main" id="{BF8A29B3-C003-44C6-B787-9BE7E14B290B}"/>
+              </a:ext>
+            </a:extLst>
+          </p:cNvPr>
+          <p:cNvPicPr>
+            <a:picLocks noChangeAspect="1"/>
+          </p:cNvPicPr>
+          <p:nvPr/>
+        </p:nvPicPr>
+        <p:blipFill>
+          <a:blip r:embed="rId2">
+            <a:extLst>
+              <a:ext uri="{28A0092B-C50C-407E-A947-70E740481C1C}">
+                <a14:useLocalDpi xmlns:a14="http://schemas.microsoft.com/office/drawing/2010/main" val="0"/>
+              </a:ext>
+            </a:extLst>
+          </a:blip>
+          <a:stretch>
+            <a:fillRect/>
+          </a:stretch>
+        </p:blipFill>
+        <p:spPr>
+          <a:xfrm>
+            <a:off x="6261841" y="2146906"/>
+            <a:ext cx="1371600" cy="1371600"/>
+          </a:xfrm>
+          <a:prstGeom prst="rect">
+            <a:avLst/>
+          </a:prstGeom>
+        </p:spPr>
+      </p:pic>
+      <p:pic>
+        <p:nvPicPr>
+          <p:cNvPr id="8" name="Content Placeholder 4" descr="Icon&#10;&#10;Description automatically generated">
+            <a:extLst>
+              <a:ext uri="{FF2B5EF4-FFF2-40B4-BE49-F238E27FC236}">
+                <a16:creationId xmlns:a16="http://schemas.microsoft.com/office/drawing/2014/main" id="{5AEC4E3C-CC29-4963-A44F-E7123DEE6F55}"/>
+              </a:ext>
+            </a:extLst>
+          </p:cNvPr>
+          <p:cNvPicPr>
+            <a:picLocks noChangeAspect="1"/>
+          </p:cNvPicPr>
+          <p:nvPr/>
+        </p:nvPicPr>
+        <p:blipFill>
+          <a:blip r:embed="rId2">
+            <a:extLst>
+              <a:ext uri="{28A0092B-C50C-407E-A947-70E740481C1C}">
+                <a14:useLocalDpi xmlns:a14="http://schemas.microsoft.com/office/drawing/2010/main" val="0"/>
+              </a:ext>
+            </a:extLst>
+          </a:blip>
+          <a:stretch>
+            <a:fillRect/>
+          </a:stretch>
+        </p:blipFill>
+        <p:spPr>
+          <a:xfrm>
+            <a:off x="8079264" y="2146906"/>
+            <a:ext cx="1371600" cy="1371600"/>
+          </a:xfrm>
+          <a:prstGeom prst="rect">
+            <a:avLst/>
+          </a:prstGeom>
+        </p:spPr>
+      </p:pic>
+      <p:sp>
+        <p:nvSpPr>
+          <p:cNvPr id="9" name="TextBox 8">
+            <a:extLst>
+              <a:ext uri="{FF2B5EF4-FFF2-40B4-BE49-F238E27FC236}">
+                <a16:creationId xmlns:a16="http://schemas.microsoft.com/office/drawing/2014/main" id="{D7DCD131-15CD-4240-95F9-02F40211B931}"/>
+              </a:ext>
+            </a:extLst>
+          </p:cNvPr>
+          <p:cNvSpPr txBox="1"/>
+          <p:nvPr/>
+        </p:nvSpPr>
+        <p:spPr>
+          <a:xfrm>
+            <a:off x="2611808" y="3714749"/>
+            <a:ext cx="1371600" cy="307777"/>
+          </a:xfrm>
+          <a:prstGeom prst="rect">
+            <a:avLst/>
+          </a:prstGeom>
+          <a:noFill/>
+        </p:spPr>
+        <p:txBody>
+          <a:bodyPr wrap="square" rtlCol="0">
+            <a:spAutoFit/>
+          </a:bodyPr>
+          <a:lstStyle/>
+          <a:p>
+            <a:r>
+              <a:rPr lang="en-US" sz="1400" dirty="0"/>
+              <a:t>Jazlyn </a:t>
+            </a:r>
+            <a:r>
+              <a:rPr lang="en-US" sz="1400" dirty="0" err="1"/>
+              <a:t>Mazick</a:t>
+            </a:r>
+            <a:endParaRPr lang="en-US" sz="1400" dirty="0"/>
+          </a:p>
+        </p:txBody>
+      </p:sp>
+      <p:sp>
+        <p:nvSpPr>
+          <p:cNvPr id="12" name="TextBox 11">
+            <a:extLst>
+              <a:ext uri="{FF2B5EF4-FFF2-40B4-BE49-F238E27FC236}">
+                <a16:creationId xmlns:a16="http://schemas.microsoft.com/office/drawing/2014/main" id="{99644F05-472E-4F46-8338-0F651FC096AC}"/>
+              </a:ext>
+            </a:extLst>
+          </p:cNvPr>
+          <p:cNvSpPr txBox="1"/>
+          <p:nvPr/>
+        </p:nvSpPr>
+        <p:spPr>
+          <a:xfrm>
+            <a:off x="4444418" y="3714748"/>
+            <a:ext cx="1371600" cy="307777"/>
+          </a:xfrm>
+          <a:prstGeom prst="rect">
+            <a:avLst/>
+          </a:prstGeom>
+          <a:noFill/>
+        </p:spPr>
+        <p:txBody>
+          <a:bodyPr wrap="square" rtlCol="0">
+            <a:spAutoFit/>
+          </a:bodyPr>
+          <a:lstStyle/>
+          <a:p>
+            <a:r>
+              <a:rPr lang="en-US" sz="1400" dirty="0"/>
+              <a:t>Michael Rivera</a:t>
+            </a:r>
+          </a:p>
+        </p:txBody>
+      </p:sp>
+      <p:sp>
+        <p:nvSpPr>
+          <p:cNvPr id="14" name="TextBox 13">
+            <a:extLst>
+              <a:ext uri="{FF2B5EF4-FFF2-40B4-BE49-F238E27FC236}">
+                <a16:creationId xmlns:a16="http://schemas.microsoft.com/office/drawing/2014/main" id="{0580C6E0-AAAC-4997-B283-EF5F67434350}"/>
+              </a:ext>
+            </a:extLst>
+          </p:cNvPr>
+          <p:cNvSpPr txBox="1"/>
+          <p:nvPr/>
+        </p:nvSpPr>
+        <p:spPr>
+          <a:xfrm>
+            <a:off x="6277028" y="3714747"/>
+            <a:ext cx="1371600" cy="307777"/>
+          </a:xfrm>
+          <a:prstGeom prst="rect">
+            <a:avLst/>
+          </a:prstGeom>
+          <a:noFill/>
+        </p:spPr>
+        <p:txBody>
+          <a:bodyPr wrap="square" rtlCol="0">
+            <a:spAutoFit/>
+          </a:bodyPr>
+          <a:lstStyle/>
+          <a:p>
+            <a:r>
+              <a:rPr lang="en-US" sz="1400" dirty="0"/>
+              <a:t>Miguel Padilla</a:t>
+            </a:r>
+          </a:p>
+        </p:txBody>
+      </p:sp>
+      <p:sp>
+        <p:nvSpPr>
+          <p:cNvPr id="16" name="TextBox 15">
+            <a:extLst>
+              <a:ext uri="{FF2B5EF4-FFF2-40B4-BE49-F238E27FC236}">
+                <a16:creationId xmlns:a16="http://schemas.microsoft.com/office/drawing/2014/main" id="{6C5C1646-A939-4567-93E5-592137C9F0E8}"/>
+              </a:ext>
+            </a:extLst>
+          </p:cNvPr>
+          <p:cNvSpPr txBox="1"/>
+          <p:nvPr/>
+        </p:nvSpPr>
+        <p:spPr>
+          <a:xfrm>
+            <a:off x="8109638" y="3714746"/>
+            <a:ext cx="1470554" cy="307777"/>
+          </a:xfrm>
+          <a:prstGeom prst="rect">
+            <a:avLst/>
+          </a:prstGeom>
+          <a:noFill/>
+        </p:spPr>
+        <p:txBody>
+          <a:bodyPr wrap="square" rtlCol="0">
+            <a:spAutoFit/>
+          </a:bodyPr>
+          <a:lstStyle/>
+          <a:p>
+            <a:r>
+              <a:rPr lang="en-US" sz="1400" dirty="0"/>
+              <a:t>Niguel Williams</a:t>
+            </a:r>
           </a:p>
         </p:txBody>
       </p:sp>
@@ -9748,37 +6348,31 @@
           </a:fontRef>
         </p:style>
       </p:sp>
-      <p:graphicFrame>
-        <p:nvGraphicFramePr>
-          <p:cNvPr id="5" name="Content Placeholder 2">
+      <p:sp>
+        <p:nvSpPr>
+          <p:cNvPr id="4" name="Content Placeholder 3">
             <a:extLst>
               <a:ext uri="{FF2B5EF4-FFF2-40B4-BE49-F238E27FC236}">
-                <a16:creationId xmlns:a16="http://schemas.microsoft.com/office/drawing/2014/main" id="{9AE2EA85-3C37-4AA9-B10A-DCE6C61754A5}"/>
+                <a16:creationId xmlns:a16="http://schemas.microsoft.com/office/drawing/2014/main" id="{949D1049-0B27-4B61-BB19-EBC51919BD8A}"/>
               </a:ext>
             </a:extLst>
           </p:cNvPr>
-          <p:cNvGraphicFramePr>
-            <a:graphicFrameLocks noGrp="1"/>
-          </p:cNvGraphicFramePr>
+          <p:cNvSpPr>
+            <a:spLocks noGrp="1"/>
+          </p:cNvSpPr>
           <p:nvPr>
             <p:ph idx="1"/>
-            <p:extLst>
-              <p:ext uri="{D42A27DB-BD31-4B8C-83A1-F6EECF244321}">
-                <p14:modId xmlns:p14="http://schemas.microsoft.com/office/powerpoint/2010/main" val="2071270902"/>
-              </p:ext>
-            </p:extLst>
-          </p:nvPr>
-        </p:nvGraphicFramePr>
-        <p:xfrm>
-          <a:off x="2611807" y="2367883"/>
-          <a:ext cx="7958331" cy="3366834"/>
-        </p:xfrm>
-        <a:graphic>
-          <a:graphicData uri="http://schemas.openxmlformats.org/drawingml/2006/diagram">
-            <dgm:relIds xmlns:dgm="http://schemas.openxmlformats.org/drawingml/2006/diagram" xmlns:r="http://schemas.openxmlformats.org/officeDocument/2006/relationships" r:dm="rId2" r:lo="rId3" r:qs="rId4" r:cs="rId5"/>
-          </a:graphicData>
-        </a:graphic>
-      </p:graphicFrame>
+          </p:nvPr>
+        </p:nvSpPr>
+        <p:spPr/>
+        <p:txBody>
+          <a:bodyPr/>
+          <a:lstStyle/>
+          <a:p>
+            <a:endParaRPr lang="en-US"/>
+          </a:p>
+        </p:txBody>
+      </p:sp>
     </p:spTree>
     <p:extLst>
       <p:ext uri="{BB962C8B-B14F-4D97-AF65-F5344CB8AC3E}">
@@ -9825,14 +6419,20 @@
             <p:ph type="title"/>
           </p:nvPr>
         </p:nvSpPr>
-        <p:spPr/>
+        <p:spPr>
+          <a:xfrm>
+            <a:off x="2611808" y="808056"/>
+            <a:ext cx="7958331" cy="782205"/>
+          </a:xfrm>
+        </p:spPr>
         <p:txBody>
           <a:bodyPr/>
           <a:lstStyle/>
           <a:p>
+            <a:pPr algn="l"/>
             <a:r>
               <a:rPr lang="en-US" dirty="0"/>
-              <a:t>My Questions more in Depth</a:t>
+              <a:t>Focus of Analysis</a:t>
             </a:r>
           </a:p>
         </p:txBody>
@@ -9853,90 +6453,31 @@
             <p:ph idx="1"/>
           </p:nvPr>
         </p:nvSpPr>
-        <p:spPr/>
+        <p:spPr>
+          <a:xfrm>
+            <a:off x="2773599" y="1519379"/>
+            <a:ext cx="7796540" cy="3997828"/>
+          </a:xfrm>
+        </p:spPr>
         <p:txBody>
           <a:bodyPr/>
           <a:lstStyle/>
           <a:p>
             <a:r>
               <a:rPr lang="en-US" dirty="0"/>
-              <a:t>Q1:  </a:t>
-            </a:r>
-            <a:r>
-              <a:rPr lang="en-US" dirty="0" err="1"/>
-              <a:t>blahblahblahblahblahblah</a:t>
-            </a:r>
+              <a:t>What was the affect of Covid-19 on low-income communities vs. the rest of the targeted population?</a:t>
+            </a:r>
+          </a:p>
+          <a:p>
             <a:r>
               <a:rPr lang="en-US" dirty="0"/>
-              <a:t>, </a:t>
-            </a:r>
-            <a:r>
-              <a:rPr lang="en-US" dirty="0" err="1"/>
-              <a:t>blahblahblahb</a:t>
-            </a:r>
+              <a:t>Was there any affect on unemployment claims during the Covid-19 Pandemic? </a:t>
+            </a:r>
+          </a:p>
+          <a:p>
             <a:r>
               <a:rPr lang="en-US" dirty="0"/>
-              <a:t> </a:t>
-            </a:r>
-            <a:r>
-              <a:rPr lang="en-US" dirty="0" err="1"/>
-              <a:t>blahblahblahblahblahblah</a:t>
-            </a:r>
-            <a:r>
-              <a:rPr lang="en-US" dirty="0"/>
-              <a:t>, </a:t>
-            </a:r>
-            <a:r>
-              <a:rPr lang="en-US" dirty="0" err="1"/>
-              <a:t>blahblahblah</a:t>
-            </a:r>
-            <a:r>
-              <a:rPr lang="en-US" dirty="0"/>
-              <a:t> emoji data, found at Facebook API</a:t>
-            </a:r>
-          </a:p>
-          <a:p>
-            <a:r>
-              <a:rPr lang="en-US" dirty="0"/>
-              <a:t>Q2: </a:t>
-            </a:r>
-            <a:r>
-              <a:rPr lang="en-US" dirty="0" err="1"/>
-              <a:t>blahblahblahblahblahblah</a:t>
-            </a:r>
-            <a:r>
-              <a:rPr lang="en-US" dirty="0"/>
-              <a:t>, </a:t>
-            </a:r>
-            <a:r>
-              <a:rPr lang="en-US" dirty="0" err="1"/>
-              <a:t>blahblahblahb</a:t>
-            </a:r>
-            <a:r>
-              <a:rPr lang="en-US" dirty="0"/>
-              <a:t> </a:t>
-            </a:r>
-            <a:r>
-              <a:rPr lang="en-US" dirty="0" err="1"/>
-              <a:t>blahblahblahblahblahblah</a:t>
-            </a:r>
-            <a:r>
-              <a:rPr lang="en-US" dirty="0"/>
-              <a:t>, </a:t>
-            </a:r>
-            <a:r>
-              <a:rPr lang="en-US" dirty="0" err="1"/>
-              <a:t>blahblahblah</a:t>
-            </a:r>
-            <a:r>
-              <a:rPr lang="en-US" dirty="0"/>
-              <a:t> tweets data, found on Twitter API</a:t>
-            </a:r>
-          </a:p>
-          <a:p>
-            <a:r>
-              <a:rPr lang="en-US" dirty="0"/>
-              <a:t>A surprising insight I found: BLAH!</a:t>
+              <a:t>Is there any correlation between different urbanized categories as a result of Covid-19?</a:t>
             </a:r>
           </a:p>
           <a:p>
@@ -9963,6 +6504,21 @@
 <file path=ppt/slides/slide5.xml><?xml version="1.0" encoding="utf-8"?>
 <p:sld xmlns:a="http://schemas.openxmlformats.org/drawingml/2006/main" xmlns:r="http://schemas.openxmlformats.org/officeDocument/2006/relationships" xmlns:p="http://schemas.openxmlformats.org/presentationml/2006/main">
   <p:cSld>
+    <p:bg>
+      <p:bgPr>
+        <a:blipFill dpi="0" rotWithShape="1">
+          <a:blip r:embed="rId2">
+            <a:alphaModFix amt="56000"/>
+            <a:lum/>
+          </a:blip>
+          <a:srcRect/>
+          <a:stretch>
+            <a:fillRect/>
+          </a:stretch>
+        </a:blipFill>
+        <a:effectLst/>
+      </p:bgPr>
+    </p:bg>
     <p:spTree>
       <p:nvGrpSpPr>
         <p:cNvPr id="1" name=""/>
@@ -9993,11 +6549,17 @@
             <p:ph type="title"/>
           </p:nvPr>
         </p:nvSpPr>
-        <p:spPr/>
+        <p:spPr>
+          <a:xfrm>
+            <a:off x="2773599" y="808056"/>
+            <a:ext cx="7796540" cy="1077229"/>
+          </a:xfrm>
+        </p:spPr>
         <p:txBody>
           <a:bodyPr/>
           <a:lstStyle/>
           <a:p>
+            <a:pPr algn="l"/>
             <a:r>
               <a:rPr lang="en-US" dirty="0"/>
               <a:t>Sources</a:t>
@@ -10021,12 +6583,89 @@
             <p:ph idx="1"/>
           </p:nvPr>
         </p:nvSpPr>
-        <p:spPr/>
-        <p:txBody>
-          <a:bodyPr/>
-          <a:lstStyle/>
-          <a:p>
-            <a:endParaRPr lang="en-US"/>
+        <p:spPr>
+          <a:xfrm>
+            <a:off x="2773599" y="1606843"/>
+            <a:ext cx="7796540" cy="3997828"/>
+          </a:xfrm>
+          <a:ln cap="sq">
+            <a:solidFill>
+              <a:schemeClr val="accent1">
+                <a:alpha val="66000"/>
+              </a:schemeClr>
+            </a:solidFill>
+          </a:ln>
+        </p:spPr>
+        <p:txBody>
+          <a:bodyPr>
+            <a:normAutofit fontScale="85000" lnSpcReduction="10000"/>
+          </a:bodyPr>
+          <a:lstStyle/>
+          <a:p>
+            <a:r>
+              <a:rPr lang="en-US" dirty="0"/>
+              <a:t>Covid-19 Dataset (County Level Confirmed – Latest Overall Numbers)</a:t>
+            </a:r>
+          </a:p>
+          <a:p>
+            <a:pPr lvl="1"/>
+            <a:r>
+              <a:rPr lang="en-US" sz="1600" dirty="0">
+                <a:hlinkClick r:id="rId3"/>
+              </a:rPr>
+              <a:t>https://data.world/associatedpress/johns-hopkins-coronavirus-case-tracker/workspace/file?filename=1_county_level_confirmed_cases.csv</a:t>
+            </a:r>
+            <a:endParaRPr lang="en-US" sz="1600" dirty="0"/>
+          </a:p>
+          <a:p>
+            <a:r>
+              <a:rPr lang="en-US" dirty="0"/>
+              <a:t>Covid-19 Dataset (County Level Cases &amp; Deaths Timeseries)</a:t>
+            </a:r>
+          </a:p>
+          <a:p>
+            <a:pPr lvl="1"/>
+            <a:r>
+              <a:rPr lang="en-US" sz="1600" dirty="0">
+                <a:hlinkClick r:id="rId4"/>
+              </a:rPr>
+              <a:t>https://data.world/associatedpress/johns-hopkins-coronavirus-case-tracker/workspace/file?filename=2_cases_and_deaths_by_county_timeseries.csv</a:t>
+            </a:r>
+            <a:endParaRPr lang="en-US" sz="1600" dirty="0"/>
+          </a:p>
+          <a:p>
+            <a:r>
+              <a:rPr lang="en-US" dirty="0"/>
+              <a:t>Texas Counties: Median Household Income</a:t>
+            </a:r>
+          </a:p>
+          <a:p>
+            <a:pPr lvl="1"/>
+            <a:r>
+              <a:rPr lang="en-US" sz="1600" dirty="0">
+                <a:hlinkClick r:id="rId5"/>
+              </a:rPr>
+              <a:t>https://txcip.org/tac/census/morecountyinfo.php?MORE=1013</a:t>
+            </a:r>
+            <a:endParaRPr lang="en-US" sz="1600" dirty="0"/>
+          </a:p>
+          <a:p>
+            <a:r>
+              <a:rPr lang="en-US" sz="2400" dirty="0"/>
+              <a:t>Texas Weekly Claims by County</a:t>
+            </a:r>
+          </a:p>
+          <a:p>
+            <a:pPr lvl="1"/>
+            <a:r>
+              <a:rPr lang="en-US" sz="1900" b="0" i="0" u="sng" dirty="0">
+                <a:effectLst/>
+                <a:latin typeface="Slack-Lato"/>
+                <a:hlinkClick r:id="rId6"/>
+              </a:rPr>
+              <a:t>https://www.twc.texas.gov/files/agency/weekly-claims-by-county-twc.xlsx</a:t>
+            </a:r>
+            <a:endParaRPr lang="en-US" sz="1900" dirty="0"/>
           </a:p>
         </p:txBody>
       </p:sp>

</xml_diff>

<commit_message>
Project Update and push
</commit_message>
<xml_diff>
--- a/docs/Presentation/Power-Point.pptx
+++ b/docs/Presentation/Power-Point.pptx
@@ -226,7 +226,7 @@
           <a:p>
             <a:fld id="{10D858C0-A1C8-416E-AEEE-7668E8E54166}" type="datetimeFigureOut">
               <a:rPr lang="en-US" smtClean="0"/>
-              <a:t>11/20/2020</a:t>
+              <a:t>11/21/2020</a:t>
             </a:fld>
             <a:endParaRPr lang="en-US"/>
           </a:p>
@@ -803,7 +803,7 @@
           <a:p>
             <a:fld id="{6CBBDB16-D3F8-4765-9107-3D5BDEEA5700}" type="datetimeFigureOut">
               <a:rPr lang="en-US" smtClean="0"/>
-              <a:t>11/20/2020</a:t>
+              <a:t>11/21/2020</a:t>
             </a:fld>
             <a:endParaRPr lang="en-US"/>
           </a:p>
@@ -1138,7 +1138,7 @@
           <a:p>
             <a:fld id="{6CBBDB16-D3F8-4765-9107-3D5BDEEA5700}" type="datetimeFigureOut">
               <a:rPr lang="en-US" smtClean="0"/>
-              <a:t>11/20/2020</a:t>
+              <a:t>11/21/2020</a:t>
             </a:fld>
             <a:endParaRPr lang="en-US"/>
           </a:p>
@@ -1441,7 +1441,7 @@
           <a:p>
             <a:fld id="{6CBBDB16-D3F8-4765-9107-3D5BDEEA5700}" type="datetimeFigureOut">
               <a:rPr lang="en-US" smtClean="0"/>
-              <a:t>11/20/2020</a:t>
+              <a:t>11/21/2020</a:t>
             </a:fld>
             <a:endParaRPr lang="en-US"/>
           </a:p>
@@ -1689,7 +1689,7 @@
           <a:p>
             <a:fld id="{6CBBDB16-D3F8-4765-9107-3D5BDEEA5700}" type="datetimeFigureOut">
               <a:rPr lang="en-US" smtClean="0"/>
-              <a:t>11/20/2020</a:t>
+              <a:t>11/21/2020</a:t>
             </a:fld>
             <a:endParaRPr lang="en-US"/>
           </a:p>
@@ -2097,7 +2097,7 @@
           <a:p>
             <a:fld id="{6CBBDB16-D3F8-4765-9107-3D5BDEEA5700}" type="datetimeFigureOut">
               <a:rPr lang="en-US" smtClean="0"/>
-              <a:t>11/20/2020</a:t>
+              <a:t>11/21/2020</a:t>
             </a:fld>
             <a:endParaRPr lang="en-US"/>
           </a:p>
@@ -2412,7 +2412,7 @@
           <a:p>
             <a:fld id="{6CBBDB16-D3F8-4765-9107-3D5BDEEA5700}" type="datetimeFigureOut">
               <a:rPr lang="en-US" smtClean="0"/>
-              <a:t>11/20/2020</a:t>
+              <a:t>11/21/2020</a:t>
             </a:fld>
             <a:endParaRPr lang="en-US"/>
           </a:p>
@@ -2957,7 +2957,7 @@
           <a:p>
             <a:fld id="{6CBBDB16-D3F8-4765-9107-3D5BDEEA5700}" type="datetimeFigureOut">
               <a:rPr lang="en-US" smtClean="0"/>
-              <a:t>11/20/2020</a:t>
+              <a:t>11/21/2020</a:t>
             </a:fld>
             <a:endParaRPr lang="en-US"/>
           </a:p>
@@ -3153,7 +3153,7 @@
           <a:p>
             <a:fld id="{6CBBDB16-D3F8-4765-9107-3D5BDEEA5700}" type="datetimeFigureOut">
               <a:rPr lang="en-US" smtClean="0"/>
-              <a:t>11/20/2020</a:t>
+              <a:t>11/21/2020</a:t>
             </a:fld>
             <a:endParaRPr lang="en-US"/>
           </a:p>
@@ -3367,7 +3367,7 @@
           <a:p>
             <a:fld id="{6CBBDB16-D3F8-4765-9107-3D5BDEEA5700}" type="datetimeFigureOut">
               <a:rPr lang="en-US" smtClean="0"/>
-              <a:t>11/20/2020</a:t>
+              <a:t>11/21/2020</a:t>
             </a:fld>
             <a:endParaRPr lang="en-US"/>
           </a:p>
@@ -3737,7 +3737,7 @@
           <a:p>
             <a:fld id="{6CBBDB16-D3F8-4765-9107-3D5BDEEA5700}" type="datetimeFigureOut">
               <a:rPr lang="en-US" smtClean="0"/>
-              <a:t>11/20/2020</a:t>
+              <a:t>11/21/2020</a:t>
             </a:fld>
             <a:endParaRPr lang="en-US"/>
           </a:p>
@@ -4141,7 +4141,7 @@
           <a:p>
             <a:fld id="{6CBBDB16-D3F8-4765-9107-3D5BDEEA5700}" type="datetimeFigureOut">
               <a:rPr lang="en-US" smtClean="0"/>
-              <a:t>11/20/2020</a:t>
+              <a:t>11/21/2020</a:t>
             </a:fld>
             <a:endParaRPr lang="en-US"/>
           </a:p>
@@ -4453,7 +4453,7 @@
           <a:p>
             <a:fld id="{6CBBDB16-D3F8-4765-9107-3D5BDEEA5700}" type="datetimeFigureOut">
               <a:rPr lang="en-US" smtClean="0"/>
-              <a:t>11/20/2020</a:t>
+              <a:t>11/21/2020</a:t>
             </a:fld>
             <a:endParaRPr lang="en-US"/>
           </a:p>
@@ -6007,6 +6007,15 @@
 <file path=ppt/slides/slide14.xml><?xml version="1.0" encoding="utf-8"?>
 <p:sld xmlns:a="http://schemas.openxmlformats.org/drawingml/2006/main" xmlns:r="http://schemas.openxmlformats.org/officeDocument/2006/relationships" xmlns:p="http://schemas.openxmlformats.org/presentationml/2006/main">
   <p:cSld>
+    <p:bg>
+      <p:bgPr>
+        <a:blipFill rotWithShape="1">
+          <a:blip r:embed="rId2"/>
+          <a:stretch/>
+        </a:blipFill>
+        <a:effectLst/>
+      </p:bgPr>
+    </p:bg>
     <p:spTree>
       <p:nvGrpSpPr>
         <p:cNvPr id="1" name=""/>
@@ -6021,6 +6030,348 @@
           <a:chExt cx="0" cy="0"/>
         </a:xfrm>
       </p:grpSpPr>
+      <p:sp useBgFill="1">
+        <p:nvSpPr>
+          <p:cNvPr id="10" name="Rectangle 9">
+            <a:extLst>
+              <a:ext uri="{FF2B5EF4-FFF2-40B4-BE49-F238E27FC236}">
+                <a16:creationId xmlns:a16="http://schemas.microsoft.com/office/drawing/2014/main" id="{64EB2E24-D715-4C44-A89A-E65D31D7D4CE}"/>
+              </a:ext>
+              <a:ext uri="{C183D7F6-B498-43B3-948B-1728B52AA6E4}">
+                <adec:decorative xmlns:adec="http://schemas.microsoft.com/office/drawing/2017/decorative" val="1"/>
+              </a:ext>
+            </a:extLst>
+          </p:cNvPr>
+          <p:cNvSpPr>
+            <a:spLocks noGrp="1" noRot="1" noChangeAspect="1" noMove="1" noResize="1" noEditPoints="1" noAdjustHandles="1" noChangeArrowheads="1" noChangeShapeType="1" noTextEdit="1"/>
+          </p:cNvSpPr>
+          <p:nvPr>
+            <p:extLst>
+              <p:ext uri="{386F3935-93C4-4BCD-93E2-E3B085C9AB24}">
+                <p16:designElem xmlns:p16="http://schemas.microsoft.com/office/powerpoint/2015/main" val="1"/>
+              </p:ext>
+            </p:extLst>
+          </p:nvPr>
+        </p:nvSpPr>
+        <p:spPr>
+          <a:xfrm>
+            <a:off x="0" y="0"/>
+            <a:ext cx="12189867" cy="6855282"/>
+          </a:xfrm>
+          <a:prstGeom prst="rect">
+            <a:avLst/>
+          </a:prstGeom>
+          <a:ln>
+            <a:noFill/>
+          </a:ln>
+        </p:spPr>
+        <p:style>
+          <a:lnRef idx="2">
+            <a:schemeClr val="accent1">
+              <a:shade val="50000"/>
+            </a:schemeClr>
+          </a:lnRef>
+          <a:fillRef idx="1">
+            <a:schemeClr val="accent1"/>
+          </a:fillRef>
+          <a:effectRef idx="0">
+            <a:schemeClr val="accent1"/>
+          </a:effectRef>
+          <a:fontRef idx="minor">
+            <a:schemeClr val="lt1"/>
+          </a:fontRef>
+        </p:style>
+        <p:txBody>
+          <a:bodyPr rtlCol="0" anchor="ctr"/>
+          <a:lstStyle/>
+          <a:p>
+            <a:pPr algn="ctr"/>
+            <a:endParaRPr lang="en-US"/>
+          </a:p>
+        </p:txBody>
+      </p:sp>
+      <p:pic>
+        <p:nvPicPr>
+          <p:cNvPr id="12" name="Picture 11">
+            <a:extLst>
+              <a:ext uri="{FF2B5EF4-FFF2-40B4-BE49-F238E27FC236}">
+                <a16:creationId xmlns:a16="http://schemas.microsoft.com/office/drawing/2014/main" id="{41B50719-5862-4FBC-BD13-940FFEE7F030}"/>
+              </a:ext>
+              <a:ext uri="{C183D7F6-B498-43B3-948B-1728B52AA6E4}">
+                <adec:decorative xmlns:adec="http://schemas.microsoft.com/office/drawing/2017/decorative" val="1"/>
+              </a:ext>
+            </a:extLst>
+          </p:cNvPr>
+          <p:cNvPicPr>
+            <a:picLocks noGrp="1" noRot="1" noChangeAspect="1" noMove="1" noResize="1" noEditPoints="1" noAdjustHandles="1" noChangeArrowheads="1" noChangeShapeType="1" noCrop="1"/>
+          </p:cNvPicPr>
+          <p:nvPr>
+            <p:extLst>
+              <p:ext uri="{386F3935-93C4-4BCD-93E2-E3B085C9AB24}">
+                <p16:designElem xmlns:p16="http://schemas.microsoft.com/office/powerpoint/2015/main" val="1"/>
+              </p:ext>
+            </p:extLst>
+          </p:nvPr>
+        </p:nvPicPr>
+        <p:blipFill>
+          <a:blip r:embed="rId3">
+            <a:extLst>
+              <a:ext uri="{28A0092B-C50C-407E-A947-70E740481C1C}">
+                <a14:useLocalDpi xmlns:a14="http://schemas.microsoft.com/office/drawing/2010/main" val="0"/>
+              </a:ext>
+            </a:extLst>
+          </a:blip>
+          <a:stretch>
+            <a:fillRect/>
+          </a:stretch>
+        </p:blipFill>
+        <p:spPr>
+          <a:xfrm>
+            <a:off x="2831794" y="2105202"/>
+            <a:ext cx="9360205" cy="4752798"/>
+          </a:xfrm>
+          <a:prstGeom prst="rect">
+            <a:avLst/>
+          </a:prstGeom>
+        </p:spPr>
+      </p:pic>
+      <p:pic>
+        <p:nvPicPr>
+          <p:cNvPr id="14" name="Picture 13">
+            <a:extLst>
+              <a:ext uri="{FF2B5EF4-FFF2-40B4-BE49-F238E27FC236}">
+                <a16:creationId xmlns:a16="http://schemas.microsoft.com/office/drawing/2014/main" id="{5D217AB5-2ECE-42AC-A79A-638A5A8CF628}"/>
+              </a:ext>
+              <a:ext uri="{C183D7F6-B498-43B3-948B-1728B52AA6E4}">
+                <adec:decorative xmlns:adec="http://schemas.microsoft.com/office/drawing/2017/decorative" val="1"/>
+              </a:ext>
+            </a:extLst>
+          </p:cNvPr>
+          <p:cNvPicPr>
+            <a:picLocks noGrp="1" noRot="1" noChangeAspect="1" noMove="1" noResize="1" noEditPoints="1" noAdjustHandles="1" noChangeArrowheads="1" noChangeShapeType="1" noCrop="1"/>
+          </p:cNvPicPr>
+          <p:nvPr>
+            <p:extLst>
+              <p:ext uri="{386F3935-93C4-4BCD-93E2-E3B085C9AB24}">
+                <p16:designElem xmlns:p16="http://schemas.microsoft.com/office/powerpoint/2015/main" val="1"/>
+              </p:ext>
+            </p:extLst>
+          </p:nvPr>
+        </p:nvPicPr>
+        <p:blipFill>
+          <a:blip r:embed="rId4">
+            <a:alphaModFix/>
+            <a:extLst>
+              <a:ext uri="{28A0092B-C50C-407E-A947-70E740481C1C}">
+                <a14:useLocalDpi xmlns:a14="http://schemas.microsoft.com/office/drawing/2010/main" val="0"/>
+              </a:ext>
+            </a:extLst>
+          </a:blip>
+          <a:stretch>
+            <a:fillRect/>
+          </a:stretch>
+        </p:blipFill>
+        <p:spPr>
+          <a:xfrm>
+            <a:off x="0" y="0"/>
+            <a:ext cx="12189867" cy="6858000"/>
+          </a:xfrm>
+          <a:prstGeom prst="rect">
+            <a:avLst/>
+          </a:prstGeom>
+        </p:spPr>
+      </p:pic>
+      <p:sp>
+        <p:nvSpPr>
+          <p:cNvPr id="16" name="Rectangle 15">
+            <a:extLst>
+              <a:ext uri="{FF2B5EF4-FFF2-40B4-BE49-F238E27FC236}">
+                <a16:creationId xmlns:a16="http://schemas.microsoft.com/office/drawing/2014/main" id="{A6A91365-BBD6-4917-9FBD-DB166E4BF9A4}"/>
+              </a:ext>
+              <a:ext uri="{C183D7F6-B498-43B3-948B-1728B52AA6E4}">
+                <adec:decorative xmlns:adec="http://schemas.microsoft.com/office/drawing/2017/decorative" val="1"/>
+              </a:ext>
+            </a:extLst>
+          </p:cNvPr>
+          <p:cNvSpPr>
+            <a:spLocks noGrp="1" noRot="1" noChangeAspect="1" noMove="1" noResize="1" noEditPoints="1" noAdjustHandles="1" noChangeArrowheads="1" noChangeShapeType="1" noTextEdit="1"/>
+          </p:cNvSpPr>
+          <p:nvPr>
+            <p:extLst>
+              <p:ext uri="{386F3935-93C4-4BCD-93E2-E3B085C9AB24}">
+                <p16:designElem xmlns:p16="http://schemas.microsoft.com/office/powerpoint/2015/main" val="1"/>
+              </p:ext>
+            </p:extLst>
+          </p:nvPr>
+        </p:nvSpPr>
+        <p:spPr>
+          <a:xfrm>
+            <a:off x="0" y="0"/>
+            <a:ext cx="964174" cy="6858000"/>
+          </a:xfrm>
+          <a:prstGeom prst="rect">
+            <a:avLst/>
+          </a:prstGeom>
+          <a:solidFill>
+            <a:schemeClr val="bg2"/>
+          </a:solidFill>
+          <a:ln>
+            <a:noFill/>
+          </a:ln>
+        </p:spPr>
+        <p:style>
+          <a:lnRef idx="2">
+            <a:schemeClr val="accent1">
+              <a:shade val="50000"/>
+            </a:schemeClr>
+          </a:lnRef>
+          <a:fillRef idx="1">
+            <a:schemeClr val="accent1"/>
+          </a:fillRef>
+          <a:effectRef idx="0">
+            <a:schemeClr val="accent1"/>
+          </a:effectRef>
+          <a:fontRef idx="minor">
+            <a:schemeClr val="lt1"/>
+          </a:fontRef>
+        </p:style>
+        <p:txBody>
+          <a:bodyPr rtlCol="0" anchor="ctr"/>
+          <a:lstStyle/>
+          <a:p>
+            <a:pPr algn="ctr"/>
+            <a:endParaRPr lang="en-US"/>
+          </a:p>
+        </p:txBody>
+      </p:sp>
+      <p:sp>
+        <p:nvSpPr>
+          <p:cNvPr id="18" name="Rectangle 17">
+            <a:extLst>
+              <a:ext uri="{FF2B5EF4-FFF2-40B4-BE49-F238E27FC236}">
+                <a16:creationId xmlns:a16="http://schemas.microsoft.com/office/drawing/2014/main" id="{C5C7957D-4EA0-4D8C-B9C4-3B9D72B5857C}"/>
+              </a:ext>
+              <a:ext uri="{C183D7F6-B498-43B3-948B-1728B52AA6E4}">
+                <adec:decorative xmlns:adec="http://schemas.microsoft.com/office/drawing/2017/decorative" val="1"/>
+              </a:ext>
+            </a:extLst>
+          </p:cNvPr>
+          <p:cNvSpPr>
+            <a:spLocks noGrp="1" noRot="1" noChangeAspect="1" noMove="1" noResize="1" noEditPoints="1" noAdjustHandles="1" noChangeArrowheads="1" noChangeShapeType="1" noTextEdit="1"/>
+          </p:cNvSpPr>
+          <p:nvPr>
+            <p:extLst>
+              <p:ext uri="{386F3935-93C4-4BCD-93E2-E3B085C9AB24}">
+                <p16:designElem xmlns:p16="http://schemas.microsoft.com/office/powerpoint/2015/main" val="1"/>
+              </p:ext>
+            </p:extLst>
+          </p:nvPr>
+        </p:nvSpPr>
+        <p:spPr>
+          <a:xfrm>
+            <a:off x="962042" y="0"/>
+            <a:ext cx="45719" cy="6858000"/>
+          </a:xfrm>
+          <a:prstGeom prst="rect">
+            <a:avLst/>
+          </a:prstGeom>
+          <a:solidFill>
+            <a:schemeClr val="accent6"/>
+          </a:solidFill>
+          <a:ln>
+            <a:noFill/>
+          </a:ln>
+        </p:spPr>
+        <p:style>
+          <a:lnRef idx="2">
+            <a:schemeClr val="accent1">
+              <a:shade val="50000"/>
+            </a:schemeClr>
+          </a:lnRef>
+          <a:fillRef idx="1">
+            <a:schemeClr val="accent1"/>
+          </a:fillRef>
+          <a:effectRef idx="0">
+            <a:schemeClr val="accent1"/>
+          </a:effectRef>
+          <a:fontRef idx="minor">
+            <a:schemeClr val="lt1"/>
+          </a:fontRef>
+        </p:style>
+        <p:txBody>
+          <a:bodyPr rtlCol="0" anchor="ctr"/>
+          <a:lstStyle/>
+          <a:p>
+            <a:pPr algn="ctr"/>
+            <a:endParaRPr lang="en-US"/>
+          </a:p>
+        </p:txBody>
+      </p:sp>
+      <p:sp>
+        <p:nvSpPr>
+          <p:cNvPr id="20" name="Rectangle 19">
+            <a:extLst>
+              <a:ext uri="{FF2B5EF4-FFF2-40B4-BE49-F238E27FC236}">
+                <a16:creationId xmlns:a16="http://schemas.microsoft.com/office/drawing/2014/main" id="{E726422E-47D7-4930-B686-007CE4B7E7A6}"/>
+              </a:ext>
+              <a:ext uri="{C183D7F6-B498-43B3-948B-1728B52AA6E4}">
+                <adec:decorative xmlns:adec="http://schemas.microsoft.com/office/drawing/2017/decorative" val="1"/>
+              </a:ext>
+            </a:extLst>
+          </p:cNvPr>
+          <p:cNvSpPr>
+            <a:spLocks noGrp="1" noRot="1" noChangeAspect="1" noMove="1" noResize="1" noEditPoints="1" noAdjustHandles="1" noChangeArrowheads="1" noChangeShapeType="1" noTextEdit="1"/>
+          </p:cNvSpPr>
+          <p:nvPr>
+            <p:extLst>
+              <p:ext uri="{386F3935-93C4-4BCD-93E2-E3B085C9AB24}">
+                <p16:designElem xmlns:p16="http://schemas.microsoft.com/office/powerpoint/2015/main" val="1"/>
+              </p:ext>
+            </p:extLst>
+          </p:nvPr>
+        </p:nvSpPr>
+        <p:spPr>
+          <a:xfrm>
+            <a:off x="1007533" y="0"/>
+            <a:ext cx="10378001" cy="6858000"/>
+          </a:xfrm>
+          <a:prstGeom prst="rect">
+            <a:avLst/>
+          </a:prstGeom>
+          <a:solidFill>
+            <a:schemeClr val="bg2">
+              <a:alpha val="92000"/>
+            </a:schemeClr>
+          </a:solidFill>
+          <a:ln>
+            <a:noFill/>
+          </a:ln>
+        </p:spPr>
+        <p:style>
+          <a:lnRef idx="2">
+            <a:schemeClr val="accent1">
+              <a:shade val="50000"/>
+            </a:schemeClr>
+          </a:lnRef>
+          <a:fillRef idx="1">
+            <a:schemeClr val="accent1"/>
+          </a:fillRef>
+          <a:effectRef idx="0">
+            <a:schemeClr val="accent1"/>
+          </a:effectRef>
+          <a:fontRef idx="minor">
+            <a:schemeClr val="lt1"/>
+          </a:fontRef>
+        </p:style>
+        <p:txBody>
+          <a:bodyPr rtlCol="0" anchor="ctr"/>
+          <a:lstStyle/>
+          <a:p>
+            <a:pPr algn="ctr"/>
+            <a:endParaRPr lang="en-US"/>
+          </a:p>
+        </p:txBody>
+      </p:sp>
       <p:sp>
         <p:nvSpPr>
           <p:cNvPr id="2" name="Title 1">
@@ -6037,15 +6388,94 @@
             <p:ph type="title"/>
           </p:nvPr>
         </p:nvSpPr>
-        <p:spPr/>
-        <p:txBody>
-          <a:bodyPr/>
-          <a:lstStyle/>
-          <a:p>
-            <a:endParaRPr lang="en-US"/>
-          </a:p>
-        </p:txBody>
-      </p:sp>
+        <p:spPr>
+          <a:xfrm>
+            <a:off x="1969803" y="808056"/>
+            <a:ext cx="8608037" cy="1077229"/>
+          </a:xfrm>
+        </p:spPr>
+        <p:txBody>
+          <a:bodyPr>
+            <a:normAutofit/>
+          </a:bodyPr>
+          <a:lstStyle/>
+          <a:p>
+            <a:pPr algn="l"/>
+            <a:r>
+              <a:rPr lang="en-US" dirty="0"/>
+              <a:t>COVID-19 in Urban-Rural areas</a:t>
+            </a:r>
+          </a:p>
+        </p:txBody>
+      </p:sp>
+      <p:pic>
+        <p:nvPicPr>
+          <p:cNvPr id="5" name="Picture 4" descr="A screenshot of a cell phone&#10;&#10;Description automatically generated">
+            <a:extLst>
+              <a:ext uri="{FF2B5EF4-FFF2-40B4-BE49-F238E27FC236}">
+                <a16:creationId xmlns:a16="http://schemas.microsoft.com/office/drawing/2014/main" id="{CFD2C1EB-7B52-4278-A986-89FB05DFAF69}"/>
+              </a:ext>
+            </a:extLst>
+          </p:cNvPr>
+          <p:cNvPicPr>
+            <a:picLocks noChangeAspect="1"/>
+          </p:cNvPicPr>
+          <p:nvPr/>
+        </p:nvPicPr>
+        <p:blipFill>
+          <a:blip r:embed="rId5">
+            <a:extLst>
+              <a:ext uri="{28A0092B-C50C-407E-A947-70E740481C1C}">
+                <a14:useLocalDpi xmlns:a14="http://schemas.microsoft.com/office/drawing/2010/main" val="0"/>
+              </a:ext>
+            </a:extLst>
+          </a:blip>
+          <a:stretch>
+            <a:fillRect/>
+          </a:stretch>
+        </p:blipFill>
+        <p:spPr>
+          <a:xfrm>
+            <a:off x="2181719" y="2387984"/>
+            <a:ext cx="4454381" cy="3316400"/>
+          </a:xfrm>
+          <a:prstGeom prst="rect">
+            <a:avLst/>
+          </a:prstGeom>
+          <a:ln>
+            <a:gradFill flip="none" rotWithShape="1">
+              <a:gsLst>
+                <a:gs pos="86000">
+                  <a:schemeClr val="accent6">
+                    <a:lumMod val="67000"/>
+                  </a:schemeClr>
+                </a:gs>
+                <a:gs pos="20000">
+                  <a:schemeClr val="accent6">
+                    <a:lumMod val="97000"/>
+                    <a:lumOff val="3000"/>
+                  </a:schemeClr>
+                </a:gs>
+                <a:gs pos="100000">
+                  <a:schemeClr val="accent6">
+                    <a:lumMod val="60000"/>
+                    <a:lumOff val="40000"/>
+                  </a:schemeClr>
+                </a:gs>
+              </a:gsLst>
+              <a:lin ang="16200000" scaled="1"/>
+              <a:tileRect/>
+            </a:gradFill>
+          </a:ln>
+          <a:effectLst>
+            <a:innerShdw blurRad="127000">
+              <a:prstClr val="black">
+                <a:alpha val="90000"/>
+              </a:prstClr>
+            </a:innerShdw>
+          </a:effectLst>
+        </p:spPr>
+      </p:pic>
       <p:sp>
         <p:nvSpPr>
           <p:cNvPr id="3" name="Content Placeholder 2">
@@ -6062,24 +6492,106 @@
             <p:ph idx="1"/>
           </p:nvPr>
         </p:nvSpPr>
-        <p:spPr/>
-        <p:txBody>
-          <a:bodyPr/>
-          <a:lstStyle/>
-          <a:p>
-            <a:r>
-              <a:rPr lang="en-US" dirty="0"/>
+        <p:spPr>
+          <a:xfrm>
+            <a:off x="7286175" y="2052116"/>
+            <a:ext cx="3289986" cy="3997828"/>
+          </a:xfrm>
+        </p:spPr>
+        <p:txBody>
+          <a:bodyPr>
+            <a:normAutofit/>
+          </a:bodyPr>
+          <a:lstStyle/>
+          <a:p>
+            <a:r>
+              <a:rPr lang="en-US" sz="1800"/>
               <a:t>Why focus on NCHS Urban-Rural Classification?</a:t>
             </a:r>
           </a:p>
           <a:p>
             <a:r>
-              <a:rPr lang="en-US" dirty="0"/>
-              <a:t> </a:t>
-            </a:r>
-          </a:p>
-          <a:p>
-            <a:endParaRPr lang="en-US" dirty="0"/>
+              <a:rPr lang="en-US" sz="1800"/>
+              <a:t>What areas are affected the most?</a:t>
+            </a:r>
+          </a:p>
+          <a:p>
+            <a:r>
+              <a:rPr lang="en-US" sz="1800"/>
+              <a:t>Where are we seeing the affects of COVID</a:t>
+            </a:r>
+          </a:p>
+          <a:p>
+            <a:r>
+              <a:rPr lang="en-US" sz="1800"/>
+              <a:t>Let’s talk about correlation</a:t>
+            </a:r>
+          </a:p>
+          <a:p>
+            <a:endParaRPr lang="en-US" sz="1800"/>
+          </a:p>
+        </p:txBody>
+      </p:sp>
+      <p:sp>
+        <p:nvSpPr>
+          <p:cNvPr id="22" name="Rectangle 21">
+            <a:extLst>
+              <a:ext uri="{FF2B5EF4-FFF2-40B4-BE49-F238E27FC236}">
+                <a16:creationId xmlns:a16="http://schemas.microsoft.com/office/drawing/2014/main" id="{87881219-F2CA-4FBA-AD74-22E086E92148}"/>
+              </a:ext>
+              <a:ext uri="{C183D7F6-B498-43B3-948B-1728B52AA6E4}">
+                <adec:decorative xmlns:adec="http://schemas.microsoft.com/office/drawing/2017/decorative" val="1"/>
+              </a:ext>
+            </a:extLst>
+          </p:cNvPr>
+          <p:cNvSpPr>
+            <a:spLocks noGrp="1" noRot="1" noChangeAspect="1" noMove="1" noResize="1" noEditPoints="1" noAdjustHandles="1" noChangeArrowheads="1" noChangeShapeType="1" noTextEdit="1"/>
+          </p:cNvSpPr>
+          <p:nvPr>
+            <p:extLst>
+              <p:ext uri="{386F3935-93C4-4BCD-93E2-E3B085C9AB24}">
+                <p16:designElem xmlns:p16="http://schemas.microsoft.com/office/powerpoint/2015/main" val="1"/>
+              </p:ext>
+            </p:extLst>
+          </p:nvPr>
+        </p:nvSpPr>
+        <p:spPr>
+          <a:xfrm>
+            <a:off x="11387666" y="-2718"/>
+            <a:ext cx="27432" cy="6858000"/>
+          </a:xfrm>
+          <a:prstGeom prst="rect">
+            <a:avLst/>
+          </a:prstGeom>
+          <a:solidFill>
+            <a:schemeClr val="accent6"/>
+          </a:solidFill>
+          <a:ln>
+            <a:noFill/>
+          </a:ln>
+        </p:spPr>
+        <p:style>
+          <a:lnRef idx="2">
+            <a:schemeClr val="accent1">
+              <a:shade val="50000"/>
+            </a:schemeClr>
+          </a:lnRef>
+          <a:fillRef idx="1">
+            <a:schemeClr val="accent1"/>
+          </a:fillRef>
+          <a:effectRef idx="0">
+            <a:schemeClr val="accent1"/>
+          </a:effectRef>
+          <a:fontRef idx="minor">
+            <a:schemeClr val="lt1"/>
+          </a:fontRef>
+        </p:style>
+        <p:txBody>
+          <a:bodyPr rtlCol="0" anchor="ctr"/>
+          <a:lstStyle/>
+          <a:p>
+            <a:pPr algn="ctr"/>
+            <a:endParaRPr lang="en-US"/>
           </a:p>
         </p:txBody>
       </p:sp>
@@ -6826,7 +7338,7 @@
         </p:blipFill>
         <p:spPr>
           <a:xfrm>
-            <a:off x="6276865" y="92697"/>
+            <a:off x="6276865" y="76200"/>
             <a:ext cx="2257740" cy="895475"/>
           </a:xfrm>
           <a:prstGeom prst="rect">
@@ -7165,12 +7677,157 @@
           </a:p>
         </p:txBody>
       </p:sp>
+      <p:sp>
+        <p:nvSpPr>
+          <p:cNvPr id="9" name="TextBox 8">
+            <a:extLst>
+              <a:ext uri="{FF2B5EF4-FFF2-40B4-BE49-F238E27FC236}">
+                <a16:creationId xmlns:a16="http://schemas.microsoft.com/office/drawing/2014/main" id="{D7DCD131-15CD-4240-95F9-02F40211B931}"/>
+              </a:ext>
+            </a:extLst>
+          </p:cNvPr>
+          <p:cNvSpPr txBox="1"/>
+          <p:nvPr/>
+        </p:nvSpPr>
+        <p:spPr>
+          <a:xfrm>
+            <a:off x="2611808" y="3714749"/>
+            <a:ext cx="1371600" cy="307777"/>
+          </a:xfrm>
+          <a:prstGeom prst="rect">
+            <a:avLst/>
+          </a:prstGeom>
+          <a:noFill/>
+        </p:spPr>
+        <p:txBody>
+          <a:bodyPr wrap="square" rtlCol="0">
+            <a:spAutoFit/>
+          </a:bodyPr>
+          <a:lstStyle/>
+          <a:p>
+            <a:r>
+              <a:rPr lang="en-US" sz="1400" dirty="0"/>
+              <a:t>Jazlyn </a:t>
+            </a:r>
+            <a:r>
+              <a:rPr lang="en-US" sz="1400" dirty="0" err="1"/>
+              <a:t>Mazick</a:t>
+            </a:r>
+            <a:endParaRPr lang="en-US" sz="1400" dirty="0"/>
+          </a:p>
+        </p:txBody>
+      </p:sp>
+      <p:sp>
+        <p:nvSpPr>
+          <p:cNvPr id="12" name="TextBox 11">
+            <a:extLst>
+              <a:ext uri="{FF2B5EF4-FFF2-40B4-BE49-F238E27FC236}">
+                <a16:creationId xmlns:a16="http://schemas.microsoft.com/office/drawing/2014/main" id="{99644F05-472E-4F46-8338-0F651FC096AC}"/>
+              </a:ext>
+            </a:extLst>
+          </p:cNvPr>
+          <p:cNvSpPr txBox="1"/>
+          <p:nvPr/>
+        </p:nvSpPr>
+        <p:spPr>
+          <a:xfrm>
+            <a:off x="4444418" y="3714748"/>
+            <a:ext cx="1371600" cy="307777"/>
+          </a:xfrm>
+          <a:prstGeom prst="rect">
+            <a:avLst/>
+          </a:prstGeom>
+          <a:noFill/>
+        </p:spPr>
+        <p:txBody>
+          <a:bodyPr wrap="square" rtlCol="0">
+            <a:spAutoFit/>
+          </a:bodyPr>
+          <a:lstStyle/>
+          <a:p>
+            <a:r>
+              <a:rPr lang="en-US" sz="1400" dirty="0"/>
+              <a:t>Michael Rivera</a:t>
+            </a:r>
+          </a:p>
+        </p:txBody>
+      </p:sp>
+      <p:sp>
+        <p:nvSpPr>
+          <p:cNvPr id="14" name="TextBox 13">
+            <a:extLst>
+              <a:ext uri="{FF2B5EF4-FFF2-40B4-BE49-F238E27FC236}">
+                <a16:creationId xmlns:a16="http://schemas.microsoft.com/office/drawing/2014/main" id="{0580C6E0-AAAC-4997-B283-EF5F67434350}"/>
+              </a:ext>
+            </a:extLst>
+          </p:cNvPr>
+          <p:cNvSpPr txBox="1"/>
+          <p:nvPr/>
+        </p:nvSpPr>
+        <p:spPr>
+          <a:xfrm>
+            <a:off x="6277028" y="3714747"/>
+            <a:ext cx="1371600" cy="307777"/>
+          </a:xfrm>
+          <a:prstGeom prst="rect">
+            <a:avLst/>
+          </a:prstGeom>
+          <a:noFill/>
+        </p:spPr>
+        <p:txBody>
+          <a:bodyPr wrap="square" rtlCol="0">
+            <a:spAutoFit/>
+          </a:bodyPr>
+          <a:lstStyle/>
+          <a:p>
+            <a:r>
+              <a:rPr lang="en-US" sz="1400" dirty="0"/>
+              <a:t>Miguel Padilla</a:t>
+            </a:r>
+          </a:p>
+        </p:txBody>
+      </p:sp>
+      <p:sp>
+        <p:nvSpPr>
+          <p:cNvPr id="16" name="TextBox 15">
+            <a:extLst>
+              <a:ext uri="{FF2B5EF4-FFF2-40B4-BE49-F238E27FC236}">
+                <a16:creationId xmlns:a16="http://schemas.microsoft.com/office/drawing/2014/main" id="{6C5C1646-A939-4567-93E5-592137C9F0E8}"/>
+              </a:ext>
+            </a:extLst>
+          </p:cNvPr>
+          <p:cNvSpPr txBox="1"/>
+          <p:nvPr/>
+        </p:nvSpPr>
+        <p:spPr>
+          <a:xfrm>
+            <a:off x="8109638" y="3714746"/>
+            <a:ext cx="1470554" cy="307777"/>
+          </a:xfrm>
+          <a:prstGeom prst="rect">
+            <a:avLst/>
+          </a:prstGeom>
+          <a:noFill/>
+        </p:spPr>
+        <p:txBody>
+          <a:bodyPr wrap="square" rtlCol="0">
+            <a:spAutoFit/>
+          </a:bodyPr>
+          <a:lstStyle/>
+          <a:p>
+            <a:r>
+              <a:rPr lang="en-US" sz="1400" dirty="0"/>
+              <a:t>Niguel Williams</a:t>
+            </a:r>
+          </a:p>
+        </p:txBody>
+      </p:sp>
       <p:pic>
         <p:nvPicPr>
-          <p:cNvPr id="7" name="Content Placeholder 4" descr="Icon&#10;&#10;Description automatically generated">
+          <p:cNvPr id="4" name="Picture 3">
             <a:extLst>
               <a:ext uri="{FF2B5EF4-FFF2-40B4-BE49-F238E27FC236}">
-                <a16:creationId xmlns:a16="http://schemas.microsoft.com/office/drawing/2014/main" id="{BF8A29B3-C003-44C6-B787-9BE7E14B290B}"/>
+                <a16:creationId xmlns:a16="http://schemas.microsoft.com/office/drawing/2014/main" id="{A0AA74F5-ABB9-4123-BD2A-336A4466D188}"/>
               </a:ext>
             </a:extLst>
           </p:cNvPr>
@@ -7193,165 +7850,20 @@
         </p:blipFill>
         <p:spPr>
           <a:xfrm>
-            <a:off x="6261841" y="2146906"/>
-            <a:ext cx="1371600" cy="1371600"/>
+            <a:off x="4444418" y="1857676"/>
+            <a:ext cx="1371600" cy="1660831"/>
           </a:xfrm>
           <a:prstGeom prst="rect">
             <a:avLst/>
           </a:prstGeom>
         </p:spPr>
       </p:pic>
-      <p:sp>
-        <p:nvSpPr>
-          <p:cNvPr id="9" name="TextBox 8">
+      <p:pic>
+        <p:nvPicPr>
+          <p:cNvPr id="11" name="Picture 10">
             <a:extLst>
               <a:ext uri="{FF2B5EF4-FFF2-40B4-BE49-F238E27FC236}">
-                <a16:creationId xmlns:a16="http://schemas.microsoft.com/office/drawing/2014/main" id="{D7DCD131-15CD-4240-95F9-02F40211B931}"/>
-              </a:ext>
-            </a:extLst>
-          </p:cNvPr>
-          <p:cNvSpPr txBox="1"/>
-          <p:nvPr/>
-        </p:nvSpPr>
-        <p:spPr>
-          <a:xfrm>
-            <a:off x="2611808" y="3714749"/>
-            <a:ext cx="1371600" cy="307777"/>
-          </a:xfrm>
-          <a:prstGeom prst="rect">
-            <a:avLst/>
-          </a:prstGeom>
-          <a:noFill/>
-        </p:spPr>
-        <p:txBody>
-          <a:bodyPr wrap="square" rtlCol="0">
-            <a:spAutoFit/>
-          </a:bodyPr>
-          <a:lstStyle/>
-          <a:p>
-            <a:r>
-              <a:rPr lang="en-US" sz="1400" dirty="0"/>
-              <a:t>Jazlyn </a:t>
-            </a:r>
-            <a:r>
-              <a:rPr lang="en-US" sz="1400" dirty="0" err="1"/>
-              <a:t>Mazick</a:t>
-            </a:r>
-            <a:endParaRPr lang="en-US" sz="1400" dirty="0"/>
-          </a:p>
-        </p:txBody>
-      </p:sp>
-      <p:sp>
-        <p:nvSpPr>
-          <p:cNvPr id="12" name="TextBox 11">
-            <a:extLst>
-              <a:ext uri="{FF2B5EF4-FFF2-40B4-BE49-F238E27FC236}">
-                <a16:creationId xmlns:a16="http://schemas.microsoft.com/office/drawing/2014/main" id="{99644F05-472E-4F46-8338-0F651FC096AC}"/>
-              </a:ext>
-            </a:extLst>
-          </p:cNvPr>
-          <p:cNvSpPr txBox="1"/>
-          <p:nvPr/>
-        </p:nvSpPr>
-        <p:spPr>
-          <a:xfrm>
-            <a:off x="4444418" y="3714748"/>
-            <a:ext cx="1371600" cy="307777"/>
-          </a:xfrm>
-          <a:prstGeom prst="rect">
-            <a:avLst/>
-          </a:prstGeom>
-          <a:noFill/>
-        </p:spPr>
-        <p:txBody>
-          <a:bodyPr wrap="square" rtlCol="0">
-            <a:spAutoFit/>
-          </a:bodyPr>
-          <a:lstStyle/>
-          <a:p>
-            <a:r>
-              <a:rPr lang="en-US" sz="1400" dirty="0"/>
-              <a:t>Michael Rivera</a:t>
-            </a:r>
-          </a:p>
-        </p:txBody>
-      </p:sp>
-      <p:sp>
-        <p:nvSpPr>
-          <p:cNvPr id="14" name="TextBox 13">
-            <a:extLst>
-              <a:ext uri="{FF2B5EF4-FFF2-40B4-BE49-F238E27FC236}">
-                <a16:creationId xmlns:a16="http://schemas.microsoft.com/office/drawing/2014/main" id="{0580C6E0-AAAC-4997-B283-EF5F67434350}"/>
-              </a:ext>
-            </a:extLst>
-          </p:cNvPr>
-          <p:cNvSpPr txBox="1"/>
-          <p:nvPr/>
-        </p:nvSpPr>
-        <p:spPr>
-          <a:xfrm>
-            <a:off x="6277028" y="3714747"/>
-            <a:ext cx="1371600" cy="307777"/>
-          </a:xfrm>
-          <a:prstGeom prst="rect">
-            <a:avLst/>
-          </a:prstGeom>
-          <a:noFill/>
-        </p:spPr>
-        <p:txBody>
-          <a:bodyPr wrap="square" rtlCol="0">
-            <a:spAutoFit/>
-          </a:bodyPr>
-          <a:lstStyle/>
-          <a:p>
-            <a:r>
-              <a:rPr lang="en-US" sz="1400" dirty="0"/>
-              <a:t>Miguel Padilla</a:t>
-            </a:r>
-          </a:p>
-        </p:txBody>
-      </p:sp>
-      <p:sp>
-        <p:nvSpPr>
-          <p:cNvPr id="16" name="TextBox 15">
-            <a:extLst>
-              <a:ext uri="{FF2B5EF4-FFF2-40B4-BE49-F238E27FC236}">
-                <a16:creationId xmlns:a16="http://schemas.microsoft.com/office/drawing/2014/main" id="{6C5C1646-A939-4567-93E5-592137C9F0E8}"/>
-              </a:ext>
-            </a:extLst>
-          </p:cNvPr>
-          <p:cNvSpPr txBox="1"/>
-          <p:nvPr/>
-        </p:nvSpPr>
-        <p:spPr>
-          <a:xfrm>
-            <a:off x="8109638" y="3714746"/>
-            <a:ext cx="1470554" cy="307777"/>
-          </a:xfrm>
-          <a:prstGeom prst="rect">
-            <a:avLst/>
-          </a:prstGeom>
-          <a:noFill/>
-        </p:spPr>
-        <p:txBody>
-          <a:bodyPr wrap="square" rtlCol="0">
-            <a:spAutoFit/>
-          </a:bodyPr>
-          <a:lstStyle/>
-          <a:p>
-            <a:r>
-              <a:rPr lang="en-US" sz="1400" dirty="0"/>
-              <a:t>Niguel Williams</a:t>
-            </a:r>
-          </a:p>
-        </p:txBody>
-      </p:sp>
-      <p:pic>
-        <p:nvPicPr>
-          <p:cNvPr id="4" name="Picture 3">
-            <a:extLst>
-              <a:ext uri="{FF2B5EF4-FFF2-40B4-BE49-F238E27FC236}">
-                <a16:creationId xmlns:a16="http://schemas.microsoft.com/office/drawing/2014/main" id="{A0AA74F5-ABB9-4123-BD2A-336A4466D188}"/>
+                <a16:creationId xmlns:a16="http://schemas.microsoft.com/office/drawing/2014/main" id="{7B0FE17A-E13A-47FB-A8A5-16BA10A12E79}"/>
               </a:ext>
             </a:extLst>
           </p:cNvPr>
@@ -7374,8 +7886,8 @@
         </p:blipFill>
         <p:spPr>
           <a:xfrm>
-            <a:off x="4444418" y="1857676"/>
-            <a:ext cx="1371600" cy="1660831"/>
+            <a:off x="2718277" y="1872716"/>
+            <a:ext cx="1394460" cy="1660831"/>
           </a:xfrm>
           <a:prstGeom prst="rect">
             <a:avLst/>
@@ -7384,10 +7896,10 @@
       </p:pic>
       <p:pic>
         <p:nvPicPr>
-          <p:cNvPr id="11" name="Picture 10">
+          <p:cNvPr id="5" name="Picture 4">
             <a:extLst>
               <a:ext uri="{FF2B5EF4-FFF2-40B4-BE49-F238E27FC236}">
-                <a16:creationId xmlns:a16="http://schemas.microsoft.com/office/drawing/2014/main" id="{7B0FE17A-E13A-47FB-A8A5-16BA10A12E79}"/>
+                <a16:creationId xmlns:a16="http://schemas.microsoft.com/office/drawing/2014/main" id="{A052CCEE-9860-4351-9347-75B223008741}"/>
               </a:ext>
             </a:extLst>
           </p:cNvPr>
@@ -7410,8 +7922,8 @@
         </p:blipFill>
         <p:spPr>
           <a:xfrm>
-            <a:off x="2718277" y="1872716"/>
-            <a:ext cx="1394460" cy="1660831"/>
+            <a:off x="8109638" y="1857674"/>
+            <a:ext cx="1470555" cy="1660832"/>
           </a:xfrm>
           <a:prstGeom prst="rect">
             <a:avLst/>
@@ -7476,7 +7988,7 @@
           <a:graphicData uri="http://schemas.openxmlformats.org/presentationml/2006/ole">
             <mc:AlternateContent xmlns:mc="http://schemas.openxmlformats.org/markup-compatibility/2006">
               <mc:Choice xmlns:v="urn:schemas-microsoft-com:vml" Requires="v">
-                <p:oleObj spid="_x0000_s1031" name="Acrobat Document" r:id="rId3" imgW="5829257" imgH="7543800" progId="AcroExch.Document.DC">
+                <p:oleObj spid="_x0000_s1038" name="Acrobat Document" r:id="rId3" imgW="5829257" imgH="7543800" progId="AcroExch.Document.DC">
                   <p:embed/>
                 </p:oleObj>
               </mc:Choice>

</xml_diff>